<commit_message>
Added 7 slides covering API to the combined dataframe
</commit_message>
<xml_diff>
--- a/News Project Presentation.pptx
+++ b/News Project Presentation.pptx
@@ -11,14 +11,14 @@
     <p:sldId id="256" r:id="rId2"/>
     <p:sldId id="258" r:id="rId3"/>
     <p:sldId id="259" r:id="rId4"/>
-    <p:sldId id="261" r:id="rId5"/>
-    <p:sldId id="263" r:id="rId6"/>
+    <p:sldId id="263" r:id="rId5"/>
+    <p:sldId id="302" r:id="rId6"/>
     <p:sldId id="271" r:id="rId7"/>
-    <p:sldId id="297" r:id="rId8"/>
-    <p:sldId id="285" r:id="rId9"/>
-    <p:sldId id="286" r:id="rId10"/>
-    <p:sldId id="287" r:id="rId11"/>
-    <p:sldId id="288" r:id="rId12"/>
+    <p:sldId id="261" r:id="rId8"/>
+    <p:sldId id="288" r:id="rId9"/>
+    <p:sldId id="297" r:id="rId10"/>
+    <p:sldId id="303" r:id="rId11"/>
+    <p:sldId id="287" r:id="rId12"/>
     <p:sldId id="260" r:id="rId13"/>
     <p:sldId id="284" r:id="rId14"/>
     <p:sldId id="262" r:id="rId15"/>
@@ -40,7 +40,7 @@
   <p:notesSz cx="6858000" cy="9144000"/>
   <p:embeddedFontLst>
     <p:embeddedFont>
-      <p:font typeface="Source Sans Pro" panose="020B0604020202020204" charset="0"/>
+      <p:font typeface="Source Sans Pro" panose="020B0604020202020204" pitchFamily="34" charset="0"/>
       <p:regular r:id="rId30"/>
       <p:bold r:id="rId31"/>
       <p:italic r:id="rId32"/>
@@ -276,7 +276,38 @@
       </a:defRPr>
     </a:lvl9pPr>
   </p:defaultTextStyle>
+  <p:extLst>
+    <p:ext uri="{EFAFB233-063F-42B5-8137-9DF3F51BA10A}">
+      <p15:sldGuideLst xmlns:p15="http://schemas.microsoft.com/office/powerpoint/2012/main"/>
+    </p:ext>
+  </p:extLst>
 </p:presentation>
+</file>
+
+<file path=ppt/commentAuthors.xml><?xml version="1.0" encoding="utf-8"?>
+<p:cmAuthorLst xmlns:a="http://schemas.openxmlformats.org/drawingml/2006/main" xmlns:r="http://schemas.openxmlformats.org/officeDocument/2006/relationships" xmlns:p="http://schemas.openxmlformats.org/presentationml/2006/main">
+  <p:cmAuthor id="1" name="Jess Alcalde" initials="JA" lastIdx="2" clrIdx="0">
+    <p:extLst>
+      <p:ext uri="{19B8F6BF-5375-455C-9EA6-DF929625EA0E}">
+        <p15:presenceInfo xmlns:p15="http://schemas.microsoft.com/office/powerpoint/2012/main" userId="2d2542868fd61133" providerId="Windows Live"/>
+      </p:ext>
+    </p:extLst>
+  </p:cmAuthor>
+</p:cmAuthorLst>
+</file>
+
+<file path=ppt/comments/comment1.xml><?xml version="1.0" encoding="utf-8"?>
+<p:cmLst xmlns:a="http://schemas.openxmlformats.org/drawingml/2006/main" xmlns:r="http://schemas.openxmlformats.org/officeDocument/2006/relationships" xmlns:p="http://schemas.openxmlformats.org/presentationml/2006/main">
+  <p:cm authorId="1" dt="2019-07-02T22:02:11.394" idx="2">
+    <p:pos x="5406" y="2851"/>
+    <p:text>Need to Change Delta Formula</p:text>
+    <p:extLst>
+      <p:ext uri="{C676402C-5697-4E1C-873F-D02D1690AC5C}">
+        <p15:threadingInfo xmlns:p15="http://schemas.microsoft.com/office/powerpoint/2012/main" timeZoneBias="240"/>
+      </p:ext>
+    </p:extLst>
+  </p:cm>
+</p:cmLst>
 </file>
 
 <file path=ppt/notesMasters/notesMaster1.xml><?xml version="1.0" encoding="utf-8"?>
@@ -829,7 +860,7 @@
   <p:cSld>
     <p:spTree>
       <p:nvGrpSpPr>
-        <p:cNvPr id="1" name="Shape 204"/>
+        <p:cNvPr id="1" name="Shape 117"/>
         <p:cNvGrpSpPr/>
         <p:nvPr/>
       </p:nvGrpSpPr>
@@ -843,7 +874,7 @@
       </p:grpSpPr>
       <p:sp>
         <p:nvSpPr>
-          <p:cNvPr id="205" name="Google Shape;205;g35ed75ccf_033:notes"/>
+          <p:cNvPr id="118" name="Google Shape;118;p:notes"/>
           <p:cNvSpPr>
             <a:spLocks noGrp="1" noRot="1" noChangeAspect="1"/>
           </p:cNvSpPr>
@@ -884,7 +915,7 @@
       </p:sp>
       <p:sp>
         <p:nvSpPr>
-          <p:cNvPr id="206" name="Google Shape;206;g35ed75ccf_033:notes"/>
+          <p:cNvPr id="119" name="Google Shape;119;p:notes"/>
           <p:cNvSpPr txBox="1">
             <a:spLocks noGrp="1"/>
           </p:cNvSpPr>
@@ -916,14 +947,14 @@
               </a:spcAft>
               <a:buNone/>
             </a:pPr>
-            <a:endParaRPr/>
+            <a:endParaRPr dirty="0"/>
           </a:p>
         </p:txBody>
       </p:sp>
     </p:spTree>
     <p:extLst>
       <p:ext uri="{BB962C8B-B14F-4D97-AF65-F5344CB8AC3E}">
-        <p14:creationId xmlns:p14="http://schemas.microsoft.com/office/powerpoint/2010/main" val="1343269669"/>
+        <p14:creationId xmlns:p14="http://schemas.microsoft.com/office/powerpoint/2010/main" val="1438587332"/>
       </p:ext>
     </p:extLst>
   </p:cSld>
@@ -1032,7 +1063,7 @@
     </p:spTree>
     <p:extLst>
       <p:ext uri="{BB962C8B-B14F-4D97-AF65-F5344CB8AC3E}">
-        <p14:creationId xmlns:p14="http://schemas.microsoft.com/office/powerpoint/2010/main" val="1420398377"/>
+        <p14:creationId xmlns:p14="http://schemas.microsoft.com/office/powerpoint/2010/main" val="1343269669"/>
       </p:ext>
     </p:extLst>
   </p:cSld>
@@ -2979,7 +3010,7 @@
   <p:cSld>
     <p:spTree>
       <p:nvGrpSpPr>
-        <p:cNvPr id="1" name="Shape 117"/>
+        <p:cNvPr id="1" name="Shape 135"/>
         <p:cNvGrpSpPr/>
         <p:nvPr/>
       </p:nvGrpSpPr>
@@ -2993,7 +3024,7 @@
       </p:grpSpPr>
       <p:sp>
         <p:nvSpPr>
-          <p:cNvPr id="118" name="Google Shape;118;p:notes"/>
+          <p:cNvPr id="136" name="Google Shape;136;g35f391192_017:notes"/>
           <p:cNvSpPr>
             <a:spLocks noGrp="1" noRot="1" noChangeAspect="1"/>
           </p:cNvSpPr>
@@ -3034,7 +3065,7 @@
       </p:sp>
       <p:sp>
         <p:nvSpPr>
-          <p:cNvPr id="119" name="Google Shape;119;p:notes"/>
+          <p:cNvPr id="137" name="Google Shape;137;g35f391192_017:notes"/>
           <p:cNvSpPr txBox="1">
             <a:spLocks noGrp="1"/>
           </p:cNvSpPr>
@@ -3175,6 +3206,11 @@
         </p:txBody>
       </p:sp>
     </p:spTree>
+    <p:extLst>
+      <p:ext uri="{BB962C8B-B14F-4D97-AF65-F5344CB8AC3E}">
+        <p14:creationId xmlns:p14="http://schemas.microsoft.com/office/powerpoint/2010/main" val="2611851967"/>
+      </p:ext>
+    </p:extLst>
   </p:cSld>
   <p:clrMapOvr>
     <a:masterClrMapping/>
@@ -3291,7 +3327,7 @@
   <p:cSld>
     <p:spTree>
       <p:nvGrpSpPr>
-        <p:cNvPr id="1" name="Shape 291"/>
+        <p:cNvPr id="1" name="Shape 117"/>
         <p:cNvGrpSpPr/>
         <p:nvPr/>
       </p:nvGrpSpPr>
@@ -3305,7 +3341,7 @@
       </p:grpSpPr>
       <p:sp>
         <p:nvSpPr>
-          <p:cNvPr id="292" name="Google Shape;292;g35ed75ccf_0113:notes"/>
+          <p:cNvPr id="118" name="Google Shape;118;p:notes"/>
           <p:cNvSpPr>
             <a:spLocks noGrp="1" noRot="1" noChangeAspect="1"/>
           </p:cNvSpPr>
@@ -3346,7 +3382,7 @@
       </p:sp>
       <p:sp>
         <p:nvSpPr>
-          <p:cNvPr id="293" name="Google Shape;293;g35ed75ccf_0113:notes"/>
+          <p:cNvPr id="119" name="Google Shape;119;p:notes"/>
           <p:cNvSpPr txBox="1">
             <a:spLocks noGrp="1"/>
           </p:cNvSpPr>
@@ -3369,6 +3405,31 @@
           </a:bodyPr>
           <a:lstStyle/>
           <a:p>
+            <a:pPr marL="0" marR="0" lvl="0" indent="0" algn="l" defTabSz="914400" rtl="0" eaLnBrk="1" fontAlgn="auto" latinLnBrk="0" hangingPunct="1">
+              <a:lnSpc>
+                <a:spcPct val="100000"/>
+              </a:lnSpc>
+              <a:spcBef>
+                <a:spcPts val="0"/>
+              </a:spcBef>
+              <a:spcAft>
+                <a:spcPts val="0"/>
+              </a:spcAft>
+              <a:buClr>
+                <a:srgbClr val="000000"/>
+              </a:buClr>
+              <a:buSzPts val="1400"/>
+              <a:buFont typeface="Arial"/>
+              <a:buNone/>
+              <a:tabLst/>
+              <a:defRPr/>
+            </a:pPr>
+            <a:r>
+              <a:rPr lang="en-US" sz="1100" b="1" dirty="0"/>
+              <a:t>Uses  punctuation, bolds, repetition of statements, degree modifiers, conjunction and other textual features to qualify a text as “Positive”, “Neutral", or “Negative”</a:t>
+            </a:r>
+          </a:p>
+          <a:p>
             <a:pPr marL="0" lvl="0" indent="0" algn="l" rtl="0">
               <a:spcBef>
                 <a:spcPts val="0"/>
@@ -3378,16 +3439,11 @@
               </a:spcAft>
               <a:buNone/>
             </a:pPr>
-            <a:endParaRPr/>
+            <a:endParaRPr dirty="0"/>
           </a:p>
         </p:txBody>
       </p:sp>
     </p:spTree>
-    <p:extLst>
-      <p:ext uri="{BB962C8B-B14F-4D97-AF65-F5344CB8AC3E}">
-        <p14:creationId xmlns:p14="http://schemas.microsoft.com/office/powerpoint/2010/main" val="4176766734"/>
-      </p:ext>
-    </p:extLst>
   </p:cSld>
   <p:clrMapOvr>
     <a:masterClrMapping/>
@@ -3494,7 +3550,7 @@
     </p:spTree>
     <p:extLst>
       <p:ext uri="{BB962C8B-B14F-4D97-AF65-F5344CB8AC3E}">
-        <p14:creationId xmlns:p14="http://schemas.microsoft.com/office/powerpoint/2010/main" val="2894679237"/>
+        <p14:creationId xmlns:p14="http://schemas.microsoft.com/office/powerpoint/2010/main" val="1420398377"/>
       </p:ext>
     </p:extLst>
   </p:cSld>
@@ -3509,7 +3565,7 @@
   <p:cSld>
     <p:spTree>
       <p:nvGrpSpPr>
-        <p:cNvPr id="1" name="Shape 204"/>
+        <p:cNvPr id="1" name="Shape 291"/>
         <p:cNvGrpSpPr/>
         <p:nvPr/>
       </p:nvGrpSpPr>
@@ -3523,7 +3579,7 @@
       </p:grpSpPr>
       <p:sp>
         <p:nvSpPr>
-          <p:cNvPr id="205" name="Google Shape;205;g35ed75ccf_033:notes"/>
+          <p:cNvPr id="292" name="Google Shape;292;g35ed75ccf_0113:notes"/>
           <p:cNvSpPr>
             <a:spLocks noGrp="1" noRot="1" noChangeAspect="1"/>
           </p:cNvSpPr>
@@ -3564,7 +3620,7 @@
       </p:sp>
       <p:sp>
         <p:nvSpPr>
-          <p:cNvPr id="206" name="Google Shape;206;g35ed75ccf_033:notes"/>
+          <p:cNvPr id="293" name="Google Shape;293;g35ed75ccf_0113:notes"/>
           <p:cNvSpPr txBox="1">
             <a:spLocks noGrp="1"/>
           </p:cNvSpPr>
@@ -3603,7 +3659,7 @@
     </p:spTree>
     <p:extLst>
       <p:ext uri="{BB962C8B-B14F-4D97-AF65-F5344CB8AC3E}">
-        <p14:creationId xmlns:p14="http://schemas.microsoft.com/office/powerpoint/2010/main" val="3368948289"/>
+        <p14:creationId xmlns:p14="http://schemas.microsoft.com/office/powerpoint/2010/main" val="4176766734"/>
       </p:ext>
     </p:extLst>
   </p:cSld>
@@ -9331,16 +9387,8 @@
               <a:buNone/>
             </a:pPr>
             <a:r>
-              <a:rPr lang="en-US" dirty="0" smtClean="0"/>
-              <a:t>Media Sentiment and </a:t>
-            </a:r>
-            <a:r>
               <a:rPr lang="en-US" dirty="0"/>
-              <a:t>t</a:t>
-            </a:r>
-            <a:r>
-              <a:rPr lang="en-US" dirty="0" smtClean="0"/>
-              <a:t>he Stock Market</a:t>
+              <a:t>Media Sentiment and the Stock Market</a:t>
             </a:r>
             <a:endParaRPr dirty="0"/>
           </a:p>
@@ -9359,7 +9407,7 @@
   <p:cSld>
     <p:spTree>
       <p:nvGrpSpPr>
-        <p:cNvPr id="1" name="Shape 207"/>
+        <p:cNvPr id="1" name="Shape 120"/>
         <p:cNvGrpSpPr/>
         <p:nvPr/>
       </p:nvGrpSpPr>
@@ -9373,45 +9421,117 @@
       </p:grpSpPr>
       <p:sp>
         <p:nvSpPr>
-          <p:cNvPr id="211" name="Google Shape;211;p30"/>
+          <p:cNvPr id="121" name="Google Shape;121;p20"/>
           <p:cNvSpPr txBox="1">
             <a:spLocks noGrp="1"/>
           </p:cNvSpPr>
           <p:nvPr>
-            <p:ph type="subTitle" idx="4294967295"/>
+            <p:ph type="title"/>
           </p:nvPr>
         </p:nvSpPr>
         <p:spPr>
           <a:xfrm>
-            <a:off x="685800" y="2697085"/>
-            <a:ext cx="7772400" cy="617700"/>
+            <a:off x="832475" y="168450"/>
+            <a:ext cx="7951800" cy="973500"/>
           </a:xfrm>
           <a:prstGeom prst="rect">
             <a:avLst/>
           </a:prstGeom>
+          <a:ln>
+            <a:noFill/>
+          </a:ln>
         </p:spPr>
         <p:txBody>
-          <a:bodyPr spcFirstLastPara="1" wrap="square" lIns="91425" tIns="91425" rIns="91425" bIns="91425" anchor="t" anchorCtr="0">
+          <a:bodyPr spcFirstLastPara="1" wrap="square" lIns="91425" tIns="91425" rIns="91425" bIns="91425" anchor="ctr" anchorCtr="0">
             <a:noAutofit/>
           </a:bodyPr>
           <a:lstStyle/>
           <a:p>
             <a:pPr marL="0" lvl="0" indent="0" algn="l" rtl="0">
               <a:spcBef>
-                <a:spcPts val="600"/>
+                <a:spcPts val="0"/>
               </a:spcBef>
               <a:spcAft>
                 <a:spcPts val="0"/>
               </a:spcAft>
               <a:buNone/>
             </a:pPr>
-            <a:endParaRPr sz="2400" b="1" dirty="0"/>
+            <a:r>
+              <a:rPr lang="en-US" dirty="0"/>
+              <a:t>Completing the Data Set</a:t>
+            </a:r>
+            <a:endParaRPr dirty="0"/>
           </a:p>
         </p:txBody>
       </p:sp>
-      <p:sp>
-        <p:nvSpPr>
-          <p:cNvPr id="214" name="Google Shape;214;p30"/>
+      <p:pic>
+        <p:nvPicPr>
+          <p:cNvPr id="2" name="Picture 1">
+            <a:extLst>
+              <a:ext uri="{FF2B5EF4-FFF2-40B4-BE49-F238E27FC236}">
+                <a16:creationId xmlns:a16="http://schemas.microsoft.com/office/drawing/2014/main" id="{7EFDADC8-6077-478E-9BE2-5D1CDB86E103}"/>
+              </a:ext>
+            </a:extLst>
+          </p:cNvPr>
+          <p:cNvPicPr>
+            <a:picLocks noChangeAspect="1"/>
+          </p:cNvPicPr>
+          <p:nvPr/>
+        </p:nvPicPr>
+        <p:blipFill>
+          <a:blip r:embed="rId3"/>
+          <a:stretch>
+            <a:fillRect/>
+          </a:stretch>
+        </p:blipFill>
+        <p:spPr>
+          <a:xfrm>
+            <a:off x="629436" y="4526325"/>
+            <a:ext cx="7951801" cy="1732176"/>
+          </a:xfrm>
+          <a:prstGeom prst="rect">
+            <a:avLst/>
+          </a:prstGeom>
+          <a:ln w="31750">
+            <a:solidFill>
+              <a:srgbClr val="FF0000"/>
+            </a:solidFill>
+          </a:ln>
+        </p:spPr>
+      </p:pic>
+      <p:pic>
+        <p:nvPicPr>
+          <p:cNvPr id="3" name="Picture 2">
+            <a:extLst>
+              <a:ext uri="{FF2B5EF4-FFF2-40B4-BE49-F238E27FC236}">
+                <a16:creationId xmlns:a16="http://schemas.microsoft.com/office/drawing/2014/main" id="{572B158F-8ED3-4F3F-8A3F-13AC04322FB0}"/>
+              </a:ext>
+            </a:extLst>
+          </p:cNvPr>
+          <p:cNvPicPr>
+            <a:picLocks noChangeAspect="1"/>
+          </p:cNvPicPr>
+          <p:nvPr/>
+        </p:nvPicPr>
+        <p:blipFill>
+          <a:blip r:embed="rId4"/>
+          <a:stretch>
+            <a:fillRect/>
+          </a:stretch>
+        </p:blipFill>
+        <p:spPr>
+          <a:xfrm>
+            <a:off x="629436" y="2070295"/>
+            <a:ext cx="6957226" cy="1983451"/>
+          </a:xfrm>
+          <a:prstGeom prst="rect">
+            <a:avLst/>
+          </a:prstGeom>
+        </p:spPr>
+      </p:pic>
+      <p:sp>
+        <p:nvSpPr>
+          <p:cNvPr id="123" name="Google Shape;123;p20"/>
           <p:cNvSpPr txBox="1">
             <a:spLocks noGrp="1"/>
           </p:cNvSpPr>
@@ -9451,10 +9571,341 @@
           </a:p>
         </p:txBody>
       </p:sp>
+      <p:sp>
+        <p:nvSpPr>
+          <p:cNvPr id="8" name="Google Shape;296;p37">
+            <a:extLst>
+              <a:ext uri="{FF2B5EF4-FFF2-40B4-BE49-F238E27FC236}">
+                <a16:creationId xmlns:a16="http://schemas.microsoft.com/office/drawing/2014/main" id="{125DE5AD-8D98-445A-9AA5-6DCF0149EA2A}"/>
+              </a:ext>
+            </a:extLst>
+          </p:cNvPr>
+          <p:cNvSpPr txBox="1">
+            <a:spLocks/>
+          </p:cNvSpPr>
+          <p:nvPr/>
+        </p:nvSpPr>
+        <p:spPr>
+          <a:xfrm>
+            <a:off x="584653" y="1141950"/>
+            <a:ext cx="8282812" cy="882403"/>
+          </a:xfrm>
+          <a:prstGeom prst="rect">
+            <a:avLst/>
+          </a:prstGeom>
+          <a:noFill/>
+          <a:ln>
+            <a:noFill/>
+          </a:ln>
+        </p:spPr>
+        <p:txBody>
+          <a:bodyPr spcFirstLastPara="1" wrap="square" lIns="91425" tIns="91425" rIns="91425" bIns="91425" anchor="t" anchorCtr="0">
+            <a:noAutofit/>
+          </a:bodyPr>
+          <a:lstStyle>
+            <a:defPPr marR="0" lvl="0" algn="l" rtl="0">
+              <a:lnSpc>
+                <a:spcPct val="100000"/>
+              </a:lnSpc>
+              <a:spcBef>
+                <a:spcPts val="0"/>
+              </a:spcBef>
+              <a:spcAft>
+                <a:spcPts val="0"/>
+              </a:spcAft>
+            </a:defPPr>
+            <a:lvl1pPr marL="457200" marR="0" lvl="0" indent="-431800" algn="l" rtl="0">
+              <a:lnSpc>
+                <a:spcPct val="100000"/>
+              </a:lnSpc>
+              <a:spcBef>
+                <a:spcPts val="600"/>
+              </a:spcBef>
+              <a:spcAft>
+                <a:spcPts val="0"/>
+              </a:spcAft>
+              <a:buClr>
+                <a:srgbClr val="2F3848"/>
+              </a:buClr>
+              <a:buSzPts val="3200"/>
+              <a:buFont typeface="Source Sans Pro"/>
+              <a:buChar char="■"/>
+              <a:defRPr sz="3200" b="0" i="0" u="none" strike="noStrike" cap="none">
+                <a:solidFill>
+                  <a:srgbClr val="2F3848"/>
+                </a:solidFill>
+                <a:latin typeface="Source Sans Pro"/>
+                <a:ea typeface="Source Sans Pro"/>
+                <a:cs typeface="Source Sans Pro"/>
+                <a:sym typeface="Source Sans Pro"/>
+              </a:defRPr>
+            </a:lvl1pPr>
+            <a:lvl2pPr marL="914400" marR="0" lvl="1" indent="-381000" algn="l" rtl="0">
+              <a:lnSpc>
+                <a:spcPct val="100000"/>
+              </a:lnSpc>
+              <a:spcBef>
+                <a:spcPts val="0"/>
+              </a:spcBef>
+              <a:spcAft>
+                <a:spcPts val="0"/>
+              </a:spcAft>
+              <a:buClr>
+                <a:srgbClr val="2F3848"/>
+              </a:buClr>
+              <a:buSzPts val="2400"/>
+              <a:buFont typeface="Source Sans Pro"/>
+              <a:buChar char="○"/>
+              <a:defRPr sz="2400" b="0" i="0" u="none" strike="noStrike" cap="none">
+                <a:solidFill>
+                  <a:srgbClr val="2F3848"/>
+                </a:solidFill>
+                <a:latin typeface="Source Sans Pro"/>
+                <a:ea typeface="Source Sans Pro"/>
+                <a:cs typeface="Source Sans Pro"/>
+                <a:sym typeface="Source Sans Pro"/>
+              </a:defRPr>
+            </a:lvl2pPr>
+            <a:lvl3pPr marL="1371600" marR="0" lvl="2" indent="-381000" algn="l" rtl="0">
+              <a:lnSpc>
+                <a:spcPct val="100000"/>
+              </a:lnSpc>
+              <a:spcBef>
+                <a:spcPts val="0"/>
+              </a:spcBef>
+              <a:spcAft>
+                <a:spcPts val="0"/>
+              </a:spcAft>
+              <a:buClr>
+                <a:srgbClr val="2F3848"/>
+              </a:buClr>
+              <a:buSzPts val="2400"/>
+              <a:buFont typeface="Source Sans Pro"/>
+              <a:buChar char="■"/>
+              <a:defRPr sz="2400" b="0" i="0" u="none" strike="noStrike" cap="none">
+                <a:solidFill>
+                  <a:srgbClr val="2F3848"/>
+                </a:solidFill>
+                <a:latin typeface="Source Sans Pro"/>
+                <a:ea typeface="Source Sans Pro"/>
+                <a:cs typeface="Source Sans Pro"/>
+                <a:sym typeface="Source Sans Pro"/>
+              </a:defRPr>
+            </a:lvl3pPr>
+            <a:lvl4pPr marL="1828800" marR="0" lvl="3" indent="-342900" algn="l" rtl="0">
+              <a:lnSpc>
+                <a:spcPct val="100000"/>
+              </a:lnSpc>
+              <a:spcBef>
+                <a:spcPts val="0"/>
+              </a:spcBef>
+              <a:spcAft>
+                <a:spcPts val="0"/>
+              </a:spcAft>
+              <a:buClr>
+                <a:srgbClr val="2F3848"/>
+              </a:buClr>
+              <a:buSzPts val="1800"/>
+              <a:buFont typeface="Source Sans Pro"/>
+              <a:buChar char="●"/>
+              <a:defRPr sz="1800" b="0" i="0" u="none" strike="noStrike" cap="none">
+                <a:solidFill>
+                  <a:srgbClr val="2F3848"/>
+                </a:solidFill>
+                <a:latin typeface="Source Sans Pro"/>
+                <a:ea typeface="Source Sans Pro"/>
+                <a:cs typeface="Source Sans Pro"/>
+                <a:sym typeface="Source Sans Pro"/>
+              </a:defRPr>
+            </a:lvl4pPr>
+            <a:lvl5pPr marL="2286000" marR="0" lvl="4" indent="-342900" algn="l" rtl="0">
+              <a:lnSpc>
+                <a:spcPct val="100000"/>
+              </a:lnSpc>
+              <a:spcBef>
+                <a:spcPts val="0"/>
+              </a:spcBef>
+              <a:spcAft>
+                <a:spcPts val="0"/>
+              </a:spcAft>
+              <a:buClr>
+                <a:srgbClr val="2F3848"/>
+              </a:buClr>
+              <a:buSzPts val="1800"/>
+              <a:buFont typeface="Source Sans Pro"/>
+              <a:buChar char="○"/>
+              <a:defRPr sz="1800" b="0" i="0" u="none" strike="noStrike" cap="none">
+                <a:solidFill>
+                  <a:srgbClr val="2F3848"/>
+                </a:solidFill>
+                <a:latin typeface="Source Sans Pro"/>
+                <a:ea typeface="Source Sans Pro"/>
+                <a:cs typeface="Source Sans Pro"/>
+                <a:sym typeface="Source Sans Pro"/>
+              </a:defRPr>
+            </a:lvl5pPr>
+            <a:lvl6pPr marL="2743200" marR="0" lvl="5" indent="-342900" algn="l" rtl="0">
+              <a:lnSpc>
+                <a:spcPct val="100000"/>
+              </a:lnSpc>
+              <a:spcBef>
+                <a:spcPts val="0"/>
+              </a:spcBef>
+              <a:spcAft>
+                <a:spcPts val="0"/>
+              </a:spcAft>
+              <a:buClr>
+                <a:srgbClr val="2F3848"/>
+              </a:buClr>
+              <a:buSzPts val="1800"/>
+              <a:buFont typeface="Source Sans Pro"/>
+              <a:buChar char="■"/>
+              <a:defRPr sz="1800" b="0" i="0" u="none" strike="noStrike" cap="none">
+                <a:solidFill>
+                  <a:srgbClr val="2F3848"/>
+                </a:solidFill>
+                <a:latin typeface="Source Sans Pro"/>
+                <a:ea typeface="Source Sans Pro"/>
+                <a:cs typeface="Source Sans Pro"/>
+                <a:sym typeface="Source Sans Pro"/>
+              </a:defRPr>
+            </a:lvl6pPr>
+            <a:lvl7pPr marL="3200400" marR="0" lvl="6" indent="-342900" algn="l" rtl="0">
+              <a:lnSpc>
+                <a:spcPct val="100000"/>
+              </a:lnSpc>
+              <a:spcBef>
+                <a:spcPts val="0"/>
+              </a:spcBef>
+              <a:spcAft>
+                <a:spcPts val="0"/>
+              </a:spcAft>
+              <a:buClr>
+                <a:srgbClr val="2F3848"/>
+              </a:buClr>
+              <a:buSzPts val="1800"/>
+              <a:buFont typeface="Source Sans Pro"/>
+              <a:buChar char="●"/>
+              <a:defRPr sz="1800" b="0" i="0" u="none" strike="noStrike" cap="none">
+                <a:solidFill>
+                  <a:srgbClr val="2F3848"/>
+                </a:solidFill>
+                <a:latin typeface="Source Sans Pro"/>
+                <a:ea typeface="Source Sans Pro"/>
+                <a:cs typeface="Source Sans Pro"/>
+                <a:sym typeface="Source Sans Pro"/>
+              </a:defRPr>
+            </a:lvl7pPr>
+            <a:lvl8pPr marL="3657600" marR="0" lvl="7" indent="-342900" algn="l" rtl="0">
+              <a:lnSpc>
+                <a:spcPct val="100000"/>
+              </a:lnSpc>
+              <a:spcBef>
+                <a:spcPts val="0"/>
+              </a:spcBef>
+              <a:spcAft>
+                <a:spcPts val="0"/>
+              </a:spcAft>
+              <a:buClr>
+                <a:srgbClr val="2F3848"/>
+              </a:buClr>
+              <a:buSzPts val="1800"/>
+              <a:buFont typeface="Source Sans Pro"/>
+              <a:buChar char="○"/>
+              <a:defRPr sz="1800" b="0" i="0" u="none" strike="noStrike" cap="none">
+                <a:solidFill>
+                  <a:srgbClr val="2F3848"/>
+                </a:solidFill>
+                <a:latin typeface="Source Sans Pro"/>
+                <a:ea typeface="Source Sans Pro"/>
+                <a:cs typeface="Source Sans Pro"/>
+                <a:sym typeface="Source Sans Pro"/>
+              </a:defRPr>
+            </a:lvl8pPr>
+            <a:lvl9pPr marL="4114800" marR="0" lvl="8" indent="-342900" algn="l" rtl="0">
+              <a:lnSpc>
+                <a:spcPct val="100000"/>
+              </a:lnSpc>
+              <a:spcBef>
+                <a:spcPts val="0"/>
+              </a:spcBef>
+              <a:spcAft>
+                <a:spcPts val="0"/>
+              </a:spcAft>
+              <a:buClr>
+                <a:srgbClr val="2F3848"/>
+              </a:buClr>
+              <a:buSzPts val="1800"/>
+              <a:buFont typeface="Source Sans Pro"/>
+              <a:buChar char="■"/>
+              <a:defRPr sz="1800" b="0" i="0" u="none" strike="noStrike" cap="none">
+                <a:solidFill>
+                  <a:srgbClr val="2F3848"/>
+                </a:solidFill>
+                <a:latin typeface="Source Sans Pro"/>
+                <a:ea typeface="Source Sans Pro"/>
+                <a:cs typeface="Source Sans Pro"/>
+                <a:sym typeface="Source Sans Pro"/>
+              </a:defRPr>
+            </a:lvl9pPr>
+          </a:lstStyle>
+          <a:p>
+            <a:pPr marL="0" indent="0">
+              <a:buFont typeface="Source Sans Pro"/>
+              <a:buNone/>
+            </a:pPr>
+            <a:r>
+              <a:rPr lang="en-US" sz="2400" b="1" dirty="0"/>
+              <a:t>In order to compare changes in price, we looked at the delta (Close – Open)/Open to be able to normalize data over time.</a:t>
+            </a:r>
+          </a:p>
+        </p:txBody>
+      </p:sp>
+      <p:cxnSp>
+        <p:nvCxnSpPr>
+          <p:cNvPr id="6" name="Straight Arrow Connector 5">
+            <a:extLst>
+              <a:ext uri="{FF2B5EF4-FFF2-40B4-BE49-F238E27FC236}">
+                <a16:creationId xmlns:a16="http://schemas.microsoft.com/office/drawing/2014/main" id="{97918059-C371-46D5-9A62-FCB8DB13049A}"/>
+              </a:ext>
+            </a:extLst>
+          </p:cNvPr>
+          <p:cNvCxnSpPr>
+            <a:stCxn id="3" idx="2"/>
+          </p:cNvCxnSpPr>
+          <p:nvPr/>
+        </p:nvCxnSpPr>
+        <p:spPr>
+          <a:xfrm>
+            <a:off x="4108049" y="4053746"/>
+            <a:ext cx="0" cy="508729"/>
+          </a:xfrm>
+          <a:prstGeom prst="straightConnector1">
+            <a:avLst/>
+          </a:prstGeom>
+          <a:ln>
+            <a:tailEnd type="triangle"/>
+          </a:ln>
+        </p:spPr>
+        <p:style>
+          <a:lnRef idx="1">
+            <a:schemeClr val="accent1"/>
+          </a:lnRef>
+          <a:fillRef idx="0">
+            <a:schemeClr val="accent1"/>
+          </a:fillRef>
+          <a:effectRef idx="0">
+            <a:schemeClr val="accent1"/>
+          </a:effectRef>
+          <a:fontRef idx="minor">
+            <a:schemeClr val="tx1"/>
+          </a:fontRef>
+        </p:style>
+      </p:cxnSp>
     </p:spTree>
     <p:extLst>
       <p:ext uri="{BB962C8B-B14F-4D97-AF65-F5344CB8AC3E}">
-        <p14:creationId xmlns:p14="http://schemas.microsoft.com/office/powerpoint/2010/main" val="1169752848"/>
+        <p14:creationId xmlns:p14="http://schemas.microsoft.com/office/powerpoint/2010/main" val="869776508"/>
       </p:ext>
     </p:extLst>
   </p:cSld>
@@ -9483,44 +9934,6 @@
       </p:grpSpPr>
       <p:sp>
         <p:nvSpPr>
-          <p:cNvPr id="211" name="Google Shape;211;p30"/>
-          <p:cNvSpPr txBox="1">
-            <a:spLocks noGrp="1"/>
-          </p:cNvSpPr>
-          <p:nvPr>
-            <p:ph type="subTitle" idx="4294967295"/>
-          </p:nvPr>
-        </p:nvSpPr>
-        <p:spPr>
-          <a:xfrm>
-            <a:off x="685800" y="2697085"/>
-            <a:ext cx="7772400" cy="617700"/>
-          </a:xfrm>
-          <a:prstGeom prst="rect">
-            <a:avLst/>
-          </a:prstGeom>
-        </p:spPr>
-        <p:txBody>
-          <a:bodyPr spcFirstLastPara="1" wrap="square" lIns="91425" tIns="91425" rIns="91425" bIns="91425" anchor="t" anchorCtr="0">
-            <a:noAutofit/>
-          </a:bodyPr>
-          <a:lstStyle/>
-          <a:p>
-            <a:pPr marL="0" lvl="0" indent="0" algn="l" rtl="0">
-              <a:spcBef>
-                <a:spcPts val="600"/>
-              </a:spcBef>
-              <a:spcAft>
-                <a:spcPts val="0"/>
-              </a:spcAft>
-              <a:buNone/>
-            </a:pPr>
-            <a:endParaRPr sz="2400" b="1" dirty="0"/>
-          </a:p>
-        </p:txBody>
-      </p:sp>
-      <p:sp>
-        <p:nvSpPr>
           <p:cNvPr id="214" name="Google Shape;214;p30"/>
           <p:cNvSpPr txBox="1">
             <a:spLocks noGrp="1"/>
@@ -9561,10 +9974,402 @@
           </a:p>
         </p:txBody>
       </p:sp>
+      <p:pic>
+        <p:nvPicPr>
+          <p:cNvPr id="2" name="Picture 1">
+            <a:extLst>
+              <a:ext uri="{FF2B5EF4-FFF2-40B4-BE49-F238E27FC236}">
+                <a16:creationId xmlns:a16="http://schemas.microsoft.com/office/drawing/2014/main" id="{2D30674F-D7E1-40D6-881A-5D09AEA6F4D2}"/>
+              </a:ext>
+            </a:extLst>
+          </p:cNvPr>
+          <p:cNvPicPr>
+            <a:picLocks noChangeAspect="1"/>
+          </p:cNvPicPr>
+          <p:nvPr/>
+        </p:nvPicPr>
+        <p:blipFill>
+          <a:blip r:embed="rId3"/>
+          <a:stretch>
+            <a:fillRect/>
+          </a:stretch>
+        </p:blipFill>
+        <p:spPr>
+          <a:xfrm>
+            <a:off x="250031" y="3594851"/>
+            <a:ext cx="8643937" cy="2630342"/>
+          </a:xfrm>
+          <a:prstGeom prst="rect">
+            <a:avLst/>
+          </a:prstGeom>
+        </p:spPr>
+      </p:pic>
+      <p:pic>
+        <p:nvPicPr>
+          <p:cNvPr id="3" name="Picture 2">
+            <a:extLst>
+              <a:ext uri="{FF2B5EF4-FFF2-40B4-BE49-F238E27FC236}">
+                <a16:creationId xmlns:a16="http://schemas.microsoft.com/office/drawing/2014/main" id="{54C56256-13CC-4D68-B2D6-072096171BEB}"/>
+              </a:ext>
+            </a:extLst>
+          </p:cNvPr>
+          <p:cNvPicPr>
+            <a:picLocks noChangeAspect="1"/>
+          </p:cNvPicPr>
+          <p:nvPr/>
+        </p:nvPicPr>
+        <p:blipFill>
+          <a:blip r:embed="rId4"/>
+          <a:stretch>
+            <a:fillRect/>
+          </a:stretch>
+        </p:blipFill>
+        <p:spPr>
+          <a:xfrm>
+            <a:off x="250031" y="1033464"/>
+            <a:ext cx="8470107" cy="2229686"/>
+          </a:xfrm>
+          <a:prstGeom prst="rect">
+            <a:avLst/>
+          </a:prstGeom>
+        </p:spPr>
+      </p:pic>
+      <p:cxnSp>
+        <p:nvCxnSpPr>
+          <p:cNvPr id="5" name="Connector: Elbow 4">
+            <a:extLst>
+              <a:ext uri="{FF2B5EF4-FFF2-40B4-BE49-F238E27FC236}">
+                <a16:creationId xmlns:a16="http://schemas.microsoft.com/office/drawing/2014/main" id="{F760F5CF-1983-4458-A90E-142776979514}"/>
+              </a:ext>
+            </a:extLst>
+          </p:cNvPr>
+          <p:cNvCxnSpPr>
+            <a:stCxn id="3" idx="2"/>
+            <a:endCxn id="2" idx="0"/>
+          </p:cNvCxnSpPr>
+          <p:nvPr/>
+        </p:nvCxnSpPr>
+        <p:spPr>
+          <a:xfrm rot="16200000" flipH="1">
+            <a:off x="4362692" y="3385542"/>
+            <a:ext cx="331701" cy="86915"/>
+          </a:xfrm>
+          <a:prstGeom prst="bentConnector3">
+            <a:avLst/>
+          </a:prstGeom>
+          <a:ln>
+            <a:tailEnd type="triangle"/>
+          </a:ln>
+        </p:spPr>
+        <p:style>
+          <a:lnRef idx="1">
+            <a:schemeClr val="accent1"/>
+          </a:lnRef>
+          <a:fillRef idx="0">
+            <a:schemeClr val="accent1"/>
+          </a:fillRef>
+          <a:effectRef idx="0">
+            <a:schemeClr val="accent1"/>
+          </a:effectRef>
+          <a:fontRef idx="minor">
+            <a:schemeClr val="tx1"/>
+          </a:fontRef>
+        </p:style>
+      </p:cxnSp>
+      <p:sp>
+        <p:nvSpPr>
+          <p:cNvPr id="8" name="Google Shape;296;p37">
+            <a:extLst>
+              <a:ext uri="{FF2B5EF4-FFF2-40B4-BE49-F238E27FC236}">
+                <a16:creationId xmlns:a16="http://schemas.microsoft.com/office/drawing/2014/main" id="{E1855198-2F46-407B-80D4-71A5B1169C82}"/>
+              </a:ext>
+            </a:extLst>
+          </p:cNvPr>
+          <p:cNvSpPr txBox="1">
+            <a:spLocks/>
+          </p:cNvSpPr>
+          <p:nvPr/>
+        </p:nvSpPr>
+        <p:spPr>
+          <a:xfrm>
+            <a:off x="437326" y="43120"/>
+            <a:ext cx="8282812" cy="882403"/>
+          </a:xfrm>
+          <a:prstGeom prst="rect">
+            <a:avLst/>
+          </a:prstGeom>
+          <a:noFill/>
+          <a:ln>
+            <a:noFill/>
+          </a:ln>
+        </p:spPr>
+        <p:txBody>
+          <a:bodyPr spcFirstLastPara="1" wrap="square" lIns="91425" tIns="91425" rIns="91425" bIns="91425" anchor="t" anchorCtr="0">
+            <a:noAutofit/>
+          </a:bodyPr>
+          <a:lstStyle>
+            <a:defPPr marR="0" lvl="0" algn="l" rtl="0">
+              <a:lnSpc>
+                <a:spcPct val="100000"/>
+              </a:lnSpc>
+              <a:spcBef>
+                <a:spcPts val="0"/>
+              </a:spcBef>
+              <a:spcAft>
+                <a:spcPts val="0"/>
+              </a:spcAft>
+            </a:defPPr>
+            <a:lvl1pPr marL="457200" marR="0" lvl="0" indent="-431800" algn="l" rtl="0">
+              <a:lnSpc>
+                <a:spcPct val="100000"/>
+              </a:lnSpc>
+              <a:spcBef>
+                <a:spcPts val="600"/>
+              </a:spcBef>
+              <a:spcAft>
+                <a:spcPts val="0"/>
+              </a:spcAft>
+              <a:buClr>
+                <a:srgbClr val="2F3848"/>
+              </a:buClr>
+              <a:buSzPts val="3200"/>
+              <a:buFont typeface="Source Sans Pro"/>
+              <a:buChar char="■"/>
+              <a:defRPr sz="3200" b="0" i="0" u="none" strike="noStrike" cap="none">
+                <a:solidFill>
+                  <a:srgbClr val="2F3848"/>
+                </a:solidFill>
+                <a:latin typeface="Source Sans Pro"/>
+                <a:ea typeface="Source Sans Pro"/>
+                <a:cs typeface="Source Sans Pro"/>
+                <a:sym typeface="Source Sans Pro"/>
+              </a:defRPr>
+            </a:lvl1pPr>
+            <a:lvl2pPr marL="914400" marR="0" lvl="1" indent="-381000" algn="l" rtl="0">
+              <a:lnSpc>
+                <a:spcPct val="100000"/>
+              </a:lnSpc>
+              <a:spcBef>
+                <a:spcPts val="0"/>
+              </a:spcBef>
+              <a:spcAft>
+                <a:spcPts val="0"/>
+              </a:spcAft>
+              <a:buClr>
+                <a:srgbClr val="2F3848"/>
+              </a:buClr>
+              <a:buSzPts val="2400"/>
+              <a:buFont typeface="Source Sans Pro"/>
+              <a:buChar char="○"/>
+              <a:defRPr sz="2400" b="0" i="0" u="none" strike="noStrike" cap="none">
+                <a:solidFill>
+                  <a:srgbClr val="2F3848"/>
+                </a:solidFill>
+                <a:latin typeface="Source Sans Pro"/>
+                <a:ea typeface="Source Sans Pro"/>
+                <a:cs typeface="Source Sans Pro"/>
+                <a:sym typeface="Source Sans Pro"/>
+              </a:defRPr>
+            </a:lvl2pPr>
+            <a:lvl3pPr marL="1371600" marR="0" lvl="2" indent="-381000" algn="l" rtl="0">
+              <a:lnSpc>
+                <a:spcPct val="100000"/>
+              </a:lnSpc>
+              <a:spcBef>
+                <a:spcPts val="0"/>
+              </a:spcBef>
+              <a:spcAft>
+                <a:spcPts val="0"/>
+              </a:spcAft>
+              <a:buClr>
+                <a:srgbClr val="2F3848"/>
+              </a:buClr>
+              <a:buSzPts val="2400"/>
+              <a:buFont typeface="Source Sans Pro"/>
+              <a:buChar char="■"/>
+              <a:defRPr sz="2400" b="0" i="0" u="none" strike="noStrike" cap="none">
+                <a:solidFill>
+                  <a:srgbClr val="2F3848"/>
+                </a:solidFill>
+                <a:latin typeface="Source Sans Pro"/>
+                <a:ea typeface="Source Sans Pro"/>
+                <a:cs typeface="Source Sans Pro"/>
+                <a:sym typeface="Source Sans Pro"/>
+              </a:defRPr>
+            </a:lvl3pPr>
+            <a:lvl4pPr marL="1828800" marR="0" lvl="3" indent="-342900" algn="l" rtl="0">
+              <a:lnSpc>
+                <a:spcPct val="100000"/>
+              </a:lnSpc>
+              <a:spcBef>
+                <a:spcPts val="0"/>
+              </a:spcBef>
+              <a:spcAft>
+                <a:spcPts val="0"/>
+              </a:spcAft>
+              <a:buClr>
+                <a:srgbClr val="2F3848"/>
+              </a:buClr>
+              <a:buSzPts val="1800"/>
+              <a:buFont typeface="Source Sans Pro"/>
+              <a:buChar char="●"/>
+              <a:defRPr sz="1800" b="0" i="0" u="none" strike="noStrike" cap="none">
+                <a:solidFill>
+                  <a:srgbClr val="2F3848"/>
+                </a:solidFill>
+                <a:latin typeface="Source Sans Pro"/>
+                <a:ea typeface="Source Sans Pro"/>
+                <a:cs typeface="Source Sans Pro"/>
+                <a:sym typeface="Source Sans Pro"/>
+              </a:defRPr>
+            </a:lvl4pPr>
+            <a:lvl5pPr marL="2286000" marR="0" lvl="4" indent="-342900" algn="l" rtl="0">
+              <a:lnSpc>
+                <a:spcPct val="100000"/>
+              </a:lnSpc>
+              <a:spcBef>
+                <a:spcPts val="0"/>
+              </a:spcBef>
+              <a:spcAft>
+                <a:spcPts val="0"/>
+              </a:spcAft>
+              <a:buClr>
+                <a:srgbClr val="2F3848"/>
+              </a:buClr>
+              <a:buSzPts val="1800"/>
+              <a:buFont typeface="Source Sans Pro"/>
+              <a:buChar char="○"/>
+              <a:defRPr sz="1800" b="0" i="0" u="none" strike="noStrike" cap="none">
+                <a:solidFill>
+                  <a:srgbClr val="2F3848"/>
+                </a:solidFill>
+                <a:latin typeface="Source Sans Pro"/>
+                <a:ea typeface="Source Sans Pro"/>
+                <a:cs typeface="Source Sans Pro"/>
+                <a:sym typeface="Source Sans Pro"/>
+              </a:defRPr>
+            </a:lvl5pPr>
+            <a:lvl6pPr marL="2743200" marR="0" lvl="5" indent="-342900" algn="l" rtl="0">
+              <a:lnSpc>
+                <a:spcPct val="100000"/>
+              </a:lnSpc>
+              <a:spcBef>
+                <a:spcPts val="0"/>
+              </a:spcBef>
+              <a:spcAft>
+                <a:spcPts val="0"/>
+              </a:spcAft>
+              <a:buClr>
+                <a:srgbClr val="2F3848"/>
+              </a:buClr>
+              <a:buSzPts val="1800"/>
+              <a:buFont typeface="Source Sans Pro"/>
+              <a:buChar char="■"/>
+              <a:defRPr sz="1800" b="0" i="0" u="none" strike="noStrike" cap="none">
+                <a:solidFill>
+                  <a:srgbClr val="2F3848"/>
+                </a:solidFill>
+                <a:latin typeface="Source Sans Pro"/>
+                <a:ea typeface="Source Sans Pro"/>
+                <a:cs typeface="Source Sans Pro"/>
+                <a:sym typeface="Source Sans Pro"/>
+              </a:defRPr>
+            </a:lvl6pPr>
+            <a:lvl7pPr marL="3200400" marR="0" lvl="6" indent="-342900" algn="l" rtl="0">
+              <a:lnSpc>
+                <a:spcPct val="100000"/>
+              </a:lnSpc>
+              <a:spcBef>
+                <a:spcPts val="0"/>
+              </a:spcBef>
+              <a:spcAft>
+                <a:spcPts val="0"/>
+              </a:spcAft>
+              <a:buClr>
+                <a:srgbClr val="2F3848"/>
+              </a:buClr>
+              <a:buSzPts val="1800"/>
+              <a:buFont typeface="Source Sans Pro"/>
+              <a:buChar char="●"/>
+              <a:defRPr sz="1800" b="0" i="0" u="none" strike="noStrike" cap="none">
+                <a:solidFill>
+                  <a:srgbClr val="2F3848"/>
+                </a:solidFill>
+                <a:latin typeface="Source Sans Pro"/>
+                <a:ea typeface="Source Sans Pro"/>
+                <a:cs typeface="Source Sans Pro"/>
+                <a:sym typeface="Source Sans Pro"/>
+              </a:defRPr>
+            </a:lvl7pPr>
+            <a:lvl8pPr marL="3657600" marR="0" lvl="7" indent="-342900" algn="l" rtl="0">
+              <a:lnSpc>
+                <a:spcPct val="100000"/>
+              </a:lnSpc>
+              <a:spcBef>
+                <a:spcPts val="0"/>
+              </a:spcBef>
+              <a:spcAft>
+                <a:spcPts val="0"/>
+              </a:spcAft>
+              <a:buClr>
+                <a:srgbClr val="2F3848"/>
+              </a:buClr>
+              <a:buSzPts val="1800"/>
+              <a:buFont typeface="Source Sans Pro"/>
+              <a:buChar char="○"/>
+              <a:defRPr sz="1800" b="0" i="0" u="none" strike="noStrike" cap="none">
+                <a:solidFill>
+                  <a:srgbClr val="2F3848"/>
+                </a:solidFill>
+                <a:latin typeface="Source Sans Pro"/>
+                <a:ea typeface="Source Sans Pro"/>
+                <a:cs typeface="Source Sans Pro"/>
+                <a:sym typeface="Source Sans Pro"/>
+              </a:defRPr>
+            </a:lvl8pPr>
+            <a:lvl9pPr marL="4114800" marR="0" lvl="8" indent="-342900" algn="l" rtl="0">
+              <a:lnSpc>
+                <a:spcPct val="100000"/>
+              </a:lnSpc>
+              <a:spcBef>
+                <a:spcPts val="0"/>
+              </a:spcBef>
+              <a:spcAft>
+                <a:spcPts val="0"/>
+              </a:spcAft>
+              <a:buClr>
+                <a:srgbClr val="2F3848"/>
+              </a:buClr>
+              <a:buSzPts val="1800"/>
+              <a:buFont typeface="Source Sans Pro"/>
+              <a:buChar char="■"/>
+              <a:defRPr sz="1800" b="0" i="0" u="none" strike="noStrike" cap="none">
+                <a:solidFill>
+                  <a:srgbClr val="2F3848"/>
+                </a:solidFill>
+                <a:latin typeface="Source Sans Pro"/>
+                <a:ea typeface="Source Sans Pro"/>
+                <a:cs typeface="Source Sans Pro"/>
+                <a:sym typeface="Source Sans Pro"/>
+              </a:defRPr>
+            </a:lvl9pPr>
+          </a:lstStyle>
+          <a:p>
+            <a:pPr marL="0" indent="0">
+              <a:buFont typeface="Source Sans Pro"/>
+              <a:buNone/>
+            </a:pPr>
+            <a:r>
+              <a:rPr lang="en-US" sz="2400" b="1" dirty="0"/>
+              <a:t>We calculated the mean sentiment score by date and merged that mean score with the financial data</a:t>
+            </a:r>
+          </a:p>
+        </p:txBody>
+      </p:sp>
     </p:spTree>
     <p:extLst>
       <p:ext uri="{BB962C8B-B14F-4D97-AF65-F5344CB8AC3E}">
-        <p14:creationId xmlns:p14="http://schemas.microsoft.com/office/powerpoint/2010/main" val="3005740573"/>
+        <p14:creationId xmlns:p14="http://schemas.microsoft.com/office/powerpoint/2010/main" val="1169752848"/>
       </p:ext>
     </p:extLst>
   </p:cSld>
@@ -9621,19 +10426,7 @@
             </a:pPr>
             <a:r>
               <a:rPr lang="en-US" dirty="0"/>
-              <a:t>They </a:t>
-            </a:r>
-            <a:r>
-              <a:rPr lang="en-US" dirty="0" smtClean="0"/>
-              <a:t>analysis suggests an inconsistent short run change in the value of the indexes correlating with an </a:t>
-            </a:r>
-            <a:r>
-              <a:rPr lang="en-US" dirty="0"/>
-              <a:t>increase in </a:t>
-            </a:r>
-            <a:r>
-              <a:rPr lang="en-US" dirty="0" smtClean="0"/>
-              <a:t>optimistic or pessimistic local news. Neutral sentiment was infrequent and had little to no direct impact. </a:t>
+              <a:t>They analysis suggests an inconsistent short run change in the value of the indexes correlating with an increase in optimistic or pessimistic local news. Neutral sentiment was infrequent and had little to no direct impact. </a:t>
             </a:r>
             <a:endParaRPr dirty="0"/>
           </a:p>
@@ -9741,7 +10534,7 @@
               <a:buNone/>
             </a:pPr>
             <a:r>
-              <a:rPr lang="en-US" dirty="0" smtClean="0"/>
+              <a:rPr lang="en-US" dirty="0"/>
               <a:t>Further analysis would be necessary to identify the impact of specific types of news on related sectors of the market.</a:t>
             </a:r>
             <a:endParaRPr dirty="0"/>
@@ -9855,7 +10648,7 @@
               <a:buNone/>
             </a:pPr>
             <a:r>
-              <a:rPr lang="en" sz="4000" dirty="0" smtClean="0">
+              <a:rPr lang="en" sz="4000" dirty="0">
                 <a:solidFill>
                   <a:srgbClr val="FFFFFF"/>
                 </a:solidFill>
@@ -9863,7 +10656,7 @@
               <a:t>Are “cancelled” com</a:t>
             </a:r>
             <a:r>
-              <a:rPr lang="en-US" sz="4000" dirty="0" smtClean="0">
+              <a:rPr lang="en-US" sz="4000" dirty="0">
                 <a:solidFill>
                   <a:srgbClr val="FFFFFF"/>
                 </a:solidFill>
@@ -9871,7 +10664,7 @@
               <a:t>p</a:t>
             </a:r>
             <a:r>
-              <a:rPr lang="en" sz="4000" dirty="0" smtClean="0">
+              <a:rPr lang="en" sz="4000" dirty="0">
                 <a:solidFill>
                   <a:srgbClr val="FFFFFF"/>
                 </a:solidFill>
@@ -9921,7 +10714,7 @@
               <a:buNone/>
             </a:pPr>
             <a:r>
-              <a:rPr lang="en" sz="3000" dirty="0" smtClean="0"/>
+              <a:rPr lang="en" sz="3000" dirty="0"/>
               <a:t>How influential is a public scandal on a company’s stock price?</a:t>
             </a:r>
             <a:endParaRPr sz="3000" dirty="0"/>
@@ -10077,7 +10870,7 @@
               <a:buNone/>
             </a:pPr>
             <a:r>
-              <a:rPr lang="en-US" sz="2400" b="1" dirty="0" smtClean="0"/>
+              <a:rPr lang="en-US" sz="2400" b="1" dirty="0"/>
               <a:t>Wells Fargo</a:t>
             </a:r>
             <a:endParaRPr sz="2400" b="1" dirty="0"/>
@@ -10129,7 +10922,7 @@
               <a:buNone/>
             </a:pPr>
             <a:r>
-              <a:rPr lang="en-US" sz="2400" b="1" dirty="0" smtClean="0"/>
+              <a:rPr lang="en-US" sz="2400" b="1" dirty="0"/>
               <a:t>Tesla</a:t>
             </a:r>
             <a:endParaRPr sz="2400" b="1" dirty="0"/>
@@ -10140,15 +10933,7 @@
             </a:pPr>
             <a:r>
               <a:rPr lang="en-US" sz="1900" dirty="0"/>
-              <a:t>The Securities and Exchange Commission asks a federal judge to hold Musk in contempt for violating a settlement deal reached last year. Musk tweeted on February 19 that "Tesla made 0 cars in 2011, but will make around 500k in 2019</a:t>
-            </a:r>
-            <a:r>
-              <a:rPr lang="en-US" sz="1900" dirty="0" smtClean="0"/>
-              <a:t>." </a:t>
-            </a:r>
-            <a:r>
-              <a:rPr lang="en-US" sz="1900" dirty="0"/>
-              <a:t>The tweets about production appear to violate the agreement reached in 2018 to have all of Musk’s company communications vetted.</a:t>
+              <a:t>The Securities and Exchange Commission asks a federal judge to hold Musk in contempt for violating a settlement deal reached last year. Musk tweeted on February 19 that "Tesla made 0 cars in 2011, but will make around 500k in 2019." The tweets about production appear to violate the agreement reached in 2018 to have all of Musk’s company communications vetted.</a:t>
             </a:r>
             <a:endParaRPr sz="1900" dirty="0"/>
           </a:p>
@@ -10183,22 +10968,17 @@
               <a:buNone/>
             </a:pPr>
             <a:r>
-              <a:rPr lang="en-US" sz="2400" b="1" dirty="0" smtClean="0"/>
+              <a:rPr lang="en-US" sz="2400" b="1" dirty="0"/>
               <a:t>Wayfair</a:t>
             </a:r>
-            <a:endParaRPr lang="en-US" sz="2400" b="1" dirty="0"/>
           </a:p>
           <a:p>
             <a:pPr marL="0" lvl="0" indent="0">
               <a:buNone/>
             </a:pPr>
             <a:r>
-              <a:rPr lang="en-US" sz="1900" dirty="0" smtClean="0"/>
-              <a:t>Wayfair employees </a:t>
-            </a:r>
-            <a:r>
               <a:rPr lang="en-US" sz="1900" dirty="0"/>
-              <a:t>walk out of the company’s Boston-based HQs to protest Wayfair’s $200K sale of furniture to a contractor of migrant detention camps at the southern border.</a:t>
+              <a:t>Wayfair employees walk out of the company’s Boston-based HQs to protest Wayfair’s $200K sale of furniture to a contractor of migrant detention camps at the southern border.</a:t>
             </a:r>
             <a:endParaRPr sz="1900" dirty="0"/>
           </a:p>
@@ -10239,7 +11019,7 @@
               <a:buNone/>
             </a:pPr>
             <a:r>
-              <a:rPr lang="en" dirty="0" smtClean="0"/>
+              <a:rPr lang="en" dirty="0"/>
               <a:t>BAD BUSINESS PRACTICIES AND MEDIA SCRUTINY</a:t>
             </a:r>
             <a:endParaRPr dirty="0"/>
@@ -10348,7 +11128,7 @@
               <a:buNone/>
             </a:pPr>
             <a:r>
-              <a:rPr lang="en-US" sz="2400" b="1" dirty="0" smtClean="0"/>
+              <a:rPr lang="en-US" sz="2400" b="1" dirty="0"/>
               <a:t>This slide and the next few should show the results from the individual companies</a:t>
             </a:r>
             <a:endParaRPr sz="2400" b="1" dirty="0"/>
@@ -10836,14 +11616,14 @@
               <a:t>Christian </a:t>
             </a:r>
             <a:r>
-              <a:rPr lang="en-US" sz="3600" b="1" dirty="0" err="1" smtClean="0">
+              <a:rPr lang="en-US" sz="3600" b="1" dirty="0" err="1">
                 <a:solidFill>
                   <a:srgbClr val="F05768"/>
                 </a:solidFill>
               </a:rPr>
               <a:t>Attard</a:t>
             </a:r>
-            <a:endParaRPr lang="en-US" sz="3600" b="1" dirty="0" smtClean="0">
+            <a:endParaRPr lang="en-US" sz="3600" b="1" dirty="0">
               <a:solidFill>
                 <a:srgbClr val="F05768"/>
               </a:solidFill>
@@ -10854,7 +11634,7 @@
               <a:buNone/>
             </a:pPr>
             <a:r>
-              <a:rPr lang="en-US" sz="3600" b="1" dirty="0" smtClean="0">
+              <a:rPr lang="en-US" sz="3600" b="1" dirty="0">
                 <a:solidFill>
                   <a:srgbClr val="F05768"/>
                 </a:solidFill>
@@ -10862,14 +11642,14 @@
               <a:t>Jess </a:t>
             </a:r>
             <a:r>
-              <a:rPr lang="en-US" sz="3600" b="1" dirty="0" err="1" smtClean="0">
+              <a:rPr lang="en-US" sz="3600" b="1" dirty="0" err="1">
                 <a:solidFill>
                   <a:srgbClr val="F05768"/>
                 </a:solidFill>
               </a:rPr>
               <a:t>Alcalde</a:t>
             </a:r>
-            <a:endParaRPr lang="en-US" sz="3600" b="1" dirty="0" smtClean="0">
+            <a:endParaRPr lang="en-US" sz="3600" b="1" dirty="0">
               <a:solidFill>
                 <a:srgbClr val="F05768"/>
               </a:solidFill>
@@ -10880,7 +11660,7 @@
               <a:buNone/>
             </a:pPr>
             <a:r>
-              <a:rPr lang="en-US" sz="3600" b="1" dirty="0" smtClean="0">
+              <a:rPr lang="en-US" sz="3600" b="1" dirty="0">
                 <a:solidFill>
                   <a:srgbClr val="F05768"/>
                 </a:solidFill>
@@ -10888,14 +11668,14 @@
               <a:t>Nitin </a:t>
             </a:r>
             <a:r>
-              <a:rPr lang="en-US" sz="3600" b="1" dirty="0" err="1" smtClean="0">
+              <a:rPr lang="en-US" sz="3600" b="1" dirty="0" err="1">
                 <a:solidFill>
                   <a:srgbClr val="F05768"/>
                 </a:solidFill>
               </a:rPr>
               <a:t>Khade</a:t>
             </a:r>
-            <a:endParaRPr lang="en-US" sz="3600" b="1" dirty="0" smtClean="0">
+            <a:endParaRPr lang="en-US" sz="3600" b="1" dirty="0">
               <a:solidFill>
                 <a:srgbClr val="F05768"/>
               </a:solidFill>
@@ -10906,7 +11686,7 @@
               <a:buNone/>
             </a:pPr>
             <a:r>
-              <a:rPr lang="en-US" sz="3600" b="1" dirty="0" smtClean="0">
+              <a:rPr lang="en-US" sz="3600" b="1" dirty="0">
                 <a:solidFill>
                   <a:srgbClr val="F05768"/>
                 </a:solidFill>
@@ -11347,7 +12127,7 @@
               <a:buNone/>
             </a:pPr>
             <a:r>
-              <a:rPr lang="en-US" dirty="0" smtClean="0"/>
+              <a:rPr lang="en-US" dirty="0"/>
               <a:t>I will insert analysis here once I see the plots</a:t>
             </a:r>
             <a:endParaRPr dirty="0"/>
@@ -11581,7 +12361,7 @@
               <a:buNone/>
             </a:pPr>
             <a:r>
-              <a:rPr lang="en" dirty="0" smtClean="0"/>
+              <a:rPr lang="en" dirty="0"/>
               <a:t>This will be closing slide</a:t>
             </a:r>
             <a:endParaRPr dirty="0"/>
@@ -11691,7 +12471,7 @@
               <a:buNone/>
             </a:pPr>
             <a:r>
-              <a:rPr lang="en" dirty="0" smtClean="0"/>
+              <a:rPr lang="en" dirty="0"/>
               <a:t>Resources</a:t>
             </a:r>
             <a:endParaRPr dirty="0"/>
@@ -11728,7 +12508,6 @@
               <a:rPr lang="en-US" sz="2400" dirty="0"/>
               <a:t> </a:t>
             </a:r>
-            <a:endParaRPr lang="en-US" sz="2400" dirty="0" smtClean="0"/>
           </a:p>
           <a:p>
             <a:pPr marL="342900" indent="-342900"/>
@@ -11740,11 +12519,6 @@
               </a:rPr>
               <a:t> </a:t>
             </a:r>
-            <a:endParaRPr lang="en-US" sz="2400" dirty="0" smtClean="0">
-              <a:solidFill>
-                <a:srgbClr val="2F3848"/>
-              </a:solidFill>
-            </a:endParaRPr>
           </a:p>
           <a:p>
             <a:pPr marL="342900" indent="-342900"/>
@@ -11752,7 +12526,6 @@
               <a:rPr lang="en-US" sz="2400" dirty="0"/>
               <a:t> </a:t>
             </a:r>
-            <a:endParaRPr lang="en-US" sz="2400" dirty="0" smtClean="0"/>
           </a:p>
           <a:p>
             <a:pPr marL="342900" indent="-342900"/>
@@ -11764,11 +12537,6 @@
               </a:rPr>
               <a:t> </a:t>
             </a:r>
-            <a:endParaRPr lang="en-US" sz="2400" dirty="0" smtClean="0">
-              <a:solidFill>
-                <a:srgbClr val="2F3848"/>
-              </a:solidFill>
-            </a:endParaRPr>
           </a:p>
           <a:p>
             <a:pPr marL="342900" indent="-342900"/>
@@ -11776,7 +12544,7 @@
               <a:rPr lang="en-US" sz="2400" dirty="0"/>
               <a:t> </a:t>
             </a:r>
-            <a:endParaRPr lang="en-US" sz="2400" dirty="0" smtClean="0">
+            <a:endParaRPr lang="en-US" sz="2400" dirty="0">
               <a:solidFill>
                 <a:srgbClr val="2F3848"/>
               </a:solidFill>
@@ -11886,14 +12654,14 @@
               <a:buNone/>
             </a:pPr>
             <a:r>
-              <a:rPr lang="en-US" dirty="0" smtClean="0"/>
+              <a:rPr lang="en-US" dirty="0"/>
               <a:t>Thanks!</a:t>
             </a:r>
             <a:br>
-              <a:rPr lang="en-US" dirty="0" smtClean="0"/>
+              <a:rPr lang="en-US" dirty="0"/>
             </a:br>
             <a:r>
-              <a:rPr lang="en-US" dirty="0" smtClean="0">
+              <a:rPr lang="en-US" dirty="0">
                 <a:solidFill>
                   <a:schemeClr val="bg1"/>
                 </a:solidFill>
@@ -11985,7 +12753,7 @@
               <a:buNone/>
             </a:pPr>
             <a:r>
-              <a:rPr lang="en" dirty="0" smtClean="0"/>
+              <a:rPr lang="en" dirty="0"/>
               <a:t>What is the impact of news on the stock market?</a:t>
             </a:r>
             <a:endParaRPr dirty="0"/>
@@ -12027,7 +12795,7 @@
               <a:buNone/>
             </a:pPr>
             <a:r>
-              <a:rPr lang="en" dirty="0" smtClean="0"/>
+              <a:rPr lang="en" dirty="0"/>
               <a:t>Good, bad, or neutral we will explore the effects of news on the S&amp;P 500 and Nasdaq indexes</a:t>
             </a:r>
             <a:endParaRPr dirty="0"/>
@@ -12047,7 +12815,7 @@
   <p:cSld>
     <p:spTree>
       <p:nvGrpSpPr>
-        <p:cNvPr id="1" name="Shape 120"/>
+        <p:cNvPr id="1" name="Shape 138"/>
         <p:cNvGrpSpPr/>
         <p:nvPr/>
       </p:nvGrpSpPr>
@@ -12061,7 +12829,134 @@
       </p:grpSpPr>
       <p:sp>
         <p:nvSpPr>
-          <p:cNvPr id="121" name="Google Shape;121;p20"/>
+          <p:cNvPr id="139" name="Google Shape;139;p22"/>
+          <p:cNvSpPr txBox="1">
+            <a:spLocks noGrp="1"/>
+          </p:cNvSpPr>
+          <p:nvPr>
+            <p:ph type="body" idx="1"/>
+          </p:nvPr>
+        </p:nvSpPr>
+        <p:spPr>
+          <a:xfrm>
+            <a:off x="577500" y="1700542"/>
+            <a:ext cx="3994500" cy="4074000"/>
+          </a:xfrm>
+          <a:prstGeom prst="rect">
+            <a:avLst/>
+          </a:prstGeom>
+        </p:spPr>
+        <p:txBody>
+          <a:bodyPr spcFirstLastPara="1" wrap="square" lIns="91425" tIns="91425" rIns="91425" bIns="91425" anchor="t" anchorCtr="0">
+            <a:noAutofit/>
+          </a:bodyPr>
+          <a:lstStyle/>
+          <a:p>
+            <a:pPr marL="0" lvl="0" indent="0" algn="l" rtl="0">
+              <a:spcBef>
+                <a:spcPts val="600"/>
+              </a:spcBef>
+              <a:spcAft>
+                <a:spcPts val="0"/>
+              </a:spcAft>
+              <a:buNone/>
+            </a:pPr>
+            <a:r>
+              <a:rPr lang="en-US" sz="3000" b="1" dirty="0"/>
+              <a:t>S&amp;P 500</a:t>
+            </a:r>
+          </a:p>
+          <a:p>
+            <a:pPr marL="0" lvl="0" indent="0">
+              <a:buNone/>
+            </a:pPr>
+            <a:r>
+              <a:rPr lang="en-US" dirty="0"/>
+              <a:t>The </a:t>
+            </a:r>
+            <a:r>
+              <a:rPr lang="en-US" b="1" dirty="0"/>
+              <a:t>S&amp;P 500</a:t>
+            </a:r>
+            <a:r>
+              <a:rPr lang="en-US" dirty="0"/>
+              <a:t>, or just the S&amp;P, is an American stock market index based on the market capitalizations of 500 large companies having common stock listed on the NYSE, NASDAQ, or the </a:t>
+            </a:r>
+            <a:r>
+              <a:rPr lang="en-US" dirty="0" err="1"/>
+              <a:t>Cboe</a:t>
+            </a:r>
+            <a:r>
+              <a:rPr lang="en-US" dirty="0"/>
+              <a:t> BZX Exchange.</a:t>
+            </a:r>
+            <a:endParaRPr sz="3000" b="1" dirty="0"/>
+          </a:p>
+        </p:txBody>
+      </p:sp>
+      <p:sp>
+        <p:nvSpPr>
+          <p:cNvPr id="140" name="Google Shape;140;p22"/>
+          <p:cNvSpPr txBox="1">
+            <a:spLocks noGrp="1"/>
+          </p:cNvSpPr>
+          <p:nvPr>
+            <p:ph type="body" idx="2"/>
+          </p:nvPr>
+        </p:nvSpPr>
+        <p:spPr>
+          <a:xfrm>
+            <a:off x="4572000" y="1700542"/>
+            <a:ext cx="3994500" cy="4074000"/>
+          </a:xfrm>
+          <a:prstGeom prst="rect">
+            <a:avLst/>
+          </a:prstGeom>
+        </p:spPr>
+        <p:txBody>
+          <a:bodyPr spcFirstLastPara="1" wrap="square" lIns="91425" tIns="91425" rIns="91425" bIns="91425" anchor="t" anchorCtr="0">
+            <a:noAutofit/>
+          </a:bodyPr>
+          <a:lstStyle/>
+          <a:p>
+            <a:pPr marL="0" lvl="0" indent="0" algn="l" rtl="0">
+              <a:spcBef>
+                <a:spcPts val="600"/>
+              </a:spcBef>
+              <a:spcAft>
+                <a:spcPts val="0"/>
+              </a:spcAft>
+              <a:buNone/>
+            </a:pPr>
+            <a:r>
+              <a:rPr lang="en-US" sz="3000" b="1" dirty="0"/>
+              <a:t>Nasdaq</a:t>
+            </a:r>
+            <a:endParaRPr sz="3000" b="1" dirty="0"/>
+          </a:p>
+          <a:p>
+            <a:pPr marL="0" lvl="0" indent="0">
+              <a:buNone/>
+            </a:pPr>
+            <a:r>
+              <a:rPr lang="en-US" dirty="0"/>
+              <a:t>The </a:t>
+            </a:r>
+            <a:r>
+              <a:rPr lang="en-US" b="1" dirty="0"/>
+              <a:t>NASDAQ Composite</a:t>
+            </a:r>
+            <a:r>
+              <a:rPr lang="en-US" dirty="0"/>
+              <a:t> is a stock market index of the common stocks and similar securities listed on the NASDAQ stock market. The composition of the NASDAQ Composite is heavily weighted towards information technology companies. </a:t>
+            </a:r>
+            <a:endParaRPr dirty="0"/>
+          </a:p>
+        </p:txBody>
+      </p:sp>
+      <p:sp>
+        <p:nvSpPr>
+          <p:cNvPr id="141" name="Google Shape;141;p22"/>
           <p:cNvSpPr txBox="1">
             <a:spLocks noGrp="1"/>
           </p:cNvSpPr>
@@ -12077,9 +12972,6 @@
           <a:prstGeom prst="rect">
             <a:avLst/>
           </a:prstGeom>
-          <a:ln>
-            <a:noFill/>
-          </a:ln>
         </p:spPr>
         <p:txBody>
           <a:bodyPr spcFirstLastPara="1" wrap="square" lIns="91425" tIns="91425" rIns="91425" bIns="91425" anchor="ctr" anchorCtr="0">
@@ -12097,8 +12989,8 @@
               <a:buNone/>
             </a:pPr>
             <a:r>
-              <a:rPr lang="en-US" dirty="0" smtClean="0"/>
-              <a:t>SENTIMENT ANALYSIS</a:t>
+              <a:rPr lang="en" dirty="0"/>
+              <a:t>MARKET INDEXES</a:t>
             </a:r>
             <a:endParaRPr dirty="0"/>
           </a:p>
@@ -12106,114 +12998,7 @@
       </p:sp>
       <p:sp>
         <p:nvSpPr>
-          <p:cNvPr id="122" name="Google Shape;122;p20"/>
-          <p:cNvSpPr txBox="1">
-            <a:spLocks noGrp="1"/>
-          </p:cNvSpPr>
-          <p:nvPr>
-            <p:ph type="body" idx="1"/>
-          </p:nvPr>
-        </p:nvSpPr>
-        <p:spPr>
-          <a:xfrm>
-            <a:off x="753150" y="1600200"/>
-            <a:ext cx="7637700" cy="4967700"/>
-          </a:xfrm>
-          <a:prstGeom prst="rect">
-            <a:avLst/>
-          </a:prstGeom>
-        </p:spPr>
-        <p:txBody>
-          <a:bodyPr spcFirstLastPara="1" wrap="square" lIns="91425" tIns="91425" rIns="91425" bIns="91425" anchor="t" anchorCtr="0">
-            <a:noAutofit/>
-          </a:bodyPr>
-          <a:lstStyle/>
-          <a:p>
-            <a:r>
-              <a:rPr lang="en-US" sz="2400" dirty="0" smtClean="0"/>
-              <a:t>Normalized weighted composite score</a:t>
-            </a:r>
-          </a:p>
-          <a:p>
-            <a:pPr marL="25400" lvl="0" indent="0" algn="l" rtl="0">
-              <a:spcBef>
-                <a:spcPts val="600"/>
-              </a:spcBef>
-              <a:spcAft>
-                <a:spcPts val="0"/>
-              </a:spcAft>
-              <a:buSzPts val="3200"/>
-              <a:buNone/>
-            </a:pPr>
-            <a:endParaRPr dirty="0"/>
-          </a:p>
-          <a:p>
-            <a:pPr>
-              <a:spcBef>
-                <a:spcPts val="0"/>
-              </a:spcBef>
-            </a:pPr>
-            <a:r>
-              <a:rPr lang="en-US" sz="2400" dirty="0" smtClean="0"/>
-              <a:t>Positive sentiment: compound score &gt;= 0.05</a:t>
-            </a:r>
-          </a:p>
-          <a:p>
-            <a:pPr marL="482600" lvl="1" indent="0">
-              <a:buSzPts val="3200"/>
-              <a:buNone/>
-            </a:pPr>
-            <a:r>
-              <a:rPr lang="en-US" dirty="0" smtClean="0"/>
-              <a:t>Neutral sentiment: (compound score &gt;= 0.05) and  compound score &lt; 0.05)</a:t>
-            </a:r>
-          </a:p>
-          <a:p>
-            <a:pPr marL="25400" lvl="0" indent="0" algn="l" rtl="0">
-              <a:spcBef>
-                <a:spcPts val="0"/>
-              </a:spcBef>
-              <a:spcAft>
-                <a:spcPts val="0"/>
-              </a:spcAft>
-              <a:buSzPts val="3200"/>
-              <a:buNone/>
-            </a:pPr>
-            <a:r>
-              <a:rPr lang="en-US" sz="2400" dirty="0" smtClean="0"/>
-              <a:t>        Negative sentiment: compound score &lt;= -0.05</a:t>
-            </a:r>
-          </a:p>
-          <a:p>
-            <a:pPr marL="25400" lvl="0" indent="0" algn="l" rtl="0">
-              <a:spcBef>
-                <a:spcPts val="0"/>
-              </a:spcBef>
-              <a:spcAft>
-                <a:spcPts val="0"/>
-              </a:spcAft>
-              <a:buSzPts val="3200"/>
-              <a:buNone/>
-            </a:pPr>
-            <a:endParaRPr lang="en-US" sz="2400" dirty="0" smtClean="0"/>
-          </a:p>
-          <a:p>
-            <a:pPr>
-              <a:spcBef>
-                <a:spcPts val="0"/>
-              </a:spcBef>
-            </a:pPr>
-            <a:r>
-              <a:rPr lang="en-US" sz="2400" dirty="0" smtClean="0"/>
-              <a:t>Ratios for proportions of text that fall in each category</a:t>
-            </a:r>
-            <a:endParaRPr sz="2400" dirty="0"/>
-          </a:p>
-        </p:txBody>
-      </p:sp>
-      <p:sp>
-        <p:nvSpPr>
-          <p:cNvPr id="123" name="Google Shape;123;p20"/>
+          <p:cNvPr id="142" name="Google Shape;142;p22"/>
           <p:cNvSpPr txBox="1">
             <a:spLocks noGrp="1"/>
           </p:cNvSpPr>
@@ -12280,169 +13065,6 @@
       </p:grpSpPr>
       <p:sp>
         <p:nvSpPr>
-          <p:cNvPr id="139" name="Google Shape;139;p22"/>
-          <p:cNvSpPr txBox="1">
-            <a:spLocks noGrp="1"/>
-          </p:cNvSpPr>
-          <p:nvPr>
-            <p:ph type="body" idx="1"/>
-          </p:nvPr>
-        </p:nvSpPr>
-        <p:spPr>
-          <a:xfrm>
-            <a:off x="577500" y="1700542"/>
-            <a:ext cx="3994500" cy="4074000"/>
-          </a:xfrm>
-          <a:prstGeom prst="rect">
-            <a:avLst/>
-          </a:prstGeom>
-        </p:spPr>
-        <p:txBody>
-          <a:bodyPr spcFirstLastPara="1" wrap="square" lIns="91425" tIns="91425" rIns="91425" bIns="91425" anchor="t" anchorCtr="0">
-            <a:noAutofit/>
-          </a:bodyPr>
-          <a:lstStyle/>
-          <a:p>
-            <a:pPr marL="0" lvl="0" indent="0" algn="l" rtl="0">
-              <a:spcBef>
-                <a:spcPts val="600"/>
-              </a:spcBef>
-              <a:spcAft>
-                <a:spcPts val="0"/>
-              </a:spcAft>
-              <a:buNone/>
-            </a:pPr>
-            <a:r>
-              <a:rPr lang="en-US" sz="3000" b="1" dirty="0" smtClean="0"/>
-              <a:t>S&amp;P 500</a:t>
-            </a:r>
-          </a:p>
-          <a:p>
-            <a:pPr marL="0" lvl="0" indent="0">
-              <a:buNone/>
-            </a:pPr>
-            <a:r>
-              <a:rPr lang="en-US" dirty="0"/>
-              <a:t>The </a:t>
-            </a:r>
-            <a:r>
-              <a:rPr lang="en-US" b="1" dirty="0"/>
-              <a:t>S&amp;P 500</a:t>
-            </a:r>
-            <a:r>
-              <a:rPr lang="en-US" dirty="0"/>
-              <a:t>, or just the S&amp;P, is an American stock market index based on the market capitalizations of 500 large companies having common stock listed on the NYSE, NASDAQ, or the </a:t>
-            </a:r>
-            <a:r>
-              <a:rPr lang="en-US" dirty="0" err="1"/>
-              <a:t>Cboe</a:t>
-            </a:r>
-            <a:r>
-              <a:rPr lang="en-US" dirty="0"/>
-              <a:t> BZX Exchange.</a:t>
-            </a:r>
-            <a:endParaRPr sz="3000" b="1" dirty="0"/>
-          </a:p>
-        </p:txBody>
-      </p:sp>
-      <p:sp>
-        <p:nvSpPr>
-          <p:cNvPr id="140" name="Google Shape;140;p22"/>
-          <p:cNvSpPr txBox="1">
-            <a:spLocks noGrp="1"/>
-          </p:cNvSpPr>
-          <p:nvPr>
-            <p:ph type="body" idx="2"/>
-          </p:nvPr>
-        </p:nvSpPr>
-        <p:spPr>
-          <a:xfrm>
-            <a:off x="4572000" y="1700542"/>
-            <a:ext cx="3994500" cy="4074000"/>
-          </a:xfrm>
-          <a:prstGeom prst="rect">
-            <a:avLst/>
-          </a:prstGeom>
-        </p:spPr>
-        <p:txBody>
-          <a:bodyPr spcFirstLastPara="1" wrap="square" lIns="91425" tIns="91425" rIns="91425" bIns="91425" anchor="t" anchorCtr="0">
-            <a:noAutofit/>
-          </a:bodyPr>
-          <a:lstStyle/>
-          <a:p>
-            <a:pPr marL="0" lvl="0" indent="0" algn="l" rtl="0">
-              <a:spcBef>
-                <a:spcPts val="600"/>
-              </a:spcBef>
-              <a:spcAft>
-                <a:spcPts val="0"/>
-              </a:spcAft>
-              <a:buNone/>
-            </a:pPr>
-            <a:r>
-              <a:rPr lang="en-US" sz="3000" b="1" dirty="0" smtClean="0"/>
-              <a:t>Nasdaq</a:t>
-            </a:r>
-            <a:endParaRPr sz="3000" b="1" dirty="0"/>
-          </a:p>
-          <a:p>
-            <a:pPr marL="0" lvl="0" indent="0">
-              <a:buNone/>
-            </a:pPr>
-            <a:r>
-              <a:rPr lang="en-US" dirty="0"/>
-              <a:t>The </a:t>
-            </a:r>
-            <a:r>
-              <a:rPr lang="en-US" b="1" dirty="0"/>
-              <a:t>NASDAQ </a:t>
-            </a:r>
-            <a:r>
-              <a:rPr lang="en-US" b="1" dirty="0" smtClean="0"/>
-              <a:t>Composite</a:t>
-            </a:r>
-            <a:r>
-              <a:rPr lang="en-US" dirty="0"/>
-              <a:t> is a stock market index of the common stocks and similar securities </a:t>
-            </a:r>
-            <a:r>
-              <a:rPr lang="en-US" dirty="0" smtClean="0"/>
-              <a:t>listed </a:t>
-            </a:r>
-            <a:r>
-              <a:rPr lang="en-US" dirty="0"/>
-              <a:t>on the NASDAQ stock market. </a:t>
-            </a:r>
-            <a:r>
-              <a:rPr lang="en-US" dirty="0" smtClean="0"/>
-              <a:t>The </a:t>
-            </a:r>
-            <a:r>
-              <a:rPr lang="en-US" dirty="0"/>
-              <a:t>composition of the NASDAQ Composite is heavily </a:t>
-            </a:r>
-            <a:r>
-              <a:rPr lang="en-US" dirty="0" smtClean="0"/>
-              <a:t>weighted towards</a:t>
-            </a:r>
-            <a:r>
-              <a:rPr lang="en-US" dirty="0"/>
-              <a:t> information </a:t>
-            </a:r>
-            <a:r>
-              <a:rPr lang="en-US" dirty="0" smtClean="0"/>
-              <a:t>technology companies</a:t>
-            </a:r>
-            <a:r>
-              <a:rPr lang="en-US" dirty="0"/>
-              <a:t>. </a:t>
-            </a:r>
-            <a:endParaRPr dirty="0"/>
-          </a:p>
-        </p:txBody>
-      </p:sp>
-      <p:sp>
-        <p:nvSpPr>
           <p:cNvPr id="141" name="Google Shape;141;p22"/>
           <p:cNvSpPr txBox="1">
             <a:spLocks noGrp="1"/>
@@ -12476,8 +13098,8 @@
               <a:buNone/>
             </a:pPr>
             <a:r>
-              <a:rPr lang="en" dirty="0" smtClean="0"/>
-              <a:t>MARKET INDEXES</a:t>
+              <a:rPr lang="en-US" dirty="0"/>
+              <a:t>Methodology</a:t>
             </a:r>
             <a:endParaRPr dirty="0"/>
           </a:p>
@@ -12525,7 +13147,149 @@
           </a:p>
         </p:txBody>
       </p:sp>
+      <p:sp>
+        <p:nvSpPr>
+          <p:cNvPr id="3" name="Text Placeholder 2">
+            <a:extLst>
+              <a:ext uri="{FF2B5EF4-FFF2-40B4-BE49-F238E27FC236}">
+                <a16:creationId xmlns:a16="http://schemas.microsoft.com/office/drawing/2014/main" id="{3E9AE2EB-C27B-4388-AEC1-13FF3F5B0760}"/>
+              </a:ext>
+            </a:extLst>
+          </p:cNvPr>
+          <p:cNvSpPr>
+            <a:spLocks noGrp="1"/>
+          </p:cNvSpPr>
+          <p:nvPr>
+            <p:ph type="body" idx="1"/>
+          </p:nvPr>
+        </p:nvSpPr>
+        <p:spPr/>
+        <p:txBody>
+          <a:bodyPr/>
+          <a:lstStyle/>
+          <a:p>
+            <a:pPr marL="0" lvl="0" indent="0">
+              <a:buNone/>
+            </a:pPr>
+            <a:r>
+              <a:rPr lang="en-US" b="1" dirty="0"/>
+              <a:t>We went through several iterations of news data sources, but eventually settled on the Contextual Web </a:t>
+            </a:r>
+            <a:r>
+              <a:rPr lang="en-US" b="1" dirty="0" err="1"/>
+              <a:t>NewsSearch</a:t>
+            </a:r>
+            <a:r>
+              <a:rPr lang="en-US" b="1" dirty="0"/>
+              <a:t> API. </a:t>
+            </a:r>
+          </a:p>
+          <a:p>
+            <a:pPr marL="0" lvl="0" indent="0">
+              <a:buNone/>
+            </a:pPr>
+            <a:endParaRPr lang="en-US" b="1" dirty="0"/>
+          </a:p>
+          <a:p>
+            <a:pPr marL="0" indent="0">
+              <a:buNone/>
+            </a:pPr>
+            <a:r>
+              <a:rPr lang="en-US" b="1" dirty="0"/>
+              <a:t>The API takes in a query "q" and returns an article headline, description, publishing date, keywords, URL and news provider.</a:t>
+            </a:r>
+          </a:p>
+          <a:p>
+            <a:pPr marL="0" lvl="0" indent="0">
+              <a:buNone/>
+            </a:pPr>
+            <a:endParaRPr lang="en-US" b="1" dirty="0"/>
+          </a:p>
+        </p:txBody>
+      </p:sp>
+      <p:pic>
+        <p:nvPicPr>
+          <p:cNvPr id="6" name="Picture 5">
+            <a:extLst>
+              <a:ext uri="{FF2B5EF4-FFF2-40B4-BE49-F238E27FC236}">
+                <a16:creationId xmlns:a16="http://schemas.microsoft.com/office/drawing/2014/main" id="{D87795C7-D3F7-46ED-954C-75D1FB2E2D48}"/>
+              </a:ext>
+            </a:extLst>
+          </p:cNvPr>
+          <p:cNvPicPr>
+            <a:picLocks noChangeAspect="1"/>
+          </p:cNvPicPr>
+          <p:nvPr/>
+        </p:nvPicPr>
+        <p:blipFill>
+          <a:blip r:embed="rId3"/>
+          <a:stretch>
+            <a:fillRect/>
+          </a:stretch>
+        </p:blipFill>
+        <p:spPr>
+          <a:xfrm>
+            <a:off x="4319594" y="1850333"/>
+            <a:ext cx="4495800" cy="1502134"/>
+          </a:xfrm>
+          <a:prstGeom prst="rect">
+            <a:avLst/>
+          </a:prstGeom>
+        </p:spPr>
+      </p:pic>
+      <p:pic>
+        <p:nvPicPr>
+          <p:cNvPr id="12" name="Picture 4" descr="# Query contextual web search API &#10;# Replace the fol_ string value With your valid X -RapidAPI-Key. &#10;# The query parameters: (update according to your search query) &#10;&quot;Donald%2eTrumpX2eNews&quot; #the search query &#10;pageNumber I #the number Of requested page &#10;pageSize = *the size Of a page &#10;autocorrect True #autoCorrectspeLLing &#10;safeSearch = &#10;False #fiLter results for adult content &#10;# test response to query and get count Of total items and pages &#10;response _ test—requests. get( &quot; https://contextualwebsearch-websearch-vl.p.rapidapi.com/api/Search/NewsSearchA &#10;. fornat(q, pageNumber, pageSize, autocorrec &#10;t, safeSearch), &#10;&quot;X-RapidAPI- : &#10;).json() &#10;#Get the number of items returned &#10;totalCount &quot;totalCount&quot;]•, &#10;totalPages round(tota1Count/pageSize) ">
+            <a:extLst>
+              <a:ext uri="{FF2B5EF4-FFF2-40B4-BE49-F238E27FC236}">
+                <a16:creationId xmlns:a16="http://schemas.microsoft.com/office/drawing/2014/main" id="{3C0E7A04-B99E-4A7C-B2D6-F6C948B82CEA}"/>
+              </a:ext>
+            </a:extLst>
+          </p:cNvPr>
+          <p:cNvPicPr>
+            <a:picLocks noChangeAspect="1" noChangeArrowheads="1"/>
+          </p:cNvPicPr>
+          <p:nvPr/>
+        </p:nvPicPr>
+        <p:blipFill>
+          <a:blip r:embed="rId4">
+            <a:extLst>
+              <a:ext uri="{28A0092B-C50C-407E-A947-70E740481C1C}">
+                <a14:useLocalDpi xmlns:a14="http://schemas.microsoft.com/office/drawing/2010/main" val="0"/>
+              </a:ext>
+            </a:extLst>
+          </a:blip>
+          <a:srcRect/>
+          <a:stretch>
+            <a:fillRect/>
+          </a:stretch>
+        </p:blipFill>
+        <p:spPr bwMode="auto">
+          <a:xfrm>
+            <a:off x="4451700" y="3900488"/>
+            <a:ext cx="4451727" cy="2275213"/>
+          </a:xfrm>
+          <a:prstGeom prst="rect">
+            <a:avLst/>
+          </a:prstGeom>
+          <a:noFill/>
+          <a:extLst>
+            <a:ext uri="{909E8E84-426E-40DD-AFC4-6F175D3DCCD1}">
+              <a14:hiddenFill xmlns:a14="http://schemas.microsoft.com/office/drawing/2010/main">
+                <a:solidFill>
+                  <a:srgbClr val="FFFFFF"/>
+                </a:solidFill>
+              </a14:hiddenFill>
+            </a:ext>
+          </a:extLst>
+        </p:spPr>
+      </p:pic>
     </p:spTree>
+    <p:extLst>
+      <p:ext uri="{BB962C8B-B14F-4D97-AF65-F5344CB8AC3E}">
+        <p14:creationId xmlns:p14="http://schemas.microsoft.com/office/powerpoint/2010/main" val="1520226450"/>
+      </p:ext>
+    </p:extLst>
   </p:cSld>
   <p:clrMapOvr>
     <a:masterClrMapping/>
@@ -12562,7 +13326,7 @@
         </p:nvSpPr>
         <p:spPr>
           <a:xfrm>
-            <a:off x="685800" y="2697085"/>
+            <a:off x="685800" y="206293"/>
             <a:ext cx="7772400" cy="617700"/>
           </a:xfrm>
           <a:prstGeom prst="rect">
@@ -12575,18 +13339,12 @@
           </a:bodyPr>
           <a:lstStyle/>
           <a:p>
-            <a:pPr marL="0" lvl="0" indent="0" algn="l" rtl="0">
-              <a:spcBef>
-                <a:spcPts val="600"/>
-              </a:spcBef>
-              <a:spcAft>
-                <a:spcPts val="0"/>
-              </a:spcAft>
+            <a:pPr marL="0" lvl="0" indent="0" algn="ctr">
               <a:buNone/>
             </a:pPr>
             <a:r>
-              <a:rPr lang="en-US" sz="2400" b="1" dirty="0" smtClean="0"/>
-              <a:t>This slide and the next few should highlight the process and show some code and the resulting graphs. The next slide happens to have a cool little thing that looks like a computer monitor. Could always put the snippet of the code in it. Or you could delete it, the slides after it are blank</a:t>
+              <a:rPr lang="en-US" sz="2400" b="1" dirty="0"/>
+              <a:t>Sample of JSON Result</a:t>
             </a:r>
             <a:endParaRPr sz="2400" b="1" dirty="0"/>
           </a:p>
@@ -12634,6 +13392,422 @@
           </a:p>
         </p:txBody>
       </p:sp>
+      <p:pic>
+        <p:nvPicPr>
+          <p:cNvPr id="2050" name="Picture 2" descr="In (61: &#10;In &#10;# generate sample response to Look at headers &#10;pprint( ' value' ] [2] )) &#10;{ 'datePub1ished' . &#10;i description' : • If it feels good, do itbut dont think youre changing &#10;• anything. ' &#10;' image': {'base64Encoding•: None, &#10;'height': 1767, &#10;'thumbnail' : &#10;' https : / / contextualwebsearch . ' , &#10;i thumbnailHeight : &#10;'thumbnailWidth : &#10;247, &#10;'url': &#10;' https://static.politico.com/23/7a/eaddf3df4195bbbc8e31f6a5e5ag/190628-shafer-wayfairboycott.jpg ' &#10;'width': 2652}, &#10;'isSafe': True, &#10;i keywords' : 'politico magazine, wayfair boycott, time' , &#10;'language': 'e &#10;'provider': {'name' • 'politico'}, &#10;'title': 'The Boycott Is a Waste of Time' &#10;'url' : 'https://www.politico.com/magazine/story/2e19/e6/28/wayfair-boycott-p01itica1-effectiveness-227251'} &#10;print(f' There are {totalPages} pages, with {totalCount} total articles. • ) &#10;There are 30 pages, with Iseø total articles. ">
+            <a:extLst>
+              <a:ext uri="{FF2B5EF4-FFF2-40B4-BE49-F238E27FC236}">
+                <a16:creationId xmlns:a16="http://schemas.microsoft.com/office/drawing/2014/main" id="{02944667-CC7C-4B4E-B534-51DA9786366C}"/>
+              </a:ext>
+            </a:extLst>
+          </p:cNvPr>
+          <p:cNvPicPr>
+            <a:picLocks noChangeAspect="1" noChangeArrowheads="1"/>
+          </p:cNvPicPr>
+          <p:nvPr/>
+        </p:nvPicPr>
+        <p:blipFill>
+          <a:blip r:embed="rId3">
+            <a:extLst>
+              <a:ext uri="{28A0092B-C50C-407E-A947-70E740481C1C}">
+                <a14:useLocalDpi xmlns:a14="http://schemas.microsoft.com/office/drawing/2010/main" val="0"/>
+              </a:ext>
+            </a:extLst>
+          </a:blip>
+          <a:srcRect/>
+          <a:stretch>
+            <a:fillRect/>
+          </a:stretch>
+        </p:blipFill>
+        <p:spPr bwMode="auto">
+          <a:xfrm>
+            <a:off x="1157687" y="876982"/>
+            <a:ext cx="7367188" cy="2413905"/>
+          </a:xfrm>
+          <a:prstGeom prst="rect">
+            <a:avLst/>
+          </a:prstGeom>
+          <a:noFill/>
+          <a:extLst>
+            <a:ext uri="{909E8E84-426E-40DD-AFC4-6F175D3DCCD1}">
+              <a14:hiddenFill xmlns:a14="http://schemas.microsoft.com/office/drawing/2010/main">
+                <a:solidFill>
+                  <a:srgbClr val="FFFFFF"/>
+                </a:solidFill>
+              </a14:hiddenFill>
+            </a:ext>
+          </a:extLst>
+        </p:spPr>
+      </p:pic>
+      <p:cxnSp>
+        <p:nvCxnSpPr>
+          <p:cNvPr id="3" name="Connector: Elbow 2">
+            <a:extLst>
+              <a:ext uri="{FF2B5EF4-FFF2-40B4-BE49-F238E27FC236}">
+                <a16:creationId xmlns:a16="http://schemas.microsoft.com/office/drawing/2014/main" id="{66248C24-A32D-41E7-88D7-560A3652654E}"/>
+              </a:ext>
+            </a:extLst>
+          </p:cNvPr>
+          <p:cNvCxnSpPr>
+            <a:cxnSpLocks/>
+          </p:cNvCxnSpPr>
+          <p:nvPr/>
+        </p:nvCxnSpPr>
+        <p:spPr>
+          <a:xfrm rot="5400000">
+            <a:off x="-103552" y="4173352"/>
+            <a:ext cx="2516126" cy="6351"/>
+          </a:xfrm>
+          <a:prstGeom prst="bentConnector4">
+            <a:avLst>
+              <a:gd name="adj1" fmla="val -53"/>
+              <a:gd name="adj2" fmla="val 10823319"/>
+            </a:avLst>
+          </a:prstGeom>
+          <a:ln>
+            <a:tailEnd type="triangle"/>
+          </a:ln>
+        </p:spPr>
+        <p:style>
+          <a:lnRef idx="1">
+            <a:schemeClr val="accent1"/>
+          </a:lnRef>
+          <a:fillRef idx="0">
+            <a:schemeClr val="accent1"/>
+          </a:fillRef>
+          <a:effectRef idx="0">
+            <a:schemeClr val="accent1"/>
+          </a:effectRef>
+          <a:fontRef idx="minor">
+            <a:schemeClr val="tx1"/>
+          </a:fontRef>
+        </p:style>
+      </p:cxnSp>
+      <p:sp>
+        <p:nvSpPr>
+          <p:cNvPr id="23" name="Google Shape;211;p30">
+            <a:extLst>
+              <a:ext uri="{FF2B5EF4-FFF2-40B4-BE49-F238E27FC236}">
+                <a16:creationId xmlns:a16="http://schemas.microsoft.com/office/drawing/2014/main" id="{1A2EB81D-28C0-4B4A-9943-DAAA749954EF}"/>
+              </a:ext>
+            </a:extLst>
+          </p:cNvPr>
+          <p:cNvSpPr txBox="1">
+            <a:spLocks/>
+          </p:cNvSpPr>
+          <p:nvPr/>
+        </p:nvSpPr>
+        <p:spPr>
+          <a:xfrm>
+            <a:off x="685800" y="3567114"/>
+            <a:ext cx="7772400" cy="617700"/>
+          </a:xfrm>
+          <a:prstGeom prst="rect">
+            <a:avLst/>
+          </a:prstGeom>
+          <a:noFill/>
+          <a:ln>
+            <a:noFill/>
+          </a:ln>
+        </p:spPr>
+        <p:txBody>
+          <a:bodyPr spcFirstLastPara="1" wrap="square" lIns="91425" tIns="91425" rIns="91425" bIns="91425" anchor="t" anchorCtr="0">
+            <a:noAutofit/>
+          </a:bodyPr>
+          <a:lstStyle>
+            <a:defPPr marR="0" lvl="0" algn="l" rtl="0">
+              <a:lnSpc>
+                <a:spcPct val="100000"/>
+              </a:lnSpc>
+              <a:spcBef>
+                <a:spcPts val="0"/>
+              </a:spcBef>
+              <a:spcAft>
+                <a:spcPts val="0"/>
+              </a:spcAft>
+            </a:defPPr>
+            <a:lvl1pPr marL="457200" marR="0" lvl="0" indent="-431800" algn="l" rtl="0">
+              <a:lnSpc>
+                <a:spcPct val="100000"/>
+              </a:lnSpc>
+              <a:spcBef>
+                <a:spcPts val="600"/>
+              </a:spcBef>
+              <a:spcAft>
+                <a:spcPts val="0"/>
+              </a:spcAft>
+              <a:buClr>
+                <a:srgbClr val="2F3848"/>
+              </a:buClr>
+              <a:buSzPts val="3200"/>
+              <a:buFont typeface="Source Sans Pro"/>
+              <a:buChar char="■"/>
+              <a:defRPr sz="3200" b="0" i="0" u="none" strike="noStrike" cap="none">
+                <a:solidFill>
+                  <a:srgbClr val="2F3848"/>
+                </a:solidFill>
+                <a:latin typeface="Source Sans Pro"/>
+                <a:ea typeface="Source Sans Pro"/>
+                <a:cs typeface="Source Sans Pro"/>
+                <a:sym typeface="Source Sans Pro"/>
+              </a:defRPr>
+            </a:lvl1pPr>
+            <a:lvl2pPr marL="914400" marR="0" lvl="1" indent="-381000" algn="l" rtl="0">
+              <a:lnSpc>
+                <a:spcPct val="100000"/>
+              </a:lnSpc>
+              <a:spcBef>
+                <a:spcPts val="0"/>
+              </a:spcBef>
+              <a:spcAft>
+                <a:spcPts val="0"/>
+              </a:spcAft>
+              <a:buClr>
+                <a:srgbClr val="2F3848"/>
+              </a:buClr>
+              <a:buSzPts val="2400"/>
+              <a:buFont typeface="Source Sans Pro"/>
+              <a:buChar char="○"/>
+              <a:defRPr sz="2400" b="0" i="0" u="none" strike="noStrike" cap="none">
+                <a:solidFill>
+                  <a:srgbClr val="2F3848"/>
+                </a:solidFill>
+                <a:latin typeface="Source Sans Pro"/>
+                <a:ea typeface="Source Sans Pro"/>
+                <a:cs typeface="Source Sans Pro"/>
+                <a:sym typeface="Source Sans Pro"/>
+              </a:defRPr>
+            </a:lvl2pPr>
+            <a:lvl3pPr marL="1371600" marR="0" lvl="2" indent="-381000" algn="l" rtl="0">
+              <a:lnSpc>
+                <a:spcPct val="100000"/>
+              </a:lnSpc>
+              <a:spcBef>
+                <a:spcPts val="0"/>
+              </a:spcBef>
+              <a:spcAft>
+                <a:spcPts val="0"/>
+              </a:spcAft>
+              <a:buClr>
+                <a:srgbClr val="2F3848"/>
+              </a:buClr>
+              <a:buSzPts val="2400"/>
+              <a:buFont typeface="Source Sans Pro"/>
+              <a:buChar char="■"/>
+              <a:defRPr sz="2400" b="0" i="0" u="none" strike="noStrike" cap="none">
+                <a:solidFill>
+                  <a:srgbClr val="2F3848"/>
+                </a:solidFill>
+                <a:latin typeface="Source Sans Pro"/>
+                <a:ea typeface="Source Sans Pro"/>
+                <a:cs typeface="Source Sans Pro"/>
+                <a:sym typeface="Source Sans Pro"/>
+              </a:defRPr>
+            </a:lvl3pPr>
+            <a:lvl4pPr marL="1828800" marR="0" lvl="3" indent="-342900" algn="l" rtl="0">
+              <a:lnSpc>
+                <a:spcPct val="100000"/>
+              </a:lnSpc>
+              <a:spcBef>
+                <a:spcPts val="0"/>
+              </a:spcBef>
+              <a:spcAft>
+                <a:spcPts val="0"/>
+              </a:spcAft>
+              <a:buClr>
+                <a:srgbClr val="2F3848"/>
+              </a:buClr>
+              <a:buSzPts val="1800"/>
+              <a:buFont typeface="Source Sans Pro"/>
+              <a:buChar char="●"/>
+              <a:defRPr sz="1800" b="0" i="0" u="none" strike="noStrike" cap="none">
+                <a:solidFill>
+                  <a:srgbClr val="2F3848"/>
+                </a:solidFill>
+                <a:latin typeface="Source Sans Pro"/>
+                <a:ea typeface="Source Sans Pro"/>
+                <a:cs typeface="Source Sans Pro"/>
+                <a:sym typeface="Source Sans Pro"/>
+              </a:defRPr>
+            </a:lvl4pPr>
+            <a:lvl5pPr marL="2286000" marR="0" lvl="4" indent="-342900" algn="l" rtl="0">
+              <a:lnSpc>
+                <a:spcPct val="100000"/>
+              </a:lnSpc>
+              <a:spcBef>
+                <a:spcPts val="0"/>
+              </a:spcBef>
+              <a:spcAft>
+                <a:spcPts val="0"/>
+              </a:spcAft>
+              <a:buClr>
+                <a:srgbClr val="2F3848"/>
+              </a:buClr>
+              <a:buSzPts val="1800"/>
+              <a:buFont typeface="Source Sans Pro"/>
+              <a:buChar char="○"/>
+              <a:defRPr sz="1800" b="0" i="0" u="none" strike="noStrike" cap="none">
+                <a:solidFill>
+                  <a:srgbClr val="2F3848"/>
+                </a:solidFill>
+                <a:latin typeface="Source Sans Pro"/>
+                <a:ea typeface="Source Sans Pro"/>
+                <a:cs typeface="Source Sans Pro"/>
+                <a:sym typeface="Source Sans Pro"/>
+              </a:defRPr>
+            </a:lvl5pPr>
+            <a:lvl6pPr marL="2743200" marR="0" lvl="5" indent="-342900" algn="l" rtl="0">
+              <a:lnSpc>
+                <a:spcPct val="100000"/>
+              </a:lnSpc>
+              <a:spcBef>
+                <a:spcPts val="0"/>
+              </a:spcBef>
+              <a:spcAft>
+                <a:spcPts val="0"/>
+              </a:spcAft>
+              <a:buClr>
+                <a:srgbClr val="2F3848"/>
+              </a:buClr>
+              <a:buSzPts val="1800"/>
+              <a:buFont typeface="Source Sans Pro"/>
+              <a:buChar char="■"/>
+              <a:defRPr sz="1800" b="0" i="0" u="none" strike="noStrike" cap="none">
+                <a:solidFill>
+                  <a:srgbClr val="2F3848"/>
+                </a:solidFill>
+                <a:latin typeface="Source Sans Pro"/>
+                <a:ea typeface="Source Sans Pro"/>
+                <a:cs typeface="Source Sans Pro"/>
+                <a:sym typeface="Source Sans Pro"/>
+              </a:defRPr>
+            </a:lvl6pPr>
+            <a:lvl7pPr marL="3200400" marR="0" lvl="6" indent="-342900" algn="l" rtl="0">
+              <a:lnSpc>
+                <a:spcPct val="100000"/>
+              </a:lnSpc>
+              <a:spcBef>
+                <a:spcPts val="0"/>
+              </a:spcBef>
+              <a:spcAft>
+                <a:spcPts val="0"/>
+              </a:spcAft>
+              <a:buClr>
+                <a:srgbClr val="2F3848"/>
+              </a:buClr>
+              <a:buSzPts val="1800"/>
+              <a:buFont typeface="Source Sans Pro"/>
+              <a:buChar char="●"/>
+              <a:defRPr sz="1800" b="0" i="0" u="none" strike="noStrike" cap="none">
+                <a:solidFill>
+                  <a:srgbClr val="2F3848"/>
+                </a:solidFill>
+                <a:latin typeface="Source Sans Pro"/>
+                <a:ea typeface="Source Sans Pro"/>
+                <a:cs typeface="Source Sans Pro"/>
+                <a:sym typeface="Source Sans Pro"/>
+              </a:defRPr>
+            </a:lvl7pPr>
+            <a:lvl8pPr marL="3657600" marR="0" lvl="7" indent="-342900" algn="l" rtl="0">
+              <a:lnSpc>
+                <a:spcPct val="100000"/>
+              </a:lnSpc>
+              <a:spcBef>
+                <a:spcPts val="0"/>
+              </a:spcBef>
+              <a:spcAft>
+                <a:spcPts val="0"/>
+              </a:spcAft>
+              <a:buClr>
+                <a:srgbClr val="2F3848"/>
+              </a:buClr>
+              <a:buSzPts val="1800"/>
+              <a:buFont typeface="Source Sans Pro"/>
+              <a:buChar char="○"/>
+              <a:defRPr sz="1800" b="0" i="0" u="none" strike="noStrike" cap="none">
+                <a:solidFill>
+                  <a:srgbClr val="2F3848"/>
+                </a:solidFill>
+                <a:latin typeface="Source Sans Pro"/>
+                <a:ea typeface="Source Sans Pro"/>
+                <a:cs typeface="Source Sans Pro"/>
+                <a:sym typeface="Source Sans Pro"/>
+              </a:defRPr>
+            </a:lvl8pPr>
+            <a:lvl9pPr marL="4114800" marR="0" lvl="8" indent="-342900" algn="l" rtl="0">
+              <a:lnSpc>
+                <a:spcPct val="100000"/>
+              </a:lnSpc>
+              <a:spcBef>
+                <a:spcPts val="0"/>
+              </a:spcBef>
+              <a:spcAft>
+                <a:spcPts val="0"/>
+              </a:spcAft>
+              <a:buClr>
+                <a:srgbClr val="2F3848"/>
+              </a:buClr>
+              <a:buSzPts val="1800"/>
+              <a:buFont typeface="Source Sans Pro"/>
+              <a:buChar char="■"/>
+              <a:defRPr sz="1800" b="0" i="0" u="none" strike="noStrike" cap="none">
+                <a:solidFill>
+                  <a:srgbClr val="2F3848"/>
+                </a:solidFill>
+                <a:latin typeface="Source Sans Pro"/>
+                <a:ea typeface="Source Sans Pro"/>
+                <a:cs typeface="Source Sans Pro"/>
+                <a:sym typeface="Source Sans Pro"/>
+              </a:defRPr>
+            </a:lvl9pPr>
+          </a:lstStyle>
+          <a:p>
+            <a:pPr marL="0" indent="0" algn="ctr">
+              <a:buFont typeface="Source Sans Pro"/>
+              <a:buNone/>
+            </a:pPr>
+            <a:r>
+              <a:rPr lang="en-US" sz="2400" b="1" dirty="0"/>
+              <a:t>Our Initial </a:t>
+            </a:r>
+            <a:r>
+              <a:rPr lang="en-US" sz="2400" b="1" dirty="0" err="1"/>
+              <a:t>DataFrame</a:t>
+            </a:r>
+            <a:endParaRPr lang="en-US" sz="2400" b="1" dirty="0"/>
+          </a:p>
+        </p:txBody>
+      </p:sp>
+      <p:pic>
+        <p:nvPicPr>
+          <p:cNvPr id="19" name="Picture 18">
+            <a:extLst>
+              <a:ext uri="{FF2B5EF4-FFF2-40B4-BE49-F238E27FC236}">
+                <a16:creationId xmlns:a16="http://schemas.microsoft.com/office/drawing/2014/main" id="{250794F7-4EB6-458F-A7E1-F45EC4392738}"/>
+              </a:ext>
+            </a:extLst>
+          </p:cNvPr>
+          <p:cNvPicPr>
+            <a:picLocks noChangeAspect="1"/>
+          </p:cNvPicPr>
+          <p:nvPr/>
+        </p:nvPicPr>
+        <p:blipFill>
+          <a:blip r:embed="rId4"/>
+          <a:stretch>
+            <a:fillRect/>
+          </a:stretch>
+        </p:blipFill>
+        <p:spPr>
+          <a:xfrm>
+            <a:off x="1151335" y="4086387"/>
+            <a:ext cx="7440215" cy="2314413"/>
+          </a:xfrm>
+          <a:prstGeom prst="rect">
+            <a:avLst/>
+          </a:prstGeom>
+        </p:spPr>
+      </p:pic>
     </p:spTree>
   </p:cSld>
   <p:clrMapOvr>
@@ -12647,7 +13821,7 @@
   <p:cSld>
     <p:spTree>
       <p:nvGrpSpPr>
-        <p:cNvPr id="1" name="Shape 294"/>
+        <p:cNvPr id="1" name="Shape 120"/>
         <p:cNvGrpSpPr/>
         <p:nvPr/>
       </p:nvGrpSpPr>
@@ -12661,418 +13835,22 @@
       </p:grpSpPr>
       <p:sp>
         <p:nvSpPr>
-          <p:cNvPr id="295" name="Google Shape;295;p37"/>
-          <p:cNvSpPr/>
-          <p:nvPr/>
-        </p:nvSpPr>
-        <p:spPr>
-          <a:xfrm>
-            <a:off x="1503074" y="477024"/>
-            <a:ext cx="6407871" cy="5065598"/>
-          </a:xfrm>
-          <a:custGeom>
-            <a:avLst/>
-            <a:gdLst/>
-            <a:ahLst/>
-            <a:cxnLst/>
-            <a:rect l="l" t="t" r="r" b="b"/>
-            <a:pathLst>
-              <a:path w="143434" h="111665" extrusionOk="0">
-                <a:moveTo>
-                  <a:pt x="71751" y="2308"/>
-                </a:moveTo>
-                <a:lnTo>
-                  <a:pt x="71887" y="2376"/>
-                </a:lnTo>
-                <a:lnTo>
-                  <a:pt x="72091" y="2444"/>
-                </a:lnTo>
-                <a:lnTo>
-                  <a:pt x="72159" y="2647"/>
-                </a:lnTo>
-                <a:lnTo>
-                  <a:pt x="72226" y="2783"/>
-                </a:lnTo>
-                <a:lnTo>
-                  <a:pt x="72159" y="2987"/>
-                </a:lnTo>
-                <a:lnTo>
-                  <a:pt x="72091" y="3190"/>
-                </a:lnTo>
-                <a:lnTo>
-                  <a:pt x="71887" y="3258"/>
-                </a:lnTo>
-                <a:lnTo>
-                  <a:pt x="71751" y="3326"/>
-                </a:lnTo>
-                <a:lnTo>
-                  <a:pt x="71548" y="3258"/>
-                </a:lnTo>
-                <a:lnTo>
-                  <a:pt x="71344" y="3190"/>
-                </a:lnTo>
-                <a:lnTo>
-                  <a:pt x="71276" y="2987"/>
-                </a:lnTo>
-                <a:lnTo>
-                  <a:pt x="71208" y="2783"/>
-                </a:lnTo>
-                <a:lnTo>
-                  <a:pt x="71276" y="2647"/>
-                </a:lnTo>
-                <a:lnTo>
-                  <a:pt x="71344" y="2444"/>
-                </a:lnTo>
-                <a:lnTo>
-                  <a:pt x="71548" y="2376"/>
-                </a:lnTo>
-                <a:lnTo>
-                  <a:pt x="71751" y="2308"/>
-                </a:lnTo>
-                <a:close/>
-                <a:moveTo>
-                  <a:pt x="137528" y="5906"/>
-                </a:moveTo>
-                <a:lnTo>
-                  <a:pt x="137596" y="5974"/>
-                </a:lnTo>
-                <a:lnTo>
-                  <a:pt x="137596" y="89604"/>
-                </a:lnTo>
-                <a:lnTo>
-                  <a:pt x="5906" y="89604"/>
-                </a:lnTo>
-                <a:lnTo>
-                  <a:pt x="5906" y="5974"/>
-                </a:lnTo>
-                <a:lnTo>
-                  <a:pt x="5906" y="5906"/>
-                </a:lnTo>
-                <a:close/>
-                <a:moveTo>
-                  <a:pt x="3530" y="0"/>
-                </a:moveTo>
-                <a:lnTo>
-                  <a:pt x="3191" y="68"/>
-                </a:lnTo>
-                <a:lnTo>
-                  <a:pt x="2444" y="339"/>
-                </a:lnTo>
-                <a:lnTo>
-                  <a:pt x="1766" y="679"/>
-                </a:lnTo>
-                <a:lnTo>
-                  <a:pt x="1155" y="1154"/>
-                </a:lnTo>
-                <a:lnTo>
-                  <a:pt x="679" y="1765"/>
-                </a:lnTo>
-                <a:lnTo>
-                  <a:pt x="272" y="2444"/>
-                </a:lnTo>
-                <a:lnTo>
-                  <a:pt x="69" y="3190"/>
-                </a:lnTo>
-                <a:lnTo>
-                  <a:pt x="1" y="3598"/>
-                </a:lnTo>
-                <a:lnTo>
-                  <a:pt x="1" y="4005"/>
-                </a:lnTo>
-                <a:lnTo>
-                  <a:pt x="1" y="91572"/>
-                </a:lnTo>
-                <a:lnTo>
-                  <a:pt x="1" y="91979"/>
-                </a:lnTo>
-                <a:lnTo>
-                  <a:pt x="69" y="92319"/>
-                </a:lnTo>
-                <a:lnTo>
-                  <a:pt x="272" y="93065"/>
-                </a:lnTo>
-                <a:lnTo>
-                  <a:pt x="679" y="93744"/>
-                </a:lnTo>
-                <a:lnTo>
-                  <a:pt x="1155" y="94355"/>
-                </a:lnTo>
-                <a:lnTo>
-                  <a:pt x="1766" y="94830"/>
-                </a:lnTo>
-                <a:lnTo>
-                  <a:pt x="2444" y="95238"/>
-                </a:lnTo>
-                <a:lnTo>
-                  <a:pt x="3191" y="95441"/>
-                </a:lnTo>
-                <a:lnTo>
-                  <a:pt x="3530" y="95509"/>
-                </a:lnTo>
-                <a:lnTo>
-                  <a:pt x="139904" y="95509"/>
-                </a:lnTo>
-                <a:lnTo>
-                  <a:pt x="140311" y="95441"/>
-                </a:lnTo>
-                <a:lnTo>
-                  <a:pt x="141058" y="95238"/>
-                </a:lnTo>
-                <a:lnTo>
-                  <a:pt x="141737" y="94830"/>
-                </a:lnTo>
-                <a:lnTo>
-                  <a:pt x="142280" y="94355"/>
-                </a:lnTo>
-                <a:lnTo>
-                  <a:pt x="142755" y="93744"/>
-                </a:lnTo>
-                <a:lnTo>
-                  <a:pt x="143162" y="93065"/>
-                </a:lnTo>
-                <a:lnTo>
-                  <a:pt x="143366" y="92319"/>
-                </a:lnTo>
-                <a:lnTo>
-                  <a:pt x="143434" y="91979"/>
-                </a:lnTo>
-                <a:lnTo>
-                  <a:pt x="143434" y="91572"/>
-                </a:lnTo>
-                <a:lnTo>
-                  <a:pt x="143434" y="4005"/>
-                </a:lnTo>
-                <a:lnTo>
-                  <a:pt x="143434" y="3598"/>
-                </a:lnTo>
-                <a:lnTo>
-                  <a:pt x="143366" y="3190"/>
-                </a:lnTo>
-                <a:lnTo>
-                  <a:pt x="143162" y="2444"/>
-                </a:lnTo>
-                <a:lnTo>
-                  <a:pt x="142755" y="1765"/>
-                </a:lnTo>
-                <a:lnTo>
-                  <a:pt x="142280" y="1154"/>
-                </a:lnTo>
-                <a:lnTo>
-                  <a:pt x="141737" y="679"/>
-                </a:lnTo>
-                <a:lnTo>
-                  <a:pt x="141058" y="339"/>
-                </a:lnTo>
-                <a:lnTo>
-                  <a:pt x="140311" y="68"/>
-                </a:lnTo>
-                <a:lnTo>
-                  <a:pt x="139904" y="0"/>
-                </a:lnTo>
-                <a:close/>
-                <a:moveTo>
-                  <a:pt x="55324" y="95713"/>
-                </a:moveTo>
-                <a:lnTo>
-                  <a:pt x="55052" y="98971"/>
-                </a:lnTo>
-                <a:lnTo>
-                  <a:pt x="54713" y="102297"/>
-                </a:lnTo>
-                <a:lnTo>
-                  <a:pt x="54374" y="105284"/>
-                </a:lnTo>
-                <a:lnTo>
-                  <a:pt x="53966" y="107388"/>
-                </a:lnTo>
-                <a:lnTo>
-                  <a:pt x="53763" y="108203"/>
-                </a:lnTo>
-                <a:lnTo>
-                  <a:pt x="53627" y="108746"/>
-                </a:lnTo>
-                <a:lnTo>
-                  <a:pt x="53423" y="109153"/>
-                </a:lnTo>
-                <a:lnTo>
-                  <a:pt x="53220" y="109357"/>
-                </a:lnTo>
-                <a:lnTo>
-                  <a:pt x="52677" y="109493"/>
-                </a:lnTo>
-                <a:lnTo>
-                  <a:pt x="51794" y="109696"/>
-                </a:lnTo>
-                <a:lnTo>
-                  <a:pt x="49690" y="110036"/>
-                </a:lnTo>
-                <a:lnTo>
-                  <a:pt x="48061" y="110307"/>
-                </a:lnTo>
-                <a:lnTo>
-                  <a:pt x="47450" y="110443"/>
-                </a:lnTo>
-                <a:lnTo>
-                  <a:pt x="47110" y="110511"/>
-                </a:lnTo>
-                <a:lnTo>
-                  <a:pt x="47042" y="110579"/>
-                </a:lnTo>
-                <a:lnTo>
-                  <a:pt x="47042" y="110783"/>
-                </a:lnTo>
-                <a:lnTo>
-                  <a:pt x="47110" y="110850"/>
-                </a:lnTo>
-                <a:lnTo>
-                  <a:pt x="47585" y="110918"/>
-                </a:lnTo>
-                <a:lnTo>
-                  <a:pt x="48400" y="110986"/>
-                </a:lnTo>
-                <a:lnTo>
-                  <a:pt x="51387" y="111054"/>
-                </a:lnTo>
-                <a:lnTo>
-                  <a:pt x="56071" y="111122"/>
-                </a:lnTo>
-                <a:lnTo>
-                  <a:pt x="87092" y="111122"/>
-                </a:lnTo>
-                <a:lnTo>
-                  <a:pt x="91708" y="111054"/>
-                </a:lnTo>
-                <a:lnTo>
-                  <a:pt x="94695" y="110986"/>
-                </a:lnTo>
-                <a:lnTo>
-                  <a:pt x="95578" y="110918"/>
-                </a:lnTo>
-                <a:lnTo>
-                  <a:pt x="96053" y="110850"/>
-                </a:lnTo>
-                <a:lnTo>
-                  <a:pt x="96121" y="110783"/>
-                </a:lnTo>
-                <a:lnTo>
-                  <a:pt x="96121" y="110579"/>
-                </a:lnTo>
-                <a:lnTo>
-                  <a:pt x="96053" y="110511"/>
-                </a:lnTo>
-                <a:lnTo>
-                  <a:pt x="95713" y="110443"/>
-                </a:lnTo>
-                <a:lnTo>
-                  <a:pt x="95102" y="110307"/>
-                </a:lnTo>
-                <a:lnTo>
-                  <a:pt x="93473" y="110036"/>
-                </a:lnTo>
-                <a:lnTo>
-                  <a:pt x="91369" y="109696"/>
-                </a:lnTo>
-                <a:lnTo>
-                  <a:pt x="90487" y="109493"/>
-                </a:lnTo>
-                <a:lnTo>
-                  <a:pt x="89943" y="109357"/>
-                </a:lnTo>
-                <a:lnTo>
-                  <a:pt x="89740" y="109153"/>
-                </a:lnTo>
-                <a:lnTo>
-                  <a:pt x="89536" y="108746"/>
-                </a:lnTo>
-                <a:lnTo>
-                  <a:pt x="89333" y="108203"/>
-                </a:lnTo>
-                <a:lnTo>
-                  <a:pt x="89197" y="107388"/>
-                </a:lnTo>
-                <a:lnTo>
-                  <a:pt x="88789" y="105284"/>
-                </a:lnTo>
-                <a:lnTo>
-                  <a:pt x="88382" y="102297"/>
-                </a:lnTo>
-                <a:lnTo>
-                  <a:pt x="88043" y="98971"/>
-                </a:lnTo>
-                <a:lnTo>
-                  <a:pt x="87839" y="95713"/>
-                </a:lnTo>
-                <a:close/>
-                <a:moveTo>
-                  <a:pt x="47450" y="111054"/>
-                </a:moveTo>
-                <a:lnTo>
-                  <a:pt x="47450" y="111122"/>
-                </a:lnTo>
-                <a:lnTo>
-                  <a:pt x="47450" y="111393"/>
-                </a:lnTo>
-                <a:lnTo>
-                  <a:pt x="47518" y="111461"/>
-                </a:lnTo>
-                <a:lnTo>
-                  <a:pt x="48807" y="111529"/>
-                </a:lnTo>
-                <a:lnTo>
-                  <a:pt x="52473" y="111597"/>
-                </a:lnTo>
-                <a:lnTo>
-                  <a:pt x="62384" y="111665"/>
-                </a:lnTo>
-                <a:lnTo>
-                  <a:pt x="80779" y="111665"/>
-                </a:lnTo>
-                <a:lnTo>
-                  <a:pt x="90622" y="111597"/>
-                </a:lnTo>
-                <a:lnTo>
-                  <a:pt x="94356" y="111529"/>
-                </a:lnTo>
-                <a:lnTo>
-                  <a:pt x="95646" y="111461"/>
-                </a:lnTo>
-                <a:lnTo>
-                  <a:pt x="95713" y="111393"/>
-                </a:lnTo>
-                <a:lnTo>
-                  <a:pt x="95713" y="111122"/>
-                </a:lnTo>
-                <a:lnTo>
-                  <a:pt x="95646" y="111054"/>
-                </a:lnTo>
-                <a:lnTo>
-                  <a:pt x="94084" y="111122"/>
-                </a:lnTo>
-                <a:lnTo>
-                  <a:pt x="91233" y="111190"/>
-                </a:lnTo>
-                <a:lnTo>
-                  <a:pt x="80847" y="111258"/>
-                </a:lnTo>
-                <a:lnTo>
-                  <a:pt x="62316" y="111258"/>
-                </a:lnTo>
-                <a:lnTo>
-                  <a:pt x="51930" y="111190"/>
-                </a:lnTo>
-                <a:lnTo>
-                  <a:pt x="49079" y="111122"/>
-                </a:lnTo>
-                <a:lnTo>
-                  <a:pt x="47518" y="111054"/>
-                </a:lnTo>
-                <a:close/>
-              </a:path>
-            </a:pathLst>
-          </a:custGeom>
-          <a:solidFill>
-            <a:srgbClr val="2F3848"/>
-          </a:solidFill>
+          <p:cNvPr id="121" name="Google Shape;121;p20"/>
+          <p:cNvSpPr txBox="1">
+            <a:spLocks noGrp="1"/>
+          </p:cNvSpPr>
+          <p:nvPr>
+            <p:ph type="title"/>
+          </p:nvPr>
+        </p:nvSpPr>
+        <p:spPr>
+          <a:xfrm>
+            <a:off x="832475" y="168450"/>
+            <a:ext cx="7951800" cy="973500"/>
+          </a:xfrm>
+          <a:prstGeom prst="rect">
+            <a:avLst/>
+          </a:prstGeom>
           <a:ln>
             <a:noFill/>
           </a:ln>
@@ -13092,24 +13870,28 @@
               </a:spcAft>
               <a:buNone/>
             </a:pPr>
-            <a:endParaRPr/>
+            <a:r>
+              <a:rPr lang="en-US" dirty="0"/>
+              <a:t>SENTIMENT ANALYSIS</a:t>
+            </a:r>
+            <a:endParaRPr dirty="0"/>
           </a:p>
         </p:txBody>
       </p:sp>
       <p:sp>
         <p:nvSpPr>
-          <p:cNvPr id="296" name="Google Shape;296;p37"/>
+          <p:cNvPr id="122" name="Google Shape;122;p20"/>
           <p:cNvSpPr txBox="1">
             <a:spLocks noGrp="1"/>
           </p:cNvSpPr>
           <p:nvPr>
-            <p:ph type="body" idx="4294967295"/>
+            <p:ph type="body" idx="1"/>
           </p:nvPr>
         </p:nvSpPr>
         <p:spPr>
           <a:xfrm>
-            <a:off x="457200" y="4565925"/>
-            <a:ext cx="8182800" cy="1859100"/>
+            <a:off x="252413" y="1600200"/>
+            <a:ext cx="8531862" cy="4967700"/>
           </a:xfrm>
           <a:prstGeom prst="rect">
             <a:avLst/>
@@ -13121,108 +13903,100 @@
           </a:bodyPr>
           <a:lstStyle/>
           <a:p>
-            <a:pPr marL="0" lvl="0" indent="0" algn="l" rtl="0">
+            <a:r>
+              <a:rPr lang="en-US" sz="2400" b="1" dirty="0"/>
+              <a:t>To do the sentiment analysis of the news data, we used vaderSentiment, a Python library built to do sentiment analysis of social media texts, but also widely applicable to all ranges of textual data. </a:t>
+            </a:r>
+          </a:p>
+          <a:p>
+            <a:endParaRPr lang="en-US" sz="2400" dirty="0"/>
+          </a:p>
+          <a:p>
+            <a:r>
+              <a:rPr lang="en-US" sz="2200" dirty="0"/>
+              <a:t>Normalized weighted composite score</a:t>
+            </a:r>
+          </a:p>
+          <a:p>
+            <a:pPr marL="25400" lvl="0" indent="0" algn="l" rtl="0">
               <a:spcBef>
                 <a:spcPts val="600"/>
               </a:spcBef>
               <a:spcAft>
                 <a:spcPts val="0"/>
               </a:spcAft>
-              <a:buNone/>
+              <a:buSzPts val="3200"/>
+              <a:buNone/>
+            </a:pPr>
+            <a:endParaRPr lang="en-US" sz="2200" dirty="0"/>
+          </a:p>
+          <a:p>
+            <a:pPr>
+              <a:spcBef>
+                <a:spcPts val="0"/>
+              </a:spcBef>
             </a:pPr>
             <a:r>
-              <a:rPr lang="en" b="1" dirty="0">
-                <a:solidFill>
-                  <a:srgbClr val="00C5B9"/>
-                </a:solidFill>
-              </a:rPr>
-              <a:t>Desktop project</a:t>
+              <a:rPr lang="en-US" sz="2200" dirty="0"/>
+              <a:t>Positive sentiment: compound score &gt;= 0.05</a:t>
             </a:r>
-            <a:endParaRPr b="1" dirty="0">
-              <a:solidFill>
-                <a:srgbClr val="00C5B9"/>
-              </a:solidFill>
-            </a:endParaRPr>
-          </a:p>
-          <a:p>
-            <a:pPr marL="0" lvl="0" indent="0" algn="l" rtl="0">
-              <a:spcBef>
-                <a:spcPts val="600"/>
-              </a:spcBef>
-              <a:spcAft>
-                <a:spcPts val="0"/>
-              </a:spcAft>
+          </a:p>
+          <a:p>
+            <a:pPr marL="482600" lvl="1" indent="0">
+              <a:buSzPts val="3200"/>
               <a:buNone/>
             </a:pPr>
             <a:r>
-              <a:rPr lang="en" sz="2400" dirty="0"/>
-              <a:t>Show and explain your web, app or software projects using these gadget templates.</a:t>
+              <a:rPr lang="en-US" sz="2200" dirty="0"/>
+              <a:t>Neutral sentiment: (compound score &gt;= 0.05) and  compound score &lt; 0.05)</a:t>
             </a:r>
-            <a:endParaRPr sz="2400" dirty="0"/>
-          </a:p>
-        </p:txBody>
-      </p:sp>
-      <p:sp>
-        <p:nvSpPr>
-          <p:cNvPr id="297" name="Google Shape;297;p37"/>
-          <p:cNvSpPr/>
-          <p:nvPr/>
-        </p:nvSpPr>
-        <p:spPr>
-          <a:xfrm>
-            <a:off x="1774956" y="769779"/>
-            <a:ext cx="5864105" cy="3796146"/>
-          </a:xfrm>
-          <a:prstGeom prst="rect">
-            <a:avLst/>
-          </a:prstGeom>
-          <a:solidFill>
-            <a:srgbClr val="F3F3F3"/>
-          </a:solidFill>
-          <a:ln w="19050" cap="flat" cmpd="sng">
-            <a:solidFill>
-              <a:srgbClr val="D9D9D9"/>
-            </a:solidFill>
-            <a:prstDash val="solid"/>
-            <a:round/>
-            <a:headEnd type="none" w="sm" len="sm"/>
-            <a:tailEnd type="none" w="sm" len="sm"/>
-          </a:ln>
-        </p:spPr>
-        <p:txBody>
-          <a:bodyPr spcFirstLastPara="1" wrap="square" lIns="91425" tIns="91425" rIns="91425" bIns="91425" anchor="ctr" anchorCtr="0">
-            <a:noAutofit/>
-          </a:bodyPr>
-          <a:lstStyle/>
-          <a:p>
-            <a:pPr marL="0" lvl="0" indent="0" algn="ctr" rtl="0">
-              <a:spcBef>
-                <a:spcPts val="0"/>
-              </a:spcBef>
-              <a:spcAft>
-                <a:spcPts val="0"/>
-              </a:spcAft>
+          </a:p>
+          <a:p>
+            <a:pPr marL="25400" lvl="0" indent="0" algn="l" rtl="0">
+              <a:spcBef>
+                <a:spcPts val="0"/>
+              </a:spcBef>
+              <a:spcAft>
+                <a:spcPts val="0"/>
+              </a:spcAft>
+              <a:buSzPts val="3200"/>
               <a:buNone/>
             </a:pPr>
             <a:r>
-              <a:rPr lang="en" sz="1000">
-                <a:solidFill>
-                  <a:srgbClr val="999999"/>
-                </a:solidFill>
-              </a:rPr>
-              <a:t>Place your screenshot here</a:t>
+              <a:rPr lang="en-US" sz="2200" dirty="0"/>
+              <a:t>        Negative sentiment: compound score &lt;= -0.05</a:t>
             </a:r>
-            <a:endParaRPr sz="1000">
-              <a:solidFill>
-                <a:srgbClr val="999999"/>
-              </a:solidFill>
-            </a:endParaRPr>
+          </a:p>
+          <a:p>
+            <a:pPr marL="25400" lvl="0" indent="0" algn="l" rtl="0">
+              <a:spcBef>
+                <a:spcPts val="0"/>
+              </a:spcBef>
+              <a:spcAft>
+                <a:spcPts val="0"/>
+              </a:spcAft>
+              <a:buSzPts val="3200"/>
+              <a:buNone/>
+            </a:pPr>
+            <a:endParaRPr lang="en-US" sz="2200" dirty="0"/>
+          </a:p>
+          <a:p>
+            <a:pPr>
+              <a:spcBef>
+                <a:spcPts val="0"/>
+              </a:spcBef>
+            </a:pPr>
+            <a:r>
+              <a:rPr lang="en-US" sz="2200" dirty="0"/>
+              <a:t>Ratios for proportions of text that fall in each category</a:t>
+            </a:r>
+            <a:endParaRPr sz="2200" dirty="0"/>
           </a:p>
         </p:txBody>
       </p:sp>
       <p:sp>
         <p:nvSpPr>
-          <p:cNvPr id="298" name="Google Shape;298;p37"/>
+          <p:cNvPr id="123" name="Google Shape;123;p20"/>
           <p:cNvSpPr txBox="1">
             <a:spLocks noGrp="1"/>
           </p:cNvSpPr>
@@ -13263,11 +14037,6 @@
         </p:txBody>
       </p:sp>
     </p:spTree>
-    <p:extLst>
-      <p:ext uri="{BB962C8B-B14F-4D97-AF65-F5344CB8AC3E}">
-        <p14:creationId xmlns:p14="http://schemas.microsoft.com/office/powerpoint/2010/main" val="3089656685"/>
-      </p:ext>
-    </p:extLst>
   </p:cSld>
   <p:clrMapOvr>
     <a:masterClrMapping/>
@@ -13294,44 +14063,6 @@
       </p:grpSpPr>
       <p:sp>
         <p:nvSpPr>
-          <p:cNvPr id="211" name="Google Shape;211;p30"/>
-          <p:cNvSpPr txBox="1">
-            <a:spLocks noGrp="1"/>
-          </p:cNvSpPr>
-          <p:nvPr>
-            <p:ph type="subTitle" idx="4294967295"/>
-          </p:nvPr>
-        </p:nvSpPr>
-        <p:spPr>
-          <a:xfrm>
-            <a:off x="685800" y="2697085"/>
-            <a:ext cx="7772400" cy="617700"/>
-          </a:xfrm>
-          <a:prstGeom prst="rect">
-            <a:avLst/>
-          </a:prstGeom>
-        </p:spPr>
-        <p:txBody>
-          <a:bodyPr spcFirstLastPara="1" wrap="square" lIns="91425" tIns="91425" rIns="91425" bIns="91425" anchor="t" anchorCtr="0">
-            <a:noAutofit/>
-          </a:bodyPr>
-          <a:lstStyle/>
-          <a:p>
-            <a:pPr marL="0" lvl="0" indent="0" algn="l" rtl="0">
-              <a:spcBef>
-                <a:spcPts val="600"/>
-              </a:spcBef>
-              <a:spcAft>
-                <a:spcPts val="0"/>
-              </a:spcAft>
-              <a:buNone/>
-            </a:pPr>
-            <a:endParaRPr sz="2400" b="1" dirty="0"/>
-          </a:p>
-        </p:txBody>
-      </p:sp>
-      <p:sp>
-        <p:nvSpPr>
           <p:cNvPr id="214" name="Google Shape;214;p30"/>
           <p:cNvSpPr txBox="1">
             <a:spLocks noGrp="1"/>
@@ -13372,10 +14103,360 @@
           </a:p>
         </p:txBody>
       </p:sp>
+      <p:pic>
+        <p:nvPicPr>
+          <p:cNvPr id="2" name="Picture 1">
+            <a:extLst>
+              <a:ext uri="{FF2B5EF4-FFF2-40B4-BE49-F238E27FC236}">
+                <a16:creationId xmlns:a16="http://schemas.microsoft.com/office/drawing/2014/main" id="{DD2B15A7-5821-42CA-A683-939C158B43BA}"/>
+              </a:ext>
+            </a:extLst>
+          </p:cNvPr>
+          <p:cNvPicPr>
+            <a:picLocks noChangeAspect="1"/>
+          </p:cNvPicPr>
+          <p:nvPr/>
+        </p:nvPicPr>
+        <p:blipFill>
+          <a:blip r:embed="rId3"/>
+          <a:stretch>
+            <a:fillRect/>
+          </a:stretch>
+        </p:blipFill>
+        <p:spPr>
+          <a:xfrm>
+            <a:off x="439341" y="3595688"/>
+            <a:ext cx="6913959" cy="2737446"/>
+          </a:xfrm>
+          <a:prstGeom prst="rect">
+            <a:avLst/>
+          </a:prstGeom>
+        </p:spPr>
+      </p:pic>
+      <p:pic>
+        <p:nvPicPr>
+          <p:cNvPr id="4" name="Picture 3">
+            <a:extLst>
+              <a:ext uri="{FF2B5EF4-FFF2-40B4-BE49-F238E27FC236}">
+                <a16:creationId xmlns:a16="http://schemas.microsoft.com/office/drawing/2014/main" id="{0760D8B6-B176-41EB-8EFB-5147AB3A536B}"/>
+              </a:ext>
+            </a:extLst>
+          </p:cNvPr>
+          <p:cNvPicPr>
+            <a:picLocks noChangeAspect="1"/>
+          </p:cNvPicPr>
+          <p:nvPr/>
+        </p:nvPicPr>
+        <p:blipFill>
+          <a:blip r:embed="rId4"/>
+          <a:stretch>
+            <a:fillRect/>
+          </a:stretch>
+        </p:blipFill>
+        <p:spPr>
+          <a:xfrm>
+            <a:off x="439341" y="823992"/>
+            <a:ext cx="6913959" cy="2605007"/>
+          </a:xfrm>
+          <a:prstGeom prst="rect">
+            <a:avLst/>
+          </a:prstGeom>
+        </p:spPr>
+      </p:pic>
+      <p:sp>
+        <p:nvSpPr>
+          <p:cNvPr id="7" name="Google Shape;211;p30">
+            <a:extLst>
+              <a:ext uri="{FF2B5EF4-FFF2-40B4-BE49-F238E27FC236}">
+                <a16:creationId xmlns:a16="http://schemas.microsoft.com/office/drawing/2014/main" id="{52FA52F2-525E-4D5F-B845-D01C2905C269}"/>
+              </a:ext>
+            </a:extLst>
+          </p:cNvPr>
+          <p:cNvSpPr txBox="1">
+            <a:spLocks/>
+          </p:cNvSpPr>
+          <p:nvPr/>
+        </p:nvSpPr>
+        <p:spPr>
+          <a:xfrm>
+            <a:off x="685800" y="206293"/>
+            <a:ext cx="7772400" cy="617700"/>
+          </a:xfrm>
+          <a:prstGeom prst="rect">
+            <a:avLst/>
+          </a:prstGeom>
+          <a:noFill/>
+          <a:ln>
+            <a:noFill/>
+          </a:ln>
+        </p:spPr>
+        <p:txBody>
+          <a:bodyPr spcFirstLastPara="1" wrap="square" lIns="91425" tIns="91425" rIns="91425" bIns="91425" anchor="t" anchorCtr="0">
+            <a:noAutofit/>
+          </a:bodyPr>
+          <a:lstStyle>
+            <a:defPPr marR="0" lvl="0" algn="l" rtl="0">
+              <a:lnSpc>
+                <a:spcPct val="100000"/>
+              </a:lnSpc>
+              <a:spcBef>
+                <a:spcPts val="0"/>
+              </a:spcBef>
+              <a:spcAft>
+                <a:spcPts val="0"/>
+              </a:spcAft>
+            </a:defPPr>
+            <a:lvl1pPr marL="457200" marR="0" lvl="0" indent="-431800" algn="l" rtl="0">
+              <a:lnSpc>
+                <a:spcPct val="100000"/>
+              </a:lnSpc>
+              <a:spcBef>
+                <a:spcPts val="600"/>
+              </a:spcBef>
+              <a:spcAft>
+                <a:spcPts val="0"/>
+              </a:spcAft>
+              <a:buClr>
+                <a:srgbClr val="2F3848"/>
+              </a:buClr>
+              <a:buSzPts val="3200"/>
+              <a:buFont typeface="Source Sans Pro"/>
+              <a:buChar char="■"/>
+              <a:defRPr sz="3200" b="0" i="0" u="none" strike="noStrike" cap="none">
+                <a:solidFill>
+                  <a:srgbClr val="2F3848"/>
+                </a:solidFill>
+                <a:latin typeface="Source Sans Pro"/>
+                <a:ea typeface="Source Sans Pro"/>
+                <a:cs typeface="Source Sans Pro"/>
+                <a:sym typeface="Source Sans Pro"/>
+              </a:defRPr>
+            </a:lvl1pPr>
+            <a:lvl2pPr marL="914400" marR="0" lvl="1" indent="-381000" algn="l" rtl="0">
+              <a:lnSpc>
+                <a:spcPct val="100000"/>
+              </a:lnSpc>
+              <a:spcBef>
+                <a:spcPts val="0"/>
+              </a:spcBef>
+              <a:spcAft>
+                <a:spcPts val="0"/>
+              </a:spcAft>
+              <a:buClr>
+                <a:srgbClr val="2F3848"/>
+              </a:buClr>
+              <a:buSzPts val="2400"/>
+              <a:buFont typeface="Source Sans Pro"/>
+              <a:buChar char="○"/>
+              <a:defRPr sz="2400" b="0" i="0" u="none" strike="noStrike" cap="none">
+                <a:solidFill>
+                  <a:srgbClr val="2F3848"/>
+                </a:solidFill>
+                <a:latin typeface="Source Sans Pro"/>
+                <a:ea typeface="Source Sans Pro"/>
+                <a:cs typeface="Source Sans Pro"/>
+                <a:sym typeface="Source Sans Pro"/>
+              </a:defRPr>
+            </a:lvl2pPr>
+            <a:lvl3pPr marL="1371600" marR="0" lvl="2" indent="-381000" algn="l" rtl="0">
+              <a:lnSpc>
+                <a:spcPct val="100000"/>
+              </a:lnSpc>
+              <a:spcBef>
+                <a:spcPts val="0"/>
+              </a:spcBef>
+              <a:spcAft>
+                <a:spcPts val="0"/>
+              </a:spcAft>
+              <a:buClr>
+                <a:srgbClr val="2F3848"/>
+              </a:buClr>
+              <a:buSzPts val="2400"/>
+              <a:buFont typeface="Source Sans Pro"/>
+              <a:buChar char="■"/>
+              <a:defRPr sz="2400" b="0" i="0" u="none" strike="noStrike" cap="none">
+                <a:solidFill>
+                  <a:srgbClr val="2F3848"/>
+                </a:solidFill>
+                <a:latin typeface="Source Sans Pro"/>
+                <a:ea typeface="Source Sans Pro"/>
+                <a:cs typeface="Source Sans Pro"/>
+                <a:sym typeface="Source Sans Pro"/>
+              </a:defRPr>
+            </a:lvl3pPr>
+            <a:lvl4pPr marL="1828800" marR="0" lvl="3" indent="-342900" algn="l" rtl="0">
+              <a:lnSpc>
+                <a:spcPct val="100000"/>
+              </a:lnSpc>
+              <a:spcBef>
+                <a:spcPts val="0"/>
+              </a:spcBef>
+              <a:spcAft>
+                <a:spcPts val="0"/>
+              </a:spcAft>
+              <a:buClr>
+                <a:srgbClr val="2F3848"/>
+              </a:buClr>
+              <a:buSzPts val="1800"/>
+              <a:buFont typeface="Source Sans Pro"/>
+              <a:buChar char="●"/>
+              <a:defRPr sz="1800" b="0" i="0" u="none" strike="noStrike" cap="none">
+                <a:solidFill>
+                  <a:srgbClr val="2F3848"/>
+                </a:solidFill>
+                <a:latin typeface="Source Sans Pro"/>
+                <a:ea typeface="Source Sans Pro"/>
+                <a:cs typeface="Source Sans Pro"/>
+                <a:sym typeface="Source Sans Pro"/>
+              </a:defRPr>
+            </a:lvl4pPr>
+            <a:lvl5pPr marL="2286000" marR="0" lvl="4" indent="-342900" algn="l" rtl="0">
+              <a:lnSpc>
+                <a:spcPct val="100000"/>
+              </a:lnSpc>
+              <a:spcBef>
+                <a:spcPts val="0"/>
+              </a:spcBef>
+              <a:spcAft>
+                <a:spcPts val="0"/>
+              </a:spcAft>
+              <a:buClr>
+                <a:srgbClr val="2F3848"/>
+              </a:buClr>
+              <a:buSzPts val="1800"/>
+              <a:buFont typeface="Source Sans Pro"/>
+              <a:buChar char="○"/>
+              <a:defRPr sz="1800" b="0" i="0" u="none" strike="noStrike" cap="none">
+                <a:solidFill>
+                  <a:srgbClr val="2F3848"/>
+                </a:solidFill>
+                <a:latin typeface="Source Sans Pro"/>
+                <a:ea typeface="Source Sans Pro"/>
+                <a:cs typeface="Source Sans Pro"/>
+                <a:sym typeface="Source Sans Pro"/>
+              </a:defRPr>
+            </a:lvl5pPr>
+            <a:lvl6pPr marL="2743200" marR="0" lvl="5" indent="-342900" algn="l" rtl="0">
+              <a:lnSpc>
+                <a:spcPct val="100000"/>
+              </a:lnSpc>
+              <a:spcBef>
+                <a:spcPts val="0"/>
+              </a:spcBef>
+              <a:spcAft>
+                <a:spcPts val="0"/>
+              </a:spcAft>
+              <a:buClr>
+                <a:srgbClr val="2F3848"/>
+              </a:buClr>
+              <a:buSzPts val="1800"/>
+              <a:buFont typeface="Source Sans Pro"/>
+              <a:buChar char="■"/>
+              <a:defRPr sz="1800" b="0" i="0" u="none" strike="noStrike" cap="none">
+                <a:solidFill>
+                  <a:srgbClr val="2F3848"/>
+                </a:solidFill>
+                <a:latin typeface="Source Sans Pro"/>
+                <a:ea typeface="Source Sans Pro"/>
+                <a:cs typeface="Source Sans Pro"/>
+                <a:sym typeface="Source Sans Pro"/>
+              </a:defRPr>
+            </a:lvl6pPr>
+            <a:lvl7pPr marL="3200400" marR="0" lvl="6" indent="-342900" algn="l" rtl="0">
+              <a:lnSpc>
+                <a:spcPct val="100000"/>
+              </a:lnSpc>
+              <a:spcBef>
+                <a:spcPts val="0"/>
+              </a:spcBef>
+              <a:spcAft>
+                <a:spcPts val="0"/>
+              </a:spcAft>
+              <a:buClr>
+                <a:srgbClr val="2F3848"/>
+              </a:buClr>
+              <a:buSzPts val="1800"/>
+              <a:buFont typeface="Source Sans Pro"/>
+              <a:buChar char="●"/>
+              <a:defRPr sz="1800" b="0" i="0" u="none" strike="noStrike" cap="none">
+                <a:solidFill>
+                  <a:srgbClr val="2F3848"/>
+                </a:solidFill>
+                <a:latin typeface="Source Sans Pro"/>
+                <a:ea typeface="Source Sans Pro"/>
+                <a:cs typeface="Source Sans Pro"/>
+                <a:sym typeface="Source Sans Pro"/>
+              </a:defRPr>
+            </a:lvl7pPr>
+            <a:lvl8pPr marL="3657600" marR="0" lvl="7" indent="-342900" algn="l" rtl="0">
+              <a:lnSpc>
+                <a:spcPct val="100000"/>
+              </a:lnSpc>
+              <a:spcBef>
+                <a:spcPts val="0"/>
+              </a:spcBef>
+              <a:spcAft>
+                <a:spcPts val="0"/>
+              </a:spcAft>
+              <a:buClr>
+                <a:srgbClr val="2F3848"/>
+              </a:buClr>
+              <a:buSzPts val="1800"/>
+              <a:buFont typeface="Source Sans Pro"/>
+              <a:buChar char="○"/>
+              <a:defRPr sz="1800" b="0" i="0" u="none" strike="noStrike" cap="none">
+                <a:solidFill>
+                  <a:srgbClr val="2F3848"/>
+                </a:solidFill>
+                <a:latin typeface="Source Sans Pro"/>
+                <a:ea typeface="Source Sans Pro"/>
+                <a:cs typeface="Source Sans Pro"/>
+                <a:sym typeface="Source Sans Pro"/>
+              </a:defRPr>
+            </a:lvl8pPr>
+            <a:lvl9pPr marL="4114800" marR="0" lvl="8" indent="-342900" algn="l" rtl="0">
+              <a:lnSpc>
+                <a:spcPct val="100000"/>
+              </a:lnSpc>
+              <a:spcBef>
+                <a:spcPts val="0"/>
+              </a:spcBef>
+              <a:spcAft>
+                <a:spcPts val="0"/>
+              </a:spcAft>
+              <a:buClr>
+                <a:srgbClr val="2F3848"/>
+              </a:buClr>
+              <a:buSzPts val="1800"/>
+              <a:buFont typeface="Source Sans Pro"/>
+              <a:buChar char="■"/>
+              <a:defRPr sz="1800" b="0" i="0" u="none" strike="noStrike" cap="none">
+                <a:solidFill>
+                  <a:srgbClr val="2F3848"/>
+                </a:solidFill>
+                <a:latin typeface="Source Sans Pro"/>
+                <a:ea typeface="Source Sans Pro"/>
+                <a:cs typeface="Source Sans Pro"/>
+                <a:sym typeface="Source Sans Pro"/>
+              </a:defRPr>
+            </a:lvl9pPr>
+          </a:lstStyle>
+          <a:p>
+            <a:pPr marL="0" indent="0" algn="ctr">
+              <a:buFont typeface="Source Sans Pro"/>
+              <a:buNone/>
+            </a:pPr>
+            <a:r>
+              <a:rPr lang="en-US" sz="2400" b="1" dirty="0"/>
+              <a:t>Examples of how VaderSentiment Treats Varying Texts</a:t>
+            </a:r>
+          </a:p>
+        </p:txBody>
+      </p:sp>
     </p:spTree>
     <p:extLst>
       <p:ext uri="{BB962C8B-B14F-4D97-AF65-F5344CB8AC3E}">
-        <p14:creationId xmlns:p14="http://schemas.microsoft.com/office/powerpoint/2010/main" val="2275765662"/>
+        <p14:creationId xmlns:p14="http://schemas.microsoft.com/office/powerpoint/2010/main" val="3005740573"/>
       </p:ext>
     </p:extLst>
   </p:cSld>
@@ -13390,7 +14471,7 @@
   <p:cSld>
     <p:spTree>
       <p:nvGrpSpPr>
-        <p:cNvPr id="1" name="Shape 207"/>
+        <p:cNvPr id="1" name="Shape 294"/>
         <p:cNvGrpSpPr/>
         <p:nvPr/>
       </p:nvGrpSpPr>
@@ -13404,18 +14485,455 @@
       </p:grpSpPr>
       <p:sp>
         <p:nvSpPr>
-          <p:cNvPr id="211" name="Google Shape;211;p30"/>
+          <p:cNvPr id="295" name="Google Shape;295;p37"/>
+          <p:cNvSpPr/>
+          <p:nvPr/>
+        </p:nvSpPr>
+        <p:spPr>
+          <a:xfrm>
+            <a:off x="1503074" y="1210468"/>
+            <a:ext cx="6407871" cy="5065598"/>
+          </a:xfrm>
+          <a:custGeom>
+            <a:avLst/>
+            <a:gdLst/>
+            <a:ahLst/>
+            <a:cxnLst/>
+            <a:rect l="l" t="t" r="r" b="b"/>
+            <a:pathLst>
+              <a:path w="143434" h="111665" extrusionOk="0">
+                <a:moveTo>
+                  <a:pt x="71751" y="2308"/>
+                </a:moveTo>
+                <a:lnTo>
+                  <a:pt x="71887" y="2376"/>
+                </a:lnTo>
+                <a:lnTo>
+                  <a:pt x="72091" y="2444"/>
+                </a:lnTo>
+                <a:lnTo>
+                  <a:pt x="72159" y="2647"/>
+                </a:lnTo>
+                <a:lnTo>
+                  <a:pt x="72226" y="2783"/>
+                </a:lnTo>
+                <a:lnTo>
+                  <a:pt x="72159" y="2987"/>
+                </a:lnTo>
+                <a:lnTo>
+                  <a:pt x="72091" y="3190"/>
+                </a:lnTo>
+                <a:lnTo>
+                  <a:pt x="71887" y="3258"/>
+                </a:lnTo>
+                <a:lnTo>
+                  <a:pt x="71751" y="3326"/>
+                </a:lnTo>
+                <a:lnTo>
+                  <a:pt x="71548" y="3258"/>
+                </a:lnTo>
+                <a:lnTo>
+                  <a:pt x="71344" y="3190"/>
+                </a:lnTo>
+                <a:lnTo>
+                  <a:pt x="71276" y="2987"/>
+                </a:lnTo>
+                <a:lnTo>
+                  <a:pt x="71208" y="2783"/>
+                </a:lnTo>
+                <a:lnTo>
+                  <a:pt x="71276" y="2647"/>
+                </a:lnTo>
+                <a:lnTo>
+                  <a:pt x="71344" y="2444"/>
+                </a:lnTo>
+                <a:lnTo>
+                  <a:pt x="71548" y="2376"/>
+                </a:lnTo>
+                <a:lnTo>
+                  <a:pt x="71751" y="2308"/>
+                </a:lnTo>
+                <a:close/>
+                <a:moveTo>
+                  <a:pt x="137528" y="5906"/>
+                </a:moveTo>
+                <a:lnTo>
+                  <a:pt x="137596" y="5974"/>
+                </a:lnTo>
+                <a:lnTo>
+                  <a:pt x="137596" y="89604"/>
+                </a:lnTo>
+                <a:lnTo>
+                  <a:pt x="5906" y="89604"/>
+                </a:lnTo>
+                <a:lnTo>
+                  <a:pt x="5906" y="5974"/>
+                </a:lnTo>
+                <a:lnTo>
+                  <a:pt x="5906" y="5906"/>
+                </a:lnTo>
+                <a:close/>
+                <a:moveTo>
+                  <a:pt x="3530" y="0"/>
+                </a:moveTo>
+                <a:lnTo>
+                  <a:pt x="3191" y="68"/>
+                </a:lnTo>
+                <a:lnTo>
+                  <a:pt x="2444" y="339"/>
+                </a:lnTo>
+                <a:lnTo>
+                  <a:pt x="1766" y="679"/>
+                </a:lnTo>
+                <a:lnTo>
+                  <a:pt x="1155" y="1154"/>
+                </a:lnTo>
+                <a:lnTo>
+                  <a:pt x="679" y="1765"/>
+                </a:lnTo>
+                <a:lnTo>
+                  <a:pt x="272" y="2444"/>
+                </a:lnTo>
+                <a:lnTo>
+                  <a:pt x="69" y="3190"/>
+                </a:lnTo>
+                <a:lnTo>
+                  <a:pt x="1" y="3598"/>
+                </a:lnTo>
+                <a:lnTo>
+                  <a:pt x="1" y="4005"/>
+                </a:lnTo>
+                <a:lnTo>
+                  <a:pt x="1" y="91572"/>
+                </a:lnTo>
+                <a:lnTo>
+                  <a:pt x="1" y="91979"/>
+                </a:lnTo>
+                <a:lnTo>
+                  <a:pt x="69" y="92319"/>
+                </a:lnTo>
+                <a:lnTo>
+                  <a:pt x="272" y="93065"/>
+                </a:lnTo>
+                <a:lnTo>
+                  <a:pt x="679" y="93744"/>
+                </a:lnTo>
+                <a:lnTo>
+                  <a:pt x="1155" y="94355"/>
+                </a:lnTo>
+                <a:lnTo>
+                  <a:pt x="1766" y="94830"/>
+                </a:lnTo>
+                <a:lnTo>
+                  <a:pt x="2444" y="95238"/>
+                </a:lnTo>
+                <a:lnTo>
+                  <a:pt x="3191" y="95441"/>
+                </a:lnTo>
+                <a:lnTo>
+                  <a:pt x="3530" y="95509"/>
+                </a:lnTo>
+                <a:lnTo>
+                  <a:pt x="139904" y="95509"/>
+                </a:lnTo>
+                <a:lnTo>
+                  <a:pt x="140311" y="95441"/>
+                </a:lnTo>
+                <a:lnTo>
+                  <a:pt x="141058" y="95238"/>
+                </a:lnTo>
+                <a:lnTo>
+                  <a:pt x="141737" y="94830"/>
+                </a:lnTo>
+                <a:lnTo>
+                  <a:pt x="142280" y="94355"/>
+                </a:lnTo>
+                <a:lnTo>
+                  <a:pt x="142755" y="93744"/>
+                </a:lnTo>
+                <a:lnTo>
+                  <a:pt x="143162" y="93065"/>
+                </a:lnTo>
+                <a:lnTo>
+                  <a:pt x="143366" y="92319"/>
+                </a:lnTo>
+                <a:lnTo>
+                  <a:pt x="143434" y="91979"/>
+                </a:lnTo>
+                <a:lnTo>
+                  <a:pt x="143434" y="91572"/>
+                </a:lnTo>
+                <a:lnTo>
+                  <a:pt x="143434" y="4005"/>
+                </a:lnTo>
+                <a:lnTo>
+                  <a:pt x="143434" y="3598"/>
+                </a:lnTo>
+                <a:lnTo>
+                  <a:pt x="143366" y="3190"/>
+                </a:lnTo>
+                <a:lnTo>
+                  <a:pt x="143162" y="2444"/>
+                </a:lnTo>
+                <a:lnTo>
+                  <a:pt x="142755" y="1765"/>
+                </a:lnTo>
+                <a:lnTo>
+                  <a:pt x="142280" y="1154"/>
+                </a:lnTo>
+                <a:lnTo>
+                  <a:pt x="141737" y="679"/>
+                </a:lnTo>
+                <a:lnTo>
+                  <a:pt x="141058" y="339"/>
+                </a:lnTo>
+                <a:lnTo>
+                  <a:pt x="140311" y="68"/>
+                </a:lnTo>
+                <a:lnTo>
+                  <a:pt x="139904" y="0"/>
+                </a:lnTo>
+                <a:close/>
+                <a:moveTo>
+                  <a:pt x="55324" y="95713"/>
+                </a:moveTo>
+                <a:lnTo>
+                  <a:pt x="55052" y="98971"/>
+                </a:lnTo>
+                <a:lnTo>
+                  <a:pt x="54713" y="102297"/>
+                </a:lnTo>
+                <a:lnTo>
+                  <a:pt x="54374" y="105284"/>
+                </a:lnTo>
+                <a:lnTo>
+                  <a:pt x="53966" y="107388"/>
+                </a:lnTo>
+                <a:lnTo>
+                  <a:pt x="53763" y="108203"/>
+                </a:lnTo>
+                <a:lnTo>
+                  <a:pt x="53627" y="108746"/>
+                </a:lnTo>
+                <a:lnTo>
+                  <a:pt x="53423" y="109153"/>
+                </a:lnTo>
+                <a:lnTo>
+                  <a:pt x="53220" y="109357"/>
+                </a:lnTo>
+                <a:lnTo>
+                  <a:pt x="52677" y="109493"/>
+                </a:lnTo>
+                <a:lnTo>
+                  <a:pt x="51794" y="109696"/>
+                </a:lnTo>
+                <a:lnTo>
+                  <a:pt x="49690" y="110036"/>
+                </a:lnTo>
+                <a:lnTo>
+                  <a:pt x="48061" y="110307"/>
+                </a:lnTo>
+                <a:lnTo>
+                  <a:pt x="47450" y="110443"/>
+                </a:lnTo>
+                <a:lnTo>
+                  <a:pt x="47110" y="110511"/>
+                </a:lnTo>
+                <a:lnTo>
+                  <a:pt x="47042" y="110579"/>
+                </a:lnTo>
+                <a:lnTo>
+                  <a:pt x="47042" y="110783"/>
+                </a:lnTo>
+                <a:lnTo>
+                  <a:pt x="47110" y="110850"/>
+                </a:lnTo>
+                <a:lnTo>
+                  <a:pt x="47585" y="110918"/>
+                </a:lnTo>
+                <a:lnTo>
+                  <a:pt x="48400" y="110986"/>
+                </a:lnTo>
+                <a:lnTo>
+                  <a:pt x="51387" y="111054"/>
+                </a:lnTo>
+                <a:lnTo>
+                  <a:pt x="56071" y="111122"/>
+                </a:lnTo>
+                <a:lnTo>
+                  <a:pt x="87092" y="111122"/>
+                </a:lnTo>
+                <a:lnTo>
+                  <a:pt x="91708" y="111054"/>
+                </a:lnTo>
+                <a:lnTo>
+                  <a:pt x="94695" y="110986"/>
+                </a:lnTo>
+                <a:lnTo>
+                  <a:pt x="95578" y="110918"/>
+                </a:lnTo>
+                <a:lnTo>
+                  <a:pt x="96053" y="110850"/>
+                </a:lnTo>
+                <a:lnTo>
+                  <a:pt x="96121" y="110783"/>
+                </a:lnTo>
+                <a:lnTo>
+                  <a:pt x="96121" y="110579"/>
+                </a:lnTo>
+                <a:lnTo>
+                  <a:pt x="96053" y="110511"/>
+                </a:lnTo>
+                <a:lnTo>
+                  <a:pt x="95713" y="110443"/>
+                </a:lnTo>
+                <a:lnTo>
+                  <a:pt x="95102" y="110307"/>
+                </a:lnTo>
+                <a:lnTo>
+                  <a:pt x="93473" y="110036"/>
+                </a:lnTo>
+                <a:lnTo>
+                  <a:pt x="91369" y="109696"/>
+                </a:lnTo>
+                <a:lnTo>
+                  <a:pt x="90487" y="109493"/>
+                </a:lnTo>
+                <a:lnTo>
+                  <a:pt x="89943" y="109357"/>
+                </a:lnTo>
+                <a:lnTo>
+                  <a:pt x="89740" y="109153"/>
+                </a:lnTo>
+                <a:lnTo>
+                  <a:pt x="89536" y="108746"/>
+                </a:lnTo>
+                <a:lnTo>
+                  <a:pt x="89333" y="108203"/>
+                </a:lnTo>
+                <a:lnTo>
+                  <a:pt x="89197" y="107388"/>
+                </a:lnTo>
+                <a:lnTo>
+                  <a:pt x="88789" y="105284"/>
+                </a:lnTo>
+                <a:lnTo>
+                  <a:pt x="88382" y="102297"/>
+                </a:lnTo>
+                <a:lnTo>
+                  <a:pt x="88043" y="98971"/>
+                </a:lnTo>
+                <a:lnTo>
+                  <a:pt x="87839" y="95713"/>
+                </a:lnTo>
+                <a:close/>
+                <a:moveTo>
+                  <a:pt x="47450" y="111054"/>
+                </a:moveTo>
+                <a:lnTo>
+                  <a:pt x="47450" y="111122"/>
+                </a:lnTo>
+                <a:lnTo>
+                  <a:pt x="47450" y="111393"/>
+                </a:lnTo>
+                <a:lnTo>
+                  <a:pt x="47518" y="111461"/>
+                </a:lnTo>
+                <a:lnTo>
+                  <a:pt x="48807" y="111529"/>
+                </a:lnTo>
+                <a:lnTo>
+                  <a:pt x="52473" y="111597"/>
+                </a:lnTo>
+                <a:lnTo>
+                  <a:pt x="62384" y="111665"/>
+                </a:lnTo>
+                <a:lnTo>
+                  <a:pt x="80779" y="111665"/>
+                </a:lnTo>
+                <a:lnTo>
+                  <a:pt x="90622" y="111597"/>
+                </a:lnTo>
+                <a:lnTo>
+                  <a:pt x="94356" y="111529"/>
+                </a:lnTo>
+                <a:lnTo>
+                  <a:pt x="95646" y="111461"/>
+                </a:lnTo>
+                <a:lnTo>
+                  <a:pt x="95713" y="111393"/>
+                </a:lnTo>
+                <a:lnTo>
+                  <a:pt x="95713" y="111122"/>
+                </a:lnTo>
+                <a:lnTo>
+                  <a:pt x="95646" y="111054"/>
+                </a:lnTo>
+                <a:lnTo>
+                  <a:pt x="94084" y="111122"/>
+                </a:lnTo>
+                <a:lnTo>
+                  <a:pt x="91233" y="111190"/>
+                </a:lnTo>
+                <a:lnTo>
+                  <a:pt x="80847" y="111258"/>
+                </a:lnTo>
+                <a:lnTo>
+                  <a:pt x="62316" y="111258"/>
+                </a:lnTo>
+                <a:lnTo>
+                  <a:pt x="51930" y="111190"/>
+                </a:lnTo>
+                <a:lnTo>
+                  <a:pt x="49079" y="111122"/>
+                </a:lnTo>
+                <a:lnTo>
+                  <a:pt x="47518" y="111054"/>
+                </a:lnTo>
+                <a:close/>
+              </a:path>
+            </a:pathLst>
+          </a:custGeom>
+          <a:solidFill>
+            <a:srgbClr val="2F3848"/>
+          </a:solidFill>
+          <a:ln>
+            <a:noFill/>
+          </a:ln>
+        </p:spPr>
+        <p:txBody>
+          <a:bodyPr spcFirstLastPara="1" wrap="square" lIns="91425" tIns="91425" rIns="91425" bIns="91425" anchor="ctr" anchorCtr="0">
+            <a:noAutofit/>
+          </a:bodyPr>
+          <a:lstStyle/>
+          <a:p>
+            <a:pPr marL="0" lvl="0" indent="0" algn="l" rtl="0">
+              <a:spcBef>
+                <a:spcPts val="0"/>
+              </a:spcBef>
+              <a:spcAft>
+                <a:spcPts val="0"/>
+              </a:spcAft>
+              <a:buNone/>
+            </a:pPr>
+            <a:endParaRPr/>
+          </a:p>
+        </p:txBody>
+      </p:sp>
+      <p:sp>
+        <p:nvSpPr>
+          <p:cNvPr id="296" name="Google Shape;296;p37"/>
           <p:cNvSpPr txBox="1">
             <a:spLocks noGrp="1"/>
           </p:cNvSpPr>
           <p:nvPr>
-            <p:ph type="subTitle" idx="4294967295"/>
+            <p:ph type="body" idx="4294967295"/>
           </p:nvPr>
         </p:nvSpPr>
         <p:spPr>
           <a:xfrm>
-            <a:off x="685800" y="2697085"/>
-            <a:ext cx="7772400" cy="617700"/>
+            <a:off x="565603" y="227672"/>
+            <a:ext cx="8282812" cy="882403"/>
           </a:xfrm>
           <a:prstGeom prst="rect">
             <a:avLst/>
@@ -13427,22 +14945,20 @@
           </a:bodyPr>
           <a:lstStyle/>
           <a:p>
-            <a:pPr marL="0" lvl="0" indent="0" algn="l" rtl="0">
-              <a:spcBef>
-                <a:spcPts val="600"/>
-              </a:spcBef>
-              <a:spcAft>
-                <a:spcPts val="0"/>
-              </a:spcAft>
+            <a:pPr marL="0" lvl="0" indent="0">
               <a:buNone/>
             </a:pPr>
+            <a:r>
+              <a:rPr lang="en-US" sz="2400" b="1" dirty="0"/>
+              <a:t>We pulled the combined compound sentiment score into the dataframe using the headline description as our argument.</a:t>
+            </a:r>
             <a:endParaRPr sz="2400" b="1" dirty="0"/>
           </a:p>
         </p:txBody>
       </p:sp>
       <p:sp>
         <p:nvSpPr>
-          <p:cNvPr id="214" name="Google Shape;214;p30"/>
+          <p:cNvPr id="298" name="Google Shape;298;p37"/>
           <p:cNvSpPr txBox="1">
             <a:spLocks noGrp="1"/>
           </p:cNvSpPr>
@@ -13482,10 +14998,57 @@
           </a:p>
         </p:txBody>
       </p:sp>
+      <p:pic>
+        <p:nvPicPr>
+          <p:cNvPr id="4098" name="Picture 2" descr="sentiment_SC sentiment &#10;Published description keywords &#10;Bank of &#10;2019-06- &#10;Corp. the &#10;27T01 &#10;USS second &#10;Employees &#10;said the &#10;2019-06- &#10;provider title &#10;bank of &#10;amenca &#10;corp. join forbes &#10;saying , det &#10;enti... &#10;wayfair &#10;employee &#10;s walk &#10;uri &#10;Bank Of &#10;htt &#10;America, &#10;Wayfair, o &#10;Join those s/morgansimo &#10;Saying n/2019/... &#10;Wayfair &#10;employee https:/lwwnw.m &#10;donation was &#10;out,donati &#10;mercuryn &#10;ews &#10;twincities &#10;s walk &#10;company &#10;makes &#10;$100. &#10;Wayfair &#10;workers &#10;walk out &#10;in protest &#10;W ayfair &#10;staff &#10;migrant &#10;cont. &#10;Wayfair &#10;m 01 &#10;6 &#10;not enough &#10;and. &#10;Employees &#10;at online &#10;2019-06- &#10;home &#10;2 &#10;26T23:2156 &#10;furnishings &#10;Employees &#10;Of American &#10;2019-06- &#10;online &#10;3 &#10;26T2244:42 &#10;furniture &#10;store W &#10;on. compa &#10;center,twi &#10;cities. way &#10;fair, protes &#10;centers &#10;contract,e &#10;american. &#10;wayfair &#10;s stage &#10;walkout,b &#10;camps, p. &#10;dailymail over &#10;wincities.com/ &#10;2019/06/261w &#10;w.d &#10;ailvmail.co.uk/ &#10;wires/pfp/articl &#10;-O. negative &#10;-0_0772 negative &#10;-O. 0258 negative &#10;-0.0258 negative &#10;-0.25 negative &#10;Wayfairempl &#10;2019-06- oyees &#10;4 &#10;walked off &#10;the job to &#10;pr... &#10;adage &#10;employee &#10;s stage om/article/ne &#10;walkout to ws/wavfair- &#10;protest ">
+            <a:extLst>
+              <a:ext uri="{FF2B5EF4-FFF2-40B4-BE49-F238E27FC236}">
+                <a16:creationId xmlns:a16="http://schemas.microsoft.com/office/drawing/2014/main" id="{A5A1B238-6C79-4165-BD1C-3B178188ECB3}"/>
+              </a:ext>
+            </a:extLst>
+          </p:cNvPr>
+          <p:cNvPicPr>
+            <a:picLocks noChangeAspect="1" noChangeArrowheads="1"/>
+          </p:cNvPicPr>
+          <p:nvPr/>
+        </p:nvPicPr>
+        <p:blipFill>
+          <a:blip r:embed="rId3">
+            <a:extLst>
+              <a:ext uri="{28A0092B-C50C-407E-A947-70E740481C1C}">
+                <a14:useLocalDpi xmlns:a14="http://schemas.microsoft.com/office/drawing/2010/main" val="0"/>
+              </a:ext>
+            </a:extLst>
+          </a:blip>
+          <a:srcRect/>
+          <a:stretch>
+            <a:fillRect/>
+          </a:stretch>
+        </p:blipFill>
+        <p:spPr bwMode="auto">
+          <a:xfrm>
+            <a:off x="1803113" y="1480926"/>
+            <a:ext cx="5837814" cy="3753081"/>
+          </a:xfrm>
+          <a:prstGeom prst="rect">
+            <a:avLst/>
+          </a:prstGeom>
+          <a:noFill/>
+          <a:extLst>
+            <a:ext uri="{909E8E84-426E-40DD-AFC4-6F175D3DCCD1}">
+              <a14:hiddenFill xmlns:a14="http://schemas.microsoft.com/office/drawing/2010/main">
+                <a:solidFill>
+                  <a:srgbClr val="FFFFFF"/>
+                </a:solidFill>
+              </a14:hiddenFill>
+            </a:ext>
+          </a:extLst>
+        </p:spPr>
+      </p:pic>
     </p:spTree>
     <p:extLst>
       <p:ext uri="{BB962C8B-B14F-4D97-AF65-F5344CB8AC3E}">
-        <p14:creationId xmlns:p14="http://schemas.microsoft.com/office/powerpoint/2010/main" val="493436203"/>
+        <p14:creationId xmlns:p14="http://schemas.microsoft.com/office/powerpoint/2010/main" val="3089656685"/>
       </p:ext>
     </p:extLst>
   </p:cSld>

</xml_diff>

<commit_message>
Christian Added the Company Graphs
I added the company graphs to the slides.
</commit_message>
<xml_diff>
--- a/News Project Presentation.pptx
+++ b/News Project Presentation.pptx
@@ -5,7 +5,7 @@
     <p:sldMasterId id="2147483661" r:id="rId1"/>
   </p:sldMasterIdLst>
   <p:notesMasterIdLst>
-    <p:notesMasterId r:id="rId29"/>
+    <p:notesMasterId r:id="rId25"/>
   </p:notesMasterIdLst>
   <p:sldIdLst>
     <p:sldId id="256" r:id="rId2"/>
@@ -24,27 +24,23 @@
     <p:sldId id="262" r:id="rId15"/>
     <p:sldId id="264" r:id="rId16"/>
     <p:sldId id="289" r:id="rId17"/>
-    <p:sldId id="290" r:id="rId18"/>
-    <p:sldId id="291" r:id="rId19"/>
-    <p:sldId id="292" r:id="rId20"/>
-    <p:sldId id="293" r:id="rId21"/>
-    <p:sldId id="294" r:id="rId22"/>
-    <p:sldId id="295" r:id="rId23"/>
-    <p:sldId id="298" r:id="rId24"/>
-    <p:sldId id="299" r:id="rId25"/>
-    <p:sldId id="301" r:id="rId26"/>
-    <p:sldId id="280" r:id="rId27"/>
-    <p:sldId id="300" r:id="rId28"/>
+    <p:sldId id="304" r:id="rId18"/>
+    <p:sldId id="305" r:id="rId19"/>
+    <p:sldId id="298" r:id="rId20"/>
+    <p:sldId id="299" r:id="rId21"/>
+    <p:sldId id="301" r:id="rId22"/>
+    <p:sldId id="280" r:id="rId23"/>
+    <p:sldId id="300" r:id="rId24"/>
   </p:sldIdLst>
   <p:sldSz cx="9144000" cy="6858000" type="screen4x3"/>
   <p:notesSz cx="6858000" cy="9144000"/>
   <p:embeddedFontLst>
     <p:embeddedFont>
-      <p:font typeface="Source Sans Pro" panose="020B0604020202020204" pitchFamily="34" charset="0"/>
-      <p:regular r:id="rId30"/>
-      <p:bold r:id="rId31"/>
-      <p:italic r:id="rId32"/>
-      <p:boldItalic r:id="rId33"/>
+      <p:font typeface="Source Sans Pro" panose="020B0503030403020204" pitchFamily="34" charset="0"/>
+      <p:regular r:id="rId26"/>
+      <p:bold r:id="rId27"/>
+      <p:italic r:id="rId28"/>
+      <p:boldItalic r:id="rId29"/>
     </p:embeddedFont>
   </p:embeddedFontLst>
   <p:defaultTextStyle>
@@ -1702,7 +1698,7 @@
     </p:spTree>
     <p:extLst>
       <p:ext uri="{BB962C8B-B14F-4D97-AF65-F5344CB8AC3E}">
-        <p14:creationId xmlns:p14="http://schemas.microsoft.com/office/powerpoint/2010/main" val="239698739"/>
+        <p14:creationId xmlns:p14="http://schemas.microsoft.com/office/powerpoint/2010/main" val="2089990420"/>
       </p:ext>
     </p:extLst>
   </p:cSld>
@@ -1811,7 +1807,7 @@
     </p:spTree>
     <p:extLst>
       <p:ext uri="{BB962C8B-B14F-4D97-AF65-F5344CB8AC3E}">
-        <p14:creationId xmlns:p14="http://schemas.microsoft.com/office/powerpoint/2010/main" val="1696303429"/>
+        <p14:creationId xmlns:p14="http://schemas.microsoft.com/office/powerpoint/2010/main" val="912896023"/>
       </p:ext>
     </p:extLst>
   </p:cSld>
@@ -1826,7 +1822,7 @@
   <p:cSld>
     <p:spTree>
       <p:nvGrpSpPr>
-        <p:cNvPr id="1" name="Shape 204"/>
+        <p:cNvPr id="1" name="Shape 111"/>
         <p:cNvGrpSpPr/>
         <p:nvPr/>
       </p:nvGrpSpPr>
@@ -1840,7 +1836,7 @@
       </p:grpSpPr>
       <p:sp>
         <p:nvSpPr>
-          <p:cNvPr id="205" name="Google Shape;205;g35ed75ccf_033:notes"/>
+          <p:cNvPr id="112" name="Google Shape;112;g35f391192_09:notes"/>
           <p:cNvSpPr>
             <a:spLocks noGrp="1" noRot="1" noChangeAspect="1"/>
           </p:cNvSpPr>
@@ -1881,7 +1877,7 @@
       </p:sp>
       <p:sp>
         <p:nvSpPr>
-          <p:cNvPr id="206" name="Google Shape;206;g35ed75ccf_033:notes"/>
+          <p:cNvPr id="113" name="Google Shape;113;g35f391192_09:notes"/>
           <p:cNvSpPr txBox="1">
             <a:spLocks noGrp="1"/>
           </p:cNvSpPr>
@@ -1920,7 +1916,7 @@
     </p:spTree>
     <p:extLst>
       <p:ext uri="{BB962C8B-B14F-4D97-AF65-F5344CB8AC3E}">
-        <p14:creationId xmlns:p14="http://schemas.microsoft.com/office/powerpoint/2010/main" val="52558433"/>
+        <p14:creationId xmlns:p14="http://schemas.microsoft.com/office/powerpoint/2010/main" val="3813591822"/>
       </p:ext>
     </p:extLst>
   </p:cSld>
@@ -2039,333 +2035,6 @@
   <p:cSld>
     <p:spTree>
       <p:nvGrpSpPr>
-        <p:cNvPr id="1" name="Shape 204"/>
-        <p:cNvGrpSpPr/>
-        <p:nvPr/>
-      </p:nvGrpSpPr>
-      <p:grpSpPr>
-        <a:xfrm>
-          <a:off x="0" y="0"/>
-          <a:ext cx="0" cy="0"/>
-          <a:chOff x="0" y="0"/>
-          <a:chExt cx="0" cy="0"/>
-        </a:xfrm>
-      </p:grpSpPr>
-      <p:sp>
-        <p:nvSpPr>
-          <p:cNvPr id="205" name="Google Shape;205;g35ed75ccf_033:notes"/>
-          <p:cNvSpPr>
-            <a:spLocks noGrp="1" noRot="1" noChangeAspect="1"/>
-          </p:cNvSpPr>
-          <p:nvPr>
-            <p:ph type="sldImg" idx="2"/>
-          </p:nvPr>
-        </p:nvSpPr>
-        <p:spPr>
-          <a:xfrm>
-            <a:off x="1143000" y="685800"/>
-            <a:ext cx="4572000" cy="3429000"/>
-          </a:xfrm>
-          <a:custGeom>
-            <a:avLst/>
-            <a:gdLst/>
-            <a:ahLst/>
-            <a:cxnLst/>
-            <a:rect l="l" t="t" r="r" b="b"/>
-            <a:pathLst>
-              <a:path w="120000" h="120000" extrusionOk="0">
-                <a:moveTo>
-                  <a:pt x="0" y="0"/>
-                </a:moveTo>
-                <a:lnTo>
-                  <a:pt x="120000" y="0"/>
-                </a:lnTo>
-                <a:lnTo>
-                  <a:pt x="120000" y="120000"/>
-                </a:lnTo>
-                <a:lnTo>
-                  <a:pt x="0" y="120000"/>
-                </a:lnTo>
-                <a:close/>
-              </a:path>
-            </a:pathLst>
-          </a:custGeom>
-        </p:spPr>
-      </p:sp>
-      <p:sp>
-        <p:nvSpPr>
-          <p:cNvPr id="206" name="Google Shape;206;g35ed75ccf_033:notes"/>
-          <p:cNvSpPr txBox="1">
-            <a:spLocks noGrp="1"/>
-          </p:cNvSpPr>
-          <p:nvPr>
-            <p:ph type="body" idx="1"/>
-          </p:nvPr>
-        </p:nvSpPr>
-        <p:spPr>
-          <a:xfrm>
-            <a:off x="685800" y="4343400"/>
-            <a:ext cx="5486400" cy="4114800"/>
-          </a:xfrm>
-          <a:prstGeom prst="rect">
-            <a:avLst/>
-          </a:prstGeom>
-        </p:spPr>
-        <p:txBody>
-          <a:bodyPr spcFirstLastPara="1" wrap="square" lIns="91425" tIns="91425" rIns="91425" bIns="91425" anchor="t" anchorCtr="0">
-            <a:noAutofit/>
-          </a:bodyPr>
-          <a:lstStyle/>
-          <a:p>
-            <a:pPr marL="0" lvl="0" indent="0" algn="l" rtl="0">
-              <a:spcBef>
-                <a:spcPts val="0"/>
-              </a:spcBef>
-              <a:spcAft>
-                <a:spcPts val="0"/>
-              </a:spcAft>
-              <a:buNone/>
-            </a:pPr>
-            <a:endParaRPr/>
-          </a:p>
-        </p:txBody>
-      </p:sp>
-    </p:spTree>
-    <p:extLst>
-      <p:ext uri="{BB962C8B-B14F-4D97-AF65-F5344CB8AC3E}">
-        <p14:creationId xmlns:p14="http://schemas.microsoft.com/office/powerpoint/2010/main" val="144918957"/>
-      </p:ext>
-    </p:extLst>
-  </p:cSld>
-  <p:clrMapOvr>
-    <a:masterClrMapping/>
-  </p:clrMapOvr>
-</p:notes>
-</file>
-
-<file path=ppt/notesSlides/notesSlide21.xml><?xml version="1.0" encoding="utf-8"?>
-<p:notes xmlns:a="http://schemas.openxmlformats.org/drawingml/2006/main" xmlns:r="http://schemas.openxmlformats.org/officeDocument/2006/relationships" xmlns:p="http://schemas.openxmlformats.org/presentationml/2006/main" showMasterSp="0" showMasterPhAnim="0">
-  <p:cSld>
-    <p:spTree>
-      <p:nvGrpSpPr>
-        <p:cNvPr id="1" name="Shape 204"/>
-        <p:cNvGrpSpPr/>
-        <p:nvPr/>
-      </p:nvGrpSpPr>
-      <p:grpSpPr>
-        <a:xfrm>
-          <a:off x="0" y="0"/>
-          <a:ext cx="0" cy="0"/>
-          <a:chOff x="0" y="0"/>
-          <a:chExt cx="0" cy="0"/>
-        </a:xfrm>
-      </p:grpSpPr>
-      <p:sp>
-        <p:nvSpPr>
-          <p:cNvPr id="205" name="Google Shape;205;g35ed75ccf_033:notes"/>
-          <p:cNvSpPr>
-            <a:spLocks noGrp="1" noRot="1" noChangeAspect="1"/>
-          </p:cNvSpPr>
-          <p:nvPr>
-            <p:ph type="sldImg" idx="2"/>
-          </p:nvPr>
-        </p:nvSpPr>
-        <p:spPr>
-          <a:xfrm>
-            <a:off x="1143000" y="685800"/>
-            <a:ext cx="4572000" cy="3429000"/>
-          </a:xfrm>
-          <a:custGeom>
-            <a:avLst/>
-            <a:gdLst/>
-            <a:ahLst/>
-            <a:cxnLst/>
-            <a:rect l="l" t="t" r="r" b="b"/>
-            <a:pathLst>
-              <a:path w="120000" h="120000" extrusionOk="0">
-                <a:moveTo>
-                  <a:pt x="0" y="0"/>
-                </a:moveTo>
-                <a:lnTo>
-                  <a:pt x="120000" y="0"/>
-                </a:lnTo>
-                <a:lnTo>
-                  <a:pt x="120000" y="120000"/>
-                </a:lnTo>
-                <a:lnTo>
-                  <a:pt x="0" y="120000"/>
-                </a:lnTo>
-                <a:close/>
-              </a:path>
-            </a:pathLst>
-          </a:custGeom>
-        </p:spPr>
-      </p:sp>
-      <p:sp>
-        <p:nvSpPr>
-          <p:cNvPr id="206" name="Google Shape;206;g35ed75ccf_033:notes"/>
-          <p:cNvSpPr txBox="1">
-            <a:spLocks noGrp="1"/>
-          </p:cNvSpPr>
-          <p:nvPr>
-            <p:ph type="body" idx="1"/>
-          </p:nvPr>
-        </p:nvSpPr>
-        <p:spPr>
-          <a:xfrm>
-            <a:off x="685800" y="4343400"/>
-            <a:ext cx="5486400" cy="4114800"/>
-          </a:xfrm>
-          <a:prstGeom prst="rect">
-            <a:avLst/>
-          </a:prstGeom>
-        </p:spPr>
-        <p:txBody>
-          <a:bodyPr spcFirstLastPara="1" wrap="square" lIns="91425" tIns="91425" rIns="91425" bIns="91425" anchor="t" anchorCtr="0">
-            <a:noAutofit/>
-          </a:bodyPr>
-          <a:lstStyle/>
-          <a:p>
-            <a:pPr marL="0" lvl="0" indent="0" algn="l" rtl="0">
-              <a:spcBef>
-                <a:spcPts val="0"/>
-              </a:spcBef>
-              <a:spcAft>
-                <a:spcPts val="0"/>
-              </a:spcAft>
-              <a:buNone/>
-            </a:pPr>
-            <a:endParaRPr/>
-          </a:p>
-        </p:txBody>
-      </p:sp>
-    </p:spTree>
-    <p:extLst>
-      <p:ext uri="{BB962C8B-B14F-4D97-AF65-F5344CB8AC3E}">
-        <p14:creationId xmlns:p14="http://schemas.microsoft.com/office/powerpoint/2010/main" val="3444948221"/>
-      </p:ext>
-    </p:extLst>
-  </p:cSld>
-  <p:clrMapOvr>
-    <a:masterClrMapping/>
-  </p:clrMapOvr>
-</p:notes>
-</file>
-
-<file path=ppt/notesSlides/notesSlide22.xml><?xml version="1.0" encoding="utf-8"?>
-<p:notes xmlns:a="http://schemas.openxmlformats.org/drawingml/2006/main" xmlns:r="http://schemas.openxmlformats.org/officeDocument/2006/relationships" xmlns:p="http://schemas.openxmlformats.org/presentationml/2006/main" showMasterSp="0" showMasterPhAnim="0">
-  <p:cSld>
-    <p:spTree>
-      <p:nvGrpSpPr>
-        <p:cNvPr id="1" name="Shape 204"/>
-        <p:cNvGrpSpPr/>
-        <p:nvPr/>
-      </p:nvGrpSpPr>
-      <p:grpSpPr>
-        <a:xfrm>
-          <a:off x="0" y="0"/>
-          <a:ext cx="0" cy="0"/>
-          <a:chOff x="0" y="0"/>
-          <a:chExt cx="0" cy="0"/>
-        </a:xfrm>
-      </p:grpSpPr>
-      <p:sp>
-        <p:nvSpPr>
-          <p:cNvPr id="205" name="Google Shape;205;g35ed75ccf_033:notes"/>
-          <p:cNvSpPr>
-            <a:spLocks noGrp="1" noRot="1" noChangeAspect="1"/>
-          </p:cNvSpPr>
-          <p:nvPr>
-            <p:ph type="sldImg" idx="2"/>
-          </p:nvPr>
-        </p:nvSpPr>
-        <p:spPr>
-          <a:xfrm>
-            <a:off x="1143000" y="685800"/>
-            <a:ext cx="4572000" cy="3429000"/>
-          </a:xfrm>
-          <a:custGeom>
-            <a:avLst/>
-            <a:gdLst/>
-            <a:ahLst/>
-            <a:cxnLst/>
-            <a:rect l="l" t="t" r="r" b="b"/>
-            <a:pathLst>
-              <a:path w="120000" h="120000" extrusionOk="0">
-                <a:moveTo>
-                  <a:pt x="0" y="0"/>
-                </a:moveTo>
-                <a:lnTo>
-                  <a:pt x="120000" y="0"/>
-                </a:lnTo>
-                <a:lnTo>
-                  <a:pt x="120000" y="120000"/>
-                </a:lnTo>
-                <a:lnTo>
-                  <a:pt x="0" y="120000"/>
-                </a:lnTo>
-                <a:close/>
-              </a:path>
-            </a:pathLst>
-          </a:custGeom>
-        </p:spPr>
-      </p:sp>
-      <p:sp>
-        <p:nvSpPr>
-          <p:cNvPr id="206" name="Google Shape;206;g35ed75ccf_033:notes"/>
-          <p:cNvSpPr txBox="1">
-            <a:spLocks noGrp="1"/>
-          </p:cNvSpPr>
-          <p:nvPr>
-            <p:ph type="body" idx="1"/>
-          </p:nvPr>
-        </p:nvSpPr>
-        <p:spPr>
-          <a:xfrm>
-            <a:off x="685800" y="4343400"/>
-            <a:ext cx="5486400" cy="4114800"/>
-          </a:xfrm>
-          <a:prstGeom prst="rect">
-            <a:avLst/>
-          </a:prstGeom>
-        </p:spPr>
-        <p:txBody>
-          <a:bodyPr spcFirstLastPara="1" wrap="square" lIns="91425" tIns="91425" rIns="91425" bIns="91425" anchor="t" anchorCtr="0">
-            <a:noAutofit/>
-          </a:bodyPr>
-          <a:lstStyle/>
-          <a:p>
-            <a:pPr marL="0" lvl="0" indent="0" algn="l" rtl="0">
-              <a:spcBef>
-                <a:spcPts val="0"/>
-              </a:spcBef>
-              <a:spcAft>
-                <a:spcPts val="0"/>
-              </a:spcAft>
-              <a:buNone/>
-            </a:pPr>
-            <a:endParaRPr/>
-          </a:p>
-        </p:txBody>
-      </p:sp>
-    </p:spTree>
-    <p:extLst>
-      <p:ext uri="{BB962C8B-B14F-4D97-AF65-F5344CB8AC3E}">
-        <p14:creationId xmlns:p14="http://schemas.microsoft.com/office/powerpoint/2010/main" val="1053656563"/>
-      </p:ext>
-    </p:extLst>
-  </p:cSld>
-  <p:clrMapOvr>
-    <a:masterClrMapping/>
-  </p:clrMapOvr>
-</p:notes>
-</file>
-
-<file path=ppt/notesSlides/notesSlide23.xml><?xml version="1.0" encoding="utf-8"?>
-<p:notes xmlns:a="http://schemas.openxmlformats.org/drawingml/2006/main" xmlns:r="http://schemas.openxmlformats.org/officeDocument/2006/relationships" xmlns:p="http://schemas.openxmlformats.org/presentationml/2006/main" showMasterSp="0" showMasterPhAnim="0">
-  <p:cSld>
-    <p:spTree>
-      <p:nvGrpSpPr>
         <p:cNvPr id="1" name="Shape 111"/>
         <p:cNvGrpSpPr/>
         <p:nvPr/>
@@ -2460,115 +2129,6 @@
     </p:spTree>
     <p:extLst>
       <p:ext uri="{BB962C8B-B14F-4D97-AF65-F5344CB8AC3E}">
-        <p14:creationId xmlns:p14="http://schemas.microsoft.com/office/powerpoint/2010/main" val="3813591822"/>
-      </p:ext>
-    </p:extLst>
-  </p:cSld>
-  <p:clrMapOvr>
-    <a:masterClrMapping/>
-  </p:clrMapOvr>
-</p:notes>
-</file>
-
-<file path=ppt/notesSlides/notesSlide24.xml><?xml version="1.0" encoding="utf-8"?>
-<p:notes xmlns:a="http://schemas.openxmlformats.org/drawingml/2006/main" xmlns:r="http://schemas.openxmlformats.org/officeDocument/2006/relationships" xmlns:p="http://schemas.openxmlformats.org/presentationml/2006/main" showMasterSp="0" showMasterPhAnim="0">
-  <p:cSld>
-    <p:spTree>
-      <p:nvGrpSpPr>
-        <p:cNvPr id="1" name="Shape 111"/>
-        <p:cNvGrpSpPr/>
-        <p:nvPr/>
-      </p:nvGrpSpPr>
-      <p:grpSpPr>
-        <a:xfrm>
-          <a:off x="0" y="0"/>
-          <a:ext cx="0" cy="0"/>
-          <a:chOff x="0" y="0"/>
-          <a:chExt cx="0" cy="0"/>
-        </a:xfrm>
-      </p:grpSpPr>
-      <p:sp>
-        <p:nvSpPr>
-          <p:cNvPr id="112" name="Google Shape;112;g35f391192_09:notes"/>
-          <p:cNvSpPr>
-            <a:spLocks noGrp="1" noRot="1" noChangeAspect="1"/>
-          </p:cNvSpPr>
-          <p:nvPr>
-            <p:ph type="sldImg" idx="2"/>
-          </p:nvPr>
-        </p:nvSpPr>
-        <p:spPr>
-          <a:xfrm>
-            <a:off x="1143000" y="685800"/>
-            <a:ext cx="4572000" cy="3429000"/>
-          </a:xfrm>
-          <a:custGeom>
-            <a:avLst/>
-            <a:gdLst/>
-            <a:ahLst/>
-            <a:cxnLst/>
-            <a:rect l="l" t="t" r="r" b="b"/>
-            <a:pathLst>
-              <a:path w="120000" h="120000" extrusionOk="0">
-                <a:moveTo>
-                  <a:pt x="0" y="0"/>
-                </a:moveTo>
-                <a:lnTo>
-                  <a:pt x="120000" y="0"/>
-                </a:lnTo>
-                <a:lnTo>
-                  <a:pt x="120000" y="120000"/>
-                </a:lnTo>
-                <a:lnTo>
-                  <a:pt x="0" y="120000"/>
-                </a:lnTo>
-                <a:close/>
-              </a:path>
-            </a:pathLst>
-          </a:custGeom>
-        </p:spPr>
-      </p:sp>
-      <p:sp>
-        <p:nvSpPr>
-          <p:cNvPr id="113" name="Google Shape;113;g35f391192_09:notes"/>
-          <p:cNvSpPr txBox="1">
-            <a:spLocks noGrp="1"/>
-          </p:cNvSpPr>
-          <p:nvPr>
-            <p:ph type="body" idx="1"/>
-          </p:nvPr>
-        </p:nvSpPr>
-        <p:spPr>
-          <a:xfrm>
-            <a:off x="685800" y="4343400"/>
-            <a:ext cx="5486400" cy="4114800"/>
-          </a:xfrm>
-          <a:prstGeom prst="rect">
-            <a:avLst/>
-          </a:prstGeom>
-        </p:spPr>
-        <p:txBody>
-          <a:bodyPr spcFirstLastPara="1" wrap="square" lIns="91425" tIns="91425" rIns="91425" bIns="91425" anchor="t" anchorCtr="0">
-            <a:noAutofit/>
-          </a:bodyPr>
-          <a:lstStyle/>
-          <a:p>
-            <a:pPr marL="0" lvl="0" indent="0" algn="l" rtl="0">
-              <a:spcBef>
-                <a:spcPts val="0"/>
-              </a:spcBef>
-              <a:spcAft>
-                <a:spcPts val="0"/>
-              </a:spcAft>
-              <a:buNone/>
-            </a:pPr>
-            <a:endParaRPr/>
-          </a:p>
-        </p:txBody>
-      </p:sp>
-    </p:spTree>
-    <p:extLst>
-      <p:ext uri="{BB962C8B-B14F-4D97-AF65-F5344CB8AC3E}">
         <p14:creationId xmlns:p14="http://schemas.microsoft.com/office/powerpoint/2010/main" val="3912726128"/>
       </p:ext>
     </p:extLst>
@@ -2579,7 +2139,7 @@
 </p:notes>
 </file>
 
-<file path=ppt/notesSlides/notesSlide25.xml><?xml version="1.0" encoding="utf-8"?>
+<file path=ppt/notesSlides/notesSlide21.xml><?xml version="1.0" encoding="utf-8"?>
 <p:notes xmlns:a="http://schemas.openxmlformats.org/drawingml/2006/main" xmlns:r="http://schemas.openxmlformats.org/officeDocument/2006/relationships" xmlns:p="http://schemas.openxmlformats.org/presentationml/2006/main" showMasterSp="0" showMasterPhAnim="0">
   <p:cSld>
     <p:spTree>
@@ -2688,7 +2248,7 @@
 </p:notes>
 </file>
 
-<file path=ppt/notesSlides/notesSlide26.xml><?xml version="1.0" encoding="utf-8"?>
+<file path=ppt/notesSlides/notesSlide22.xml><?xml version="1.0" encoding="utf-8"?>
 <p:notes xmlns:a="http://schemas.openxmlformats.org/drawingml/2006/main" xmlns:r="http://schemas.openxmlformats.org/officeDocument/2006/relationships" xmlns:p="http://schemas.openxmlformats.org/presentationml/2006/main" showMasterSp="0" showMasterPhAnim="0">
   <p:cSld>
     <p:spTree>
@@ -2792,7 +2352,7 @@
 </p:notes>
 </file>
 
-<file path=ppt/notesSlides/notesSlide27.xml><?xml version="1.0" encoding="utf-8"?>
+<file path=ppt/notesSlides/notesSlide23.xml><?xml version="1.0" encoding="utf-8"?>
 <p:notes xmlns:a="http://schemas.openxmlformats.org/drawingml/2006/main" xmlns:r="http://schemas.openxmlformats.org/officeDocument/2006/relationships" xmlns:p="http://schemas.openxmlformats.org/presentationml/2006/main" showMasterSp="0" showMasterPhAnim="0">
   <p:cSld>
     <p:spTree>
@@ -11095,48 +10655,6 @@
       </p:grpSpPr>
       <p:sp>
         <p:nvSpPr>
-          <p:cNvPr id="211" name="Google Shape;211;p30"/>
-          <p:cNvSpPr txBox="1">
-            <a:spLocks noGrp="1"/>
-          </p:cNvSpPr>
-          <p:nvPr>
-            <p:ph type="subTitle" idx="4294967295"/>
-          </p:nvPr>
-        </p:nvSpPr>
-        <p:spPr>
-          <a:xfrm>
-            <a:off x="685800" y="2697085"/>
-            <a:ext cx="7772400" cy="617700"/>
-          </a:xfrm>
-          <a:prstGeom prst="rect">
-            <a:avLst/>
-          </a:prstGeom>
-        </p:spPr>
-        <p:txBody>
-          <a:bodyPr spcFirstLastPara="1" wrap="square" lIns="91425" tIns="91425" rIns="91425" bIns="91425" anchor="t" anchorCtr="0">
-            <a:noAutofit/>
-          </a:bodyPr>
-          <a:lstStyle/>
-          <a:p>
-            <a:pPr marL="0" lvl="0" indent="0" algn="l" rtl="0">
-              <a:spcBef>
-                <a:spcPts val="600"/>
-              </a:spcBef>
-              <a:spcAft>
-                <a:spcPts val="0"/>
-              </a:spcAft>
-              <a:buNone/>
-            </a:pPr>
-            <a:r>
-              <a:rPr lang="en-US" sz="2400" b="1" dirty="0"/>
-              <a:t>This slide and the next few should show the results from the individual companies</a:t>
-            </a:r>
-            <a:endParaRPr sz="2400" b="1" dirty="0"/>
-          </a:p>
-        </p:txBody>
-      </p:sp>
-      <p:sp>
-        <p:nvSpPr>
           <p:cNvPr id="214" name="Google Shape;214;p30"/>
           <p:cNvSpPr txBox="1">
             <a:spLocks noGrp="1"/>
@@ -11174,6 +10692,372 @@
               <a:t>16</a:t>
             </a:fld>
             <a:endParaRPr/>
+          </a:p>
+        </p:txBody>
+      </p:sp>
+      <p:pic>
+        <p:nvPicPr>
+          <p:cNvPr id="3" name="Picture 2">
+            <a:extLst>
+              <a:ext uri="{FF2B5EF4-FFF2-40B4-BE49-F238E27FC236}">
+                <a16:creationId xmlns:a16="http://schemas.microsoft.com/office/drawing/2014/main" id="{8E025225-399C-1445-A433-58F60DD6D206}"/>
+              </a:ext>
+            </a:extLst>
+          </p:cNvPr>
+          <p:cNvPicPr>
+            <a:picLocks noChangeAspect="1"/>
+          </p:cNvPicPr>
+          <p:nvPr/>
+        </p:nvPicPr>
+        <p:blipFill>
+          <a:blip r:embed="rId3"/>
+          <a:stretch>
+            <a:fillRect/>
+          </a:stretch>
+        </p:blipFill>
+        <p:spPr>
+          <a:xfrm>
+            <a:off x="4572000" y="541420"/>
+            <a:ext cx="4331370" cy="2887580"/>
+          </a:xfrm>
+          <a:prstGeom prst="rect">
+            <a:avLst/>
+          </a:prstGeom>
+        </p:spPr>
+      </p:pic>
+      <p:pic>
+        <p:nvPicPr>
+          <p:cNvPr id="5" name="Picture 4">
+            <a:extLst>
+              <a:ext uri="{FF2B5EF4-FFF2-40B4-BE49-F238E27FC236}">
+                <a16:creationId xmlns:a16="http://schemas.microsoft.com/office/drawing/2014/main" id="{ED663665-B10E-B545-A570-3E8F10D7B7D0}"/>
+              </a:ext>
+            </a:extLst>
+          </p:cNvPr>
+          <p:cNvPicPr>
+            <a:picLocks noChangeAspect="1"/>
+          </p:cNvPicPr>
+          <p:nvPr/>
+        </p:nvPicPr>
+        <p:blipFill>
+          <a:blip r:embed="rId4"/>
+          <a:stretch>
+            <a:fillRect/>
+          </a:stretch>
+        </p:blipFill>
+        <p:spPr>
+          <a:xfrm>
+            <a:off x="4572001" y="3429000"/>
+            <a:ext cx="4331369" cy="2887579"/>
+          </a:xfrm>
+          <a:prstGeom prst="rect">
+            <a:avLst/>
+          </a:prstGeom>
+        </p:spPr>
+      </p:pic>
+      <p:sp>
+        <p:nvSpPr>
+          <p:cNvPr id="8" name="Google Shape;147;p23">
+            <a:extLst>
+              <a:ext uri="{FF2B5EF4-FFF2-40B4-BE49-F238E27FC236}">
+                <a16:creationId xmlns:a16="http://schemas.microsoft.com/office/drawing/2014/main" id="{16B68AFB-70C1-2049-A1D9-86F79F1EE699}"/>
+              </a:ext>
+            </a:extLst>
+          </p:cNvPr>
+          <p:cNvSpPr txBox="1">
+            <a:spLocks/>
+          </p:cNvSpPr>
+          <p:nvPr/>
+        </p:nvSpPr>
+        <p:spPr>
+          <a:xfrm>
+            <a:off x="240630" y="1162350"/>
+            <a:ext cx="4331370" cy="4533300"/>
+          </a:xfrm>
+          <a:prstGeom prst="rect">
+            <a:avLst/>
+          </a:prstGeom>
+        </p:spPr>
+        <p:txBody>
+          <a:bodyPr spcFirstLastPara="1" wrap="square" lIns="91425" tIns="91425" rIns="91425" bIns="91425" anchor="ctr" anchorCtr="0">
+            <a:noAutofit/>
+          </a:bodyPr>
+          <a:lstStyle>
+            <a:defPPr marR="0" lvl="0" algn="l" rtl="0">
+              <a:lnSpc>
+                <a:spcPct val="100000"/>
+              </a:lnSpc>
+              <a:spcBef>
+                <a:spcPts val="0"/>
+              </a:spcBef>
+              <a:spcAft>
+                <a:spcPts val="0"/>
+              </a:spcAft>
+            </a:defPPr>
+            <a:lvl1pPr marR="0" lvl="0" algn="l" rtl="0">
+              <a:lnSpc>
+                <a:spcPct val="100000"/>
+              </a:lnSpc>
+              <a:spcBef>
+                <a:spcPts val="0"/>
+              </a:spcBef>
+              <a:spcAft>
+                <a:spcPts val="0"/>
+              </a:spcAft>
+              <a:buClr>
+                <a:srgbClr val="000000"/>
+              </a:buClr>
+              <a:buFont typeface="Arial"/>
+              <a:defRPr sz="1400" b="0" i="0" u="none" strike="noStrike" cap="none">
+                <a:solidFill>
+                  <a:srgbClr val="000000"/>
+                </a:solidFill>
+                <a:latin typeface="Arial"/>
+                <a:ea typeface="Arial"/>
+                <a:cs typeface="Arial"/>
+                <a:sym typeface="Arial"/>
+              </a:defRPr>
+            </a:lvl1pPr>
+            <a:lvl2pPr marR="0" lvl="1" algn="l" rtl="0">
+              <a:lnSpc>
+                <a:spcPct val="100000"/>
+              </a:lnSpc>
+              <a:spcBef>
+                <a:spcPts val="0"/>
+              </a:spcBef>
+              <a:spcAft>
+                <a:spcPts val="0"/>
+              </a:spcAft>
+              <a:buClr>
+                <a:srgbClr val="000000"/>
+              </a:buClr>
+              <a:buFont typeface="Arial"/>
+              <a:defRPr sz="1400" b="0" i="0" u="none" strike="noStrike" cap="none">
+                <a:solidFill>
+                  <a:srgbClr val="000000"/>
+                </a:solidFill>
+                <a:latin typeface="Arial"/>
+                <a:ea typeface="Arial"/>
+                <a:cs typeface="Arial"/>
+                <a:sym typeface="Arial"/>
+              </a:defRPr>
+            </a:lvl2pPr>
+            <a:lvl3pPr marR="0" lvl="2" algn="l" rtl="0">
+              <a:lnSpc>
+                <a:spcPct val="100000"/>
+              </a:lnSpc>
+              <a:spcBef>
+                <a:spcPts val="0"/>
+              </a:spcBef>
+              <a:spcAft>
+                <a:spcPts val="0"/>
+              </a:spcAft>
+              <a:buClr>
+                <a:srgbClr val="000000"/>
+              </a:buClr>
+              <a:buFont typeface="Arial"/>
+              <a:defRPr sz="1400" b="0" i="0" u="none" strike="noStrike" cap="none">
+                <a:solidFill>
+                  <a:srgbClr val="000000"/>
+                </a:solidFill>
+                <a:latin typeface="Arial"/>
+                <a:ea typeface="Arial"/>
+                <a:cs typeface="Arial"/>
+                <a:sym typeface="Arial"/>
+              </a:defRPr>
+            </a:lvl3pPr>
+            <a:lvl4pPr marR="0" lvl="3" algn="l" rtl="0">
+              <a:lnSpc>
+                <a:spcPct val="100000"/>
+              </a:lnSpc>
+              <a:spcBef>
+                <a:spcPts val="0"/>
+              </a:spcBef>
+              <a:spcAft>
+                <a:spcPts val="0"/>
+              </a:spcAft>
+              <a:buClr>
+                <a:srgbClr val="000000"/>
+              </a:buClr>
+              <a:buFont typeface="Arial"/>
+              <a:defRPr sz="1400" b="0" i="0" u="none" strike="noStrike" cap="none">
+                <a:solidFill>
+                  <a:srgbClr val="000000"/>
+                </a:solidFill>
+                <a:latin typeface="Arial"/>
+                <a:ea typeface="Arial"/>
+                <a:cs typeface="Arial"/>
+                <a:sym typeface="Arial"/>
+              </a:defRPr>
+            </a:lvl4pPr>
+            <a:lvl5pPr marR="0" lvl="4" algn="l" rtl="0">
+              <a:lnSpc>
+                <a:spcPct val="100000"/>
+              </a:lnSpc>
+              <a:spcBef>
+                <a:spcPts val="0"/>
+              </a:spcBef>
+              <a:spcAft>
+                <a:spcPts val="0"/>
+              </a:spcAft>
+              <a:buClr>
+                <a:srgbClr val="000000"/>
+              </a:buClr>
+              <a:buFont typeface="Arial"/>
+              <a:defRPr sz="1400" b="0" i="0" u="none" strike="noStrike" cap="none">
+                <a:solidFill>
+                  <a:srgbClr val="000000"/>
+                </a:solidFill>
+                <a:latin typeface="Arial"/>
+                <a:ea typeface="Arial"/>
+                <a:cs typeface="Arial"/>
+                <a:sym typeface="Arial"/>
+              </a:defRPr>
+            </a:lvl5pPr>
+            <a:lvl6pPr marR="0" lvl="5" algn="l" rtl="0">
+              <a:lnSpc>
+                <a:spcPct val="100000"/>
+              </a:lnSpc>
+              <a:spcBef>
+                <a:spcPts val="0"/>
+              </a:spcBef>
+              <a:spcAft>
+                <a:spcPts val="0"/>
+              </a:spcAft>
+              <a:buClr>
+                <a:srgbClr val="000000"/>
+              </a:buClr>
+              <a:buFont typeface="Arial"/>
+              <a:defRPr sz="1400" b="0" i="0" u="none" strike="noStrike" cap="none">
+                <a:solidFill>
+                  <a:srgbClr val="000000"/>
+                </a:solidFill>
+                <a:latin typeface="Arial"/>
+                <a:ea typeface="Arial"/>
+                <a:cs typeface="Arial"/>
+                <a:sym typeface="Arial"/>
+              </a:defRPr>
+            </a:lvl6pPr>
+            <a:lvl7pPr marR="0" lvl="6" algn="l" rtl="0">
+              <a:lnSpc>
+                <a:spcPct val="100000"/>
+              </a:lnSpc>
+              <a:spcBef>
+                <a:spcPts val="0"/>
+              </a:spcBef>
+              <a:spcAft>
+                <a:spcPts val="0"/>
+              </a:spcAft>
+              <a:buClr>
+                <a:srgbClr val="000000"/>
+              </a:buClr>
+              <a:buFont typeface="Arial"/>
+              <a:defRPr sz="1400" b="0" i="0" u="none" strike="noStrike" cap="none">
+                <a:solidFill>
+                  <a:srgbClr val="000000"/>
+                </a:solidFill>
+                <a:latin typeface="Arial"/>
+                <a:ea typeface="Arial"/>
+                <a:cs typeface="Arial"/>
+                <a:sym typeface="Arial"/>
+              </a:defRPr>
+            </a:lvl7pPr>
+            <a:lvl8pPr marR="0" lvl="7" algn="l" rtl="0">
+              <a:lnSpc>
+                <a:spcPct val="100000"/>
+              </a:lnSpc>
+              <a:spcBef>
+                <a:spcPts val="0"/>
+              </a:spcBef>
+              <a:spcAft>
+                <a:spcPts val="0"/>
+              </a:spcAft>
+              <a:buClr>
+                <a:srgbClr val="000000"/>
+              </a:buClr>
+              <a:buFont typeface="Arial"/>
+              <a:defRPr sz="1400" b="0" i="0" u="none" strike="noStrike" cap="none">
+                <a:solidFill>
+                  <a:srgbClr val="000000"/>
+                </a:solidFill>
+                <a:latin typeface="Arial"/>
+                <a:ea typeface="Arial"/>
+                <a:cs typeface="Arial"/>
+                <a:sym typeface="Arial"/>
+              </a:defRPr>
+            </a:lvl8pPr>
+            <a:lvl9pPr marR="0" lvl="8" algn="l" rtl="0">
+              <a:lnSpc>
+                <a:spcPct val="100000"/>
+              </a:lnSpc>
+              <a:spcBef>
+                <a:spcPts val="0"/>
+              </a:spcBef>
+              <a:spcAft>
+                <a:spcPts val="0"/>
+              </a:spcAft>
+              <a:buClr>
+                <a:srgbClr val="000000"/>
+              </a:buClr>
+              <a:buFont typeface="Arial"/>
+              <a:defRPr sz="1400" b="0" i="0" u="none" strike="noStrike" cap="none">
+                <a:solidFill>
+                  <a:srgbClr val="000000"/>
+                </a:solidFill>
+                <a:latin typeface="Arial"/>
+                <a:ea typeface="Arial"/>
+                <a:cs typeface="Arial"/>
+                <a:sym typeface="Arial"/>
+              </a:defRPr>
+            </a:lvl9pPr>
+          </a:lstStyle>
+          <a:p>
+            <a:pPr algn="ctr">
+              <a:spcBef>
+                <a:spcPts val="600"/>
+              </a:spcBef>
+            </a:pPr>
+            <a:r>
+              <a:rPr lang="en-US" sz="4400" b="1" u="sng" dirty="0"/>
+              <a:t>Tesla</a:t>
+            </a:r>
+            <a:r>
+              <a:rPr lang="en-US" sz="4400" b="1" dirty="0"/>
+              <a:t>:</a:t>
+            </a:r>
+          </a:p>
+          <a:p>
+            <a:pPr algn="ctr">
+              <a:spcBef>
+                <a:spcPts val="600"/>
+              </a:spcBef>
+            </a:pPr>
+            <a:r>
+              <a:rPr lang="en-US" sz="4400" b="1" dirty="0"/>
+              <a:t>Sentiment Score</a:t>
+            </a:r>
+          </a:p>
+          <a:p>
+            <a:pPr algn="ctr">
+              <a:spcBef>
+                <a:spcPts val="600"/>
+              </a:spcBef>
+            </a:pPr>
+            <a:r>
+              <a:rPr lang="en-US" sz="4400" b="1" dirty="0"/>
+              <a:t>Vs</a:t>
+            </a:r>
+          </a:p>
+          <a:p>
+            <a:pPr algn="ctr">
+              <a:spcBef>
+                <a:spcPts val="600"/>
+              </a:spcBef>
+            </a:pPr>
+            <a:r>
+              <a:rPr lang="en-US" sz="4400" b="1" dirty="0"/>
+              <a:t>Stock Change %</a:t>
+            </a:r>
           </a:p>
         </p:txBody>
       </p:sp>
@@ -11209,44 +11093,6 @@
       </p:grpSpPr>
       <p:sp>
         <p:nvSpPr>
-          <p:cNvPr id="211" name="Google Shape;211;p30"/>
-          <p:cNvSpPr txBox="1">
-            <a:spLocks noGrp="1"/>
-          </p:cNvSpPr>
-          <p:nvPr>
-            <p:ph type="subTitle" idx="4294967295"/>
-          </p:nvPr>
-        </p:nvSpPr>
-        <p:spPr>
-          <a:xfrm>
-            <a:off x="685800" y="2697085"/>
-            <a:ext cx="7772400" cy="617700"/>
-          </a:xfrm>
-          <a:prstGeom prst="rect">
-            <a:avLst/>
-          </a:prstGeom>
-        </p:spPr>
-        <p:txBody>
-          <a:bodyPr spcFirstLastPara="1" wrap="square" lIns="91425" tIns="91425" rIns="91425" bIns="91425" anchor="t" anchorCtr="0">
-            <a:noAutofit/>
-          </a:bodyPr>
-          <a:lstStyle/>
-          <a:p>
-            <a:pPr marL="0" lvl="0" indent="0" algn="l" rtl="0">
-              <a:spcBef>
-                <a:spcPts val="600"/>
-              </a:spcBef>
-              <a:spcAft>
-                <a:spcPts val="0"/>
-              </a:spcAft>
-              <a:buNone/>
-            </a:pPr>
-            <a:endParaRPr sz="2400" b="1" dirty="0"/>
-          </a:p>
-        </p:txBody>
-      </p:sp>
-      <p:sp>
-        <p:nvSpPr>
           <p:cNvPr id="214" name="Google Shape;214;p30"/>
           <p:cNvSpPr txBox="1">
             <a:spLocks noGrp="1"/>
@@ -11287,10 +11133,376 @@
           </a:p>
         </p:txBody>
       </p:sp>
+      <p:sp>
+        <p:nvSpPr>
+          <p:cNvPr id="8" name="Google Shape;147;p23">
+            <a:extLst>
+              <a:ext uri="{FF2B5EF4-FFF2-40B4-BE49-F238E27FC236}">
+                <a16:creationId xmlns:a16="http://schemas.microsoft.com/office/drawing/2014/main" id="{16B68AFB-70C1-2049-A1D9-86F79F1EE699}"/>
+              </a:ext>
+            </a:extLst>
+          </p:cNvPr>
+          <p:cNvSpPr txBox="1">
+            <a:spLocks/>
+          </p:cNvSpPr>
+          <p:nvPr/>
+        </p:nvSpPr>
+        <p:spPr>
+          <a:xfrm>
+            <a:off x="240630" y="1162350"/>
+            <a:ext cx="4331370" cy="4533300"/>
+          </a:xfrm>
+          <a:prstGeom prst="rect">
+            <a:avLst/>
+          </a:prstGeom>
+        </p:spPr>
+        <p:txBody>
+          <a:bodyPr spcFirstLastPara="1" wrap="square" lIns="91425" tIns="91425" rIns="91425" bIns="91425" anchor="ctr" anchorCtr="0">
+            <a:noAutofit/>
+          </a:bodyPr>
+          <a:lstStyle>
+            <a:defPPr marR="0" lvl="0" algn="l" rtl="0">
+              <a:lnSpc>
+                <a:spcPct val="100000"/>
+              </a:lnSpc>
+              <a:spcBef>
+                <a:spcPts val="0"/>
+              </a:spcBef>
+              <a:spcAft>
+                <a:spcPts val="0"/>
+              </a:spcAft>
+            </a:defPPr>
+            <a:lvl1pPr marR="0" lvl="0" algn="l" rtl="0">
+              <a:lnSpc>
+                <a:spcPct val="100000"/>
+              </a:lnSpc>
+              <a:spcBef>
+                <a:spcPts val="0"/>
+              </a:spcBef>
+              <a:spcAft>
+                <a:spcPts val="0"/>
+              </a:spcAft>
+              <a:buClr>
+                <a:srgbClr val="000000"/>
+              </a:buClr>
+              <a:buFont typeface="Arial"/>
+              <a:defRPr sz="1400" b="0" i="0" u="none" strike="noStrike" cap="none">
+                <a:solidFill>
+                  <a:srgbClr val="000000"/>
+                </a:solidFill>
+                <a:latin typeface="Arial"/>
+                <a:ea typeface="Arial"/>
+                <a:cs typeface="Arial"/>
+                <a:sym typeface="Arial"/>
+              </a:defRPr>
+            </a:lvl1pPr>
+            <a:lvl2pPr marR="0" lvl="1" algn="l" rtl="0">
+              <a:lnSpc>
+                <a:spcPct val="100000"/>
+              </a:lnSpc>
+              <a:spcBef>
+                <a:spcPts val="0"/>
+              </a:spcBef>
+              <a:spcAft>
+                <a:spcPts val="0"/>
+              </a:spcAft>
+              <a:buClr>
+                <a:srgbClr val="000000"/>
+              </a:buClr>
+              <a:buFont typeface="Arial"/>
+              <a:defRPr sz="1400" b="0" i="0" u="none" strike="noStrike" cap="none">
+                <a:solidFill>
+                  <a:srgbClr val="000000"/>
+                </a:solidFill>
+                <a:latin typeface="Arial"/>
+                <a:ea typeface="Arial"/>
+                <a:cs typeface="Arial"/>
+                <a:sym typeface="Arial"/>
+              </a:defRPr>
+            </a:lvl2pPr>
+            <a:lvl3pPr marR="0" lvl="2" algn="l" rtl="0">
+              <a:lnSpc>
+                <a:spcPct val="100000"/>
+              </a:lnSpc>
+              <a:spcBef>
+                <a:spcPts val="0"/>
+              </a:spcBef>
+              <a:spcAft>
+                <a:spcPts val="0"/>
+              </a:spcAft>
+              <a:buClr>
+                <a:srgbClr val="000000"/>
+              </a:buClr>
+              <a:buFont typeface="Arial"/>
+              <a:defRPr sz="1400" b="0" i="0" u="none" strike="noStrike" cap="none">
+                <a:solidFill>
+                  <a:srgbClr val="000000"/>
+                </a:solidFill>
+                <a:latin typeface="Arial"/>
+                <a:ea typeface="Arial"/>
+                <a:cs typeface="Arial"/>
+                <a:sym typeface="Arial"/>
+              </a:defRPr>
+            </a:lvl3pPr>
+            <a:lvl4pPr marR="0" lvl="3" algn="l" rtl="0">
+              <a:lnSpc>
+                <a:spcPct val="100000"/>
+              </a:lnSpc>
+              <a:spcBef>
+                <a:spcPts val="0"/>
+              </a:spcBef>
+              <a:spcAft>
+                <a:spcPts val="0"/>
+              </a:spcAft>
+              <a:buClr>
+                <a:srgbClr val="000000"/>
+              </a:buClr>
+              <a:buFont typeface="Arial"/>
+              <a:defRPr sz="1400" b="0" i="0" u="none" strike="noStrike" cap="none">
+                <a:solidFill>
+                  <a:srgbClr val="000000"/>
+                </a:solidFill>
+                <a:latin typeface="Arial"/>
+                <a:ea typeface="Arial"/>
+                <a:cs typeface="Arial"/>
+                <a:sym typeface="Arial"/>
+              </a:defRPr>
+            </a:lvl4pPr>
+            <a:lvl5pPr marR="0" lvl="4" algn="l" rtl="0">
+              <a:lnSpc>
+                <a:spcPct val="100000"/>
+              </a:lnSpc>
+              <a:spcBef>
+                <a:spcPts val="0"/>
+              </a:spcBef>
+              <a:spcAft>
+                <a:spcPts val="0"/>
+              </a:spcAft>
+              <a:buClr>
+                <a:srgbClr val="000000"/>
+              </a:buClr>
+              <a:buFont typeface="Arial"/>
+              <a:defRPr sz="1400" b="0" i="0" u="none" strike="noStrike" cap="none">
+                <a:solidFill>
+                  <a:srgbClr val="000000"/>
+                </a:solidFill>
+                <a:latin typeface="Arial"/>
+                <a:ea typeface="Arial"/>
+                <a:cs typeface="Arial"/>
+                <a:sym typeface="Arial"/>
+              </a:defRPr>
+            </a:lvl5pPr>
+            <a:lvl6pPr marR="0" lvl="5" algn="l" rtl="0">
+              <a:lnSpc>
+                <a:spcPct val="100000"/>
+              </a:lnSpc>
+              <a:spcBef>
+                <a:spcPts val="0"/>
+              </a:spcBef>
+              <a:spcAft>
+                <a:spcPts val="0"/>
+              </a:spcAft>
+              <a:buClr>
+                <a:srgbClr val="000000"/>
+              </a:buClr>
+              <a:buFont typeface="Arial"/>
+              <a:defRPr sz="1400" b="0" i="0" u="none" strike="noStrike" cap="none">
+                <a:solidFill>
+                  <a:srgbClr val="000000"/>
+                </a:solidFill>
+                <a:latin typeface="Arial"/>
+                <a:ea typeface="Arial"/>
+                <a:cs typeface="Arial"/>
+                <a:sym typeface="Arial"/>
+              </a:defRPr>
+            </a:lvl6pPr>
+            <a:lvl7pPr marR="0" lvl="6" algn="l" rtl="0">
+              <a:lnSpc>
+                <a:spcPct val="100000"/>
+              </a:lnSpc>
+              <a:spcBef>
+                <a:spcPts val="0"/>
+              </a:spcBef>
+              <a:spcAft>
+                <a:spcPts val="0"/>
+              </a:spcAft>
+              <a:buClr>
+                <a:srgbClr val="000000"/>
+              </a:buClr>
+              <a:buFont typeface="Arial"/>
+              <a:defRPr sz="1400" b="0" i="0" u="none" strike="noStrike" cap="none">
+                <a:solidFill>
+                  <a:srgbClr val="000000"/>
+                </a:solidFill>
+                <a:latin typeface="Arial"/>
+                <a:ea typeface="Arial"/>
+                <a:cs typeface="Arial"/>
+                <a:sym typeface="Arial"/>
+              </a:defRPr>
+            </a:lvl7pPr>
+            <a:lvl8pPr marR="0" lvl="7" algn="l" rtl="0">
+              <a:lnSpc>
+                <a:spcPct val="100000"/>
+              </a:lnSpc>
+              <a:spcBef>
+                <a:spcPts val="0"/>
+              </a:spcBef>
+              <a:spcAft>
+                <a:spcPts val="0"/>
+              </a:spcAft>
+              <a:buClr>
+                <a:srgbClr val="000000"/>
+              </a:buClr>
+              <a:buFont typeface="Arial"/>
+              <a:defRPr sz="1400" b="0" i="0" u="none" strike="noStrike" cap="none">
+                <a:solidFill>
+                  <a:srgbClr val="000000"/>
+                </a:solidFill>
+                <a:latin typeface="Arial"/>
+                <a:ea typeface="Arial"/>
+                <a:cs typeface="Arial"/>
+                <a:sym typeface="Arial"/>
+              </a:defRPr>
+            </a:lvl8pPr>
+            <a:lvl9pPr marR="0" lvl="8" algn="l" rtl="0">
+              <a:lnSpc>
+                <a:spcPct val="100000"/>
+              </a:lnSpc>
+              <a:spcBef>
+                <a:spcPts val="0"/>
+              </a:spcBef>
+              <a:spcAft>
+                <a:spcPts val="0"/>
+              </a:spcAft>
+              <a:buClr>
+                <a:srgbClr val="000000"/>
+              </a:buClr>
+              <a:buFont typeface="Arial"/>
+              <a:defRPr sz="1400" b="0" i="0" u="none" strike="noStrike" cap="none">
+                <a:solidFill>
+                  <a:srgbClr val="000000"/>
+                </a:solidFill>
+                <a:latin typeface="Arial"/>
+                <a:ea typeface="Arial"/>
+                <a:cs typeface="Arial"/>
+                <a:sym typeface="Arial"/>
+              </a:defRPr>
+            </a:lvl9pPr>
+          </a:lstStyle>
+          <a:p>
+            <a:pPr algn="ctr">
+              <a:spcBef>
+                <a:spcPts val="600"/>
+              </a:spcBef>
+            </a:pPr>
+            <a:r>
+              <a:rPr lang="en-US" sz="4400" b="1" u="sng" dirty="0"/>
+              <a:t>Wayfair</a:t>
+            </a:r>
+            <a:r>
+              <a:rPr lang="en-US" sz="4400" b="1" dirty="0"/>
+              <a:t>:</a:t>
+            </a:r>
+          </a:p>
+          <a:p>
+            <a:pPr algn="ctr">
+              <a:spcBef>
+                <a:spcPts val="600"/>
+              </a:spcBef>
+            </a:pPr>
+            <a:r>
+              <a:rPr lang="en-US" sz="4400" b="1" dirty="0"/>
+              <a:t>Sentiment Score</a:t>
+            </a:r>
+          </a:p>
+          <a:p>
+            <a:pPr algn="ctr">
+              <a:spcBef>
+                <a:spcPts val="600"/>
+              </a:spcBef>
+            </a:pPr>
+            <a:r>
+              <a:rPr lang="en-US" sz="4400" b="1" dirty="0"/>
+              <a:t>Vs</a:t>
+            </a:r>
+          </a:p>
+          <a:p>
+            <a:pPr algn="ctr">
+              <a:spcBef>
+                <a:spcPts val="600"/>
+              </a:spcBef>
+            </a:pPr>
+            <a:r>
+              <a:rPr lang="en-US" sz="4400" b="1" dirty="0"/>
+              <a:t>Stock Change %</a:t>
+            </a:r>
+          </a:p>
+        </p:txBody>
+      </p:sp>
+      <p:pic>
+        <p:nvPicPr>
+          <p:cNvPr id="4" name="Picture 3">
+            <a:extLst>
+              <a:ext uri="{FF2B5EF4-FFF2-40B4-BE49-F238E27FC236}">
+                <a16:creationId xmlns:a16="http://schemas.microsoft.com/office/drawing/2014/main" id="{6FCBB440-72AB-B748-AA22-5AC5B8309C76}"/>
+              </a:ext>
+            </a:extLst>
+          </p:cNvPr>
+          <p:cNvPicPr>
+            <a:picLocks noChangeAspect="1"/>
+          </p:cNvPicPr>
+          <p:nvPr/>
+        </p:nvPicPr>
+        <p:blipFill>
+          <a:blip r:embed="rId3"/>
+          <a:stretch>
+            <a:fillRect/>
+          </a:stretch>
+        </p:blipFill>
+        <p:spPr>
+          <a:xfrm>
+            <a:off x="4571999" y="3465351"/>
+            <a:ext cx="4331369" cy="2887579"/>
+          </a:xfrm>
+          <a:prstGeom prst="rect">
+            <a:avLst/>
+          </a:prstGeom>
+        </p:spPr>
+      </p:pic>
+      <p:pic>
+        <p:nvPicPr>
+          <p:cNvPr id="7" name="Picture 6">
+            <a:extLst>
+              <a:ext uri="{FF2B5EF4-FFF2-40B4-BE49-F238E27FC236}">
+                <a16:creationId xmlns:a16="http://schemas.microsoft.com/office/drawing/2014/main" id="{6A2D25D4-5E87-0141-9BCB-516BA5C3C434}"/>
+              </a:ext>
+            </a:extLst>
+          </p:cNvPr>
+          <p:cNvPicPr>
+            <a:picLocks noChangeAspect="1"/>
+          </p:cNvPicPr>
+          <p:nvPr/>
+        </p:nvPicPr>
+        <p:blipFill>
+          <a:blip r:embed="rId4"/>
+          <a:stretch>
+            <a:fillRect/>
+          </a:stretch>
+        </p:blipFill>
+        <p:spPr>
+          <a:xfrm>
+            <a:off x="4571999" y="512901"/>
+            <a:ext cx="4331369" cy="2887579"/>
+          </a:xfrm>
+          <a:prstGeom prst="rect">
+            <a:avLst/>
+          </a:prstGeom>
+        </p:spPr>
+      </p:pic>
     </p:spTree>
     <p:extLst>
       <p:ext uri="{BB962C8B-B14F-4D97-AF65-F5344CB8AC3E}">
-        <p14:creationId xmlns:p14="http://schemas.microsoft.com/office/powerpoint/2010/main" val="3440329073"/>
+        <p14:creationId xmlns:p14="http://schemas.microsoft.com/office/powerpoint/2010/main" val="3375179710"/>
       </p:ext>
     </p:extLst>
   </p:cSld>
@@ -11319,44 +11531,6 @@
       </p:grpSpPr>
       <p:sp>
         <p:nvSpPr>
-          <p:cNvPr id="211" name="Google Shape;211;p30"/>
-          <p:cNvSpPr txBox="1">
-            <a:spLocks noGrp="1"/>
-          </p:cNvSpPr>
-          <p:nvPr>
-            <p:ph type="subTitle" idx="4294967295"/>
-          </p:nvPr>
-        </p:nvSpPr>
-        <p:spPr>
-          <a:xfrm>
-            <a:off x="685800" y="2697085"/>
-            <a:ext cx="7772400" cy="617700"/>
-          </a:xfrm>
-          <a:prstGeom prst="rect">
-            <a:avLst/>
-          </a:prstGeom>
-        </p:spPr>
-        <p:txBody>
-          <a:bodyPr spcFirstLastPara="1" wrap="square" lIns="91425" tIns="91425" rIns="91425" bIns="91425" anchor="t" anchorCtr="0">
-            <a:noAutofit/>
-          </a:bodyPr>
-          <a:lstStyle/>
-          <a:p>
-            <a:pPr marL="0" lvl="0" indent="0" algn="l" rtl="0">
-              <a:spcBef>
-                <a:spcPts val="600"/>
-              </a:spcBef>
-              <a:spcAft>
-                <a:spcPts val="0"/>
-              </a:spcAft>
-              <a:buNone/>
-            </a:pPr>
-            <a:endParaRPr sz="2400" b="1" dirty="0"/>
-          </a:p>
-        </p:txBody>
-      </p:sp>
-      <p:sp>
-        <p:nvSpPr>
           <p:cNvPr id="214" name="Google Shape;214;p30"/>
           <p:cNvSpPr txBox="1">
             <a:spLocks noGrp="1"/>
@@ -11397,10 +11571,376 @@
           </a:p>
         </p:txBody>
       </p:sp>
+      <p:sp>
+        <p:nvSpPr>
+          <p:cNvPr id="8" name="Google Shape;147;p23">
+            <a:extLst>
+              <a:ext uri="{FF2B5EF4-FFF2-40B4-BE49-F238E27FC236}">
+                <a16:creationId xmlns:a16="http://schemas.microsoft.com/office/drawing/2014/main" id="{16B68AFB-70C1-2049-A1D9-86F79F1EE699}"/>
+              </a:ext>
+            </a:extLst>
+          </p:cNvPr>
+          <p:cNvSpPr txBox="1">
+            <a:spLocks/>
+          </p:cNvSpPr>
+          <p:nvPr/>
+        </p:nvSpPr>
+        <p:spPr>
+          <a:xfrm>
+            <a:off x="240630" y="1162350"/>
+            <a:ext cx="4331370" cy="4533300"/>
+          </a:xfrm>
+          <a:prstGeom prst="rect">
+            <a:avLst/>
+          </a:prstGeom>
+        </p:spPr>
+        <p:txBody>
+          <a:bodyPr spcFirstLastPara="1" wrap="square" lIns="91425" tIns="91425" rIns="91425" bIns="91425" anchor="ctr" anchorCtr="0">
+            <a:noAutofit/>
+          </a:bodyPr>
+          <a:lstStyle>
+            <a:defPPr marR="0" lvl="0" algn="l" rtl="0">
+              <a:lnSpc>
+                <a:spcPct val="100000"/>
+              </a:lnSpc>
+              <a:spcBef>
+                <a:spcPts val="0"/>
+              </a:spcBef>
+              <a:spcAft>
+                <a:spcPts val="0"/>
+              </a:spcAft>
+            </a:defPPr>
+            <a:lvl1pPr marR="0" lvl="0" algn="l" rtl="0">
+              <a:lnSpc>
+                <a:spcPct val="100000"/>
+              </a:lnSpc>
+              <a:spcBef>
+                <a:spcPts val="0"/>
+              </a:spcBef>
+              <a:spcAft>
+                <a:spcPts val="0"/>
+              </a:spcAft>
+              <a:buClr>
+                <a:srgbClr val="000000"/>
+              </a:buClr>
+              <a:buFont typeface="Arial"/>
+              <a:defRPr sz="1400" b="0" i="0" u="none" strike="noStrike" cap="none">
+                <a:solidFill>
+                  <a:srgbClr val="000000"/>
+                </a:solidFill>
+                <a:latin typeface="Arial"/>
+                <a:ea typeface="Arial"/>
+                <a:cs typeface="Arial"/>
+                <a:sym typeface="Arial"/>
+              </a:defRPr>
+            </a:lvl1pPr>
+            <a:lvl2pPr marR="0" lvl="1" algn="l" rtl="0">
+              <a:lnSpc>
+                <a:spcPct val="100000"/>
+              </a:lnSpc>
+              <a:spcBef>
+                <a:spcPts val="0"/>
+              </a:spcBef>
+              <a:spcAft>
+                <a:spcPts val="0"/>
+              </a:spcAft>
+              <a:buClr>
+                <a:srgbClr val="000000"/>
+              </a:buClr>
+              <a:buFont typeface="Arial"/>
+              <a:defRPr sz="1400" b="0" i="0" u="none" strike="noStrike" cap="none">
+                <a:solidFill>
+                  <a:srgbClr val="000000"/>
+                </a:solidFill>
+                <a:latin typeface="Arial"/>
+                <a:ea typeface="Arial"/>
+                <a:cs typeface="Arial"/>
+                <a:sym typeface="Arial"/>
+              </a:defRPr>
+            </a:lvl2pPr>
+            <a:lvl3pPr marR="0" lvl="2" algn="l" rtl="0">
+              <a:lnSpc>
+                <a:spcPct val="100000"/>
+              </a:lnSpc>
+              <a:spcBef>
+                <a:spcPts val="0"/>
+              </a:spcBef>
+              <a:spcAft>
+                <a:spcPts val="0"/>
+              </a:spcAft>
+              <a:buClr>
+                <a:srgbClr val="000000"/>
+              </a:buClr>
+              <a:buFont typeface="Arial"/>
+              <a:defRPr sz="1400" b="0" i="0" u="none" strike="noStrike" cap="none">
+                <a:solidFill>
+                  <a:srgbClr val="000000"/>
+                </a:solidFill>
+                <a:latin typeface="Arial"/>
+                <a:ea typeface="Arial"/>
+                <a:cs typeface="Arial"/>
+                <a:sym typeface="Arial"/>
+              </a:defRPr>
+            </a:lvl3pPr>
+            <a:lvl4pPr marR="0" lvl="3" algn="l" rtl="0">
+              <a:lnSpc>
+                <a:spcPct val="100000"/>
+              </a:lnSpc>
+              <a:spcBef>
+                <a:spcPts val="0"/>
+              </a:spcBef>
+              <a:spcAft>
+                <a:spcPts val="0"/>
+              </a:spcAft>
+              <a:buClr>
+                <a:srgbClr val="000000"/>
+              </a:buClr>
+              <a:buFont typeface="Arial"/>
+              <a:defRPr sz="1400" b="0" i="0" u="none" strike="noStrike" cap="none">
+                <a:solidFill>
+                  <a:srgbClr val="000000"/>
+                </a:solidFill>
+                <a:latin typeface="Arial"/>
+                <a:ea typeface="Arial"/>
+                <a:cs typeface="Arial"/>
+                <a:sym typeface="Arial"/>
+              </a:defRPr>
+            </a:lvl4pPr>
+            <a:lvl5pPr marR="0" lvl="4" algn="l" rtl="0">
+              <a:lnSpc>
+                <a:spcPct val="100000"/>
+              </a:lnSpc>
+              <a:spcBef>
+                <a:spcPts val="0"/>
+              </a:spcBef>
+              <a:spcAft>
+                <a:spcPts val="0"/>
+              </a:spcAft>
+              <a:buClr>
+                <a:srgbClr val="000000"/>
+              </a:buClr>
+              <a:buFont typeface="Arial"/>
+              <a:defRPr sz="1400" b="0" i="0" u="none" strike="noStrike" cap="none">
+                <a:solidFill>
+                  <a:srgbClr val="000000"/>
+                </a:solidFill>
+                <a:latin typeface="Arial"/>
+                <a:ea typeface="Arial"/>
+                <a:cs typeface="Arial"/>
+                <a:sym typeface="Arial"/>
+              </a:defRPr>
+            </a:lvl5pPr>
+            <a:lvl6pPr marR="0" lvl="5" algn="l" rtl="0">
+              <a:lnSpc>
+                <a:spcPct val="100000"/>
+              </a:lnSpc>
+              <a:spcBef>
+                <a:spcPts val="0"/>
+              </a:spcBef>
+              <a:spcAft>
+                <a:spcPts val="0"/>
+              </a:spcAft>
+              <a:buClr>
+                <a:srgbClr val="000000"/>
+              </a:buClr>
+              <a:buFont typeface="Arial"/>
+              <a:defRPr sz="1400" b="0" i="0" u="none" strike="noStrike" cap="none">
+                <a:solidFill>
+                  <a:srgbClr val="000000"/>
+                </a:solidFill>
+                <a:latin typeface="Arial"/>
+                <a:ea typeface="Arial"/>
+                <a:cs typeface="Arial"/>
+                <a:sym typeface="Arial"/>
+              </a:defRPr>
+            </a:lvl6pPr>
+            <a:lvl7pPr marR="0" lvl="6" algn="l" rtl="0">
+              <a:lnSpc>
+                <a:spcPct val="100000"/>
+              </a:lnSpc>
+              <a:spcBef>
+                <a:spcPts val="0"/>
+              </a:spcBef>
+              <a:spcAft>
+                <a:spcPts val="0"/>
+              </a:spcAft>
+              <a:buClr>
+                <a:srgbClr val="000000"/>
+              </a:buClr>
+              <a:buFont typeface="Arial"/>
+              <a:defRPr sz="1400" b="0" i="0" u="none" strike="noStrike" cap="none">
+                <a:solidFill>
+                  <a:srgbClr val="000000"/>
+                </a:solidFill>
+                <a:latin typeface="Arial"/>
+                <a:ea typeface="Arial"/>
+                <a:cs typeface="Arial"/>
+                <a:sym typeface="Arial"/>
+              </a:defRPr>
+            </a:lvl7pPr>
+            <a:lvl8pPr marR="0" lvl="7" algn="l" rtl="0">
+              <a:lnSpc>
+                <a:spcPct val="100000"/>
+              </a:lnSpc>
+              <a:spcBef>
+                <a:spcPts val="0"/>
+              </a:spcBef>
+              <a:spcAft>
+                <a:spcPts val="0"/>
+              </a:spcAft>
+              <a:buClr>
+                <a:srgbClr val="000000"/>
+              </a:buClr>
+              <a:buFont typeface="Arial"/>
+              <a:defRPr sz="1400" b="0" i="0" u="none" strike="noStrike" cap="none">
+                <a:solidFill>
+                  <a:srgbClr val="000000"/>
+                </a:solidFill>
+                <a:latin typeface="Arial"/>
+                <a:ea typeface="Arial"/>
+                <a:cs typeface="Arial"/>
+                <a:sym typeface="Arial"/>
+              </a:defRPr>
+            </a:lvl8pPr>
+            <a:lvl9pPr marR="0" lvl="8" algn="l" rtl="0">
+              <a:lnSpc>
+                <a:spcPct val="100000"/>
+              </a:lnSpc>
+              <a:spcBef>
+                <a:spcPts val="0"/>
+              </a:spcBef>
+              <a:spcAft>
+                <a:spcPts val="0"/>
+              </a:spcAft>
+              <a:buClr>
+                <a:srgbClr val="000000"/>
+              </a:buClr>
+              <a:buFont typeface="Arial"/>
+              <a:defRPr sz="1400" b="0" i="0" u="none" strike="noStrike" cap="none">
+                <a:solidFill>
+                  <a:srgbClr val="000000"/>
+                </a:solidFill>
+                <a:latin typeface="Arial"/>
+                <a:ea typeface="Arial"/>
+                <a:cs typeface="Arial"/>
+                <a:sym typeface="Arial"/>
+              </a:defRPr>
+            </a:lvl9pPr>
+          </a:lstStyle>
+          <a:p>
+            <a:pPr algn="ctr">
+              <a:spcBef>
+                <a:spcPts val="600"/>
+              </a:spcBef>
+            </a:pPr>
+            <a:r>
+              <a:rPr lang="en-US" sz="4400" b="1" u="sng" dirty="0"/>
+              <a:t>Wells Fargo</a:t>
+            </a:r>
+            <a:r>
+              <a:rPr lang="en-US" sz="4400" b="1" dirty="0"/>
+              <a:t>:</a:t>
+            </a:r>
+          </a:p>
+          <a:p>
+            <a:pPr algn="ctr">
+              <a:spcBef>
+                <a:spcPts val="600"/>
+              </a:spcBef>
+            </a:pPr>
+            <a:r>
+              <a:rPr lang="en-US" sz="4400" b="1" dirty="0"/>
+              <a:t>Sentiment Score</a:t>
+            </a:r>
+          </a:p>
+          <a:p>
+            <a:pPr algn="ctr">
+              <a:spcBef>
+                <a:spcPts val="600"/>
+              </a:spcBef>
+            </a:pPr>
+            <a:r>
+              <a:rPr lang="en-US" sz="4400" b="1" dirty="0"/>
+              <a:t>Vs</a:t>
+            </a:r>
+          </a:p>
+          <a:p>
+            <a:pPr algn="ctr">
+              <a:spcBef>
+                <a:spcPts val="600"/>
+              </a:spcBef>
+            </a:pPr>
+            <a:r>
+              <a:rPr lang="en-US" sz="4400" b="1" dirty="0"/>
+              <a:t>Stock Change %</a:t>
+            </a:r>
+          </a:p>
+        </p:txBody>
+      </p:sp>
+      <p:pic>
+        <p:nvPicPr>
+          <p:cNvPr id="3" name="Picture 2">
+            <a:extLst>
+              <a:ext uri="{FF2B5EF4-FFF2-40B4-BE49-F238E27FC236}">
+                <a16:creationId xmlns:a16="http://schemas.microsoft.com/office/drawing/2014/main" id="{F1F1B94A-43C6-3E4A-9EAF-D8DECC0DC93C}"/>
+              </a:ext>
+            </a:extLst>
+          </p:cNvPr>
+          <p:cNvPicPr>
+            <a:picLocks noChangeAspect="1"/>
+          </p:cNvPicPr>
+          <p:nvPr/>
+        </p:nvPicPr>
+        <p:blipFill>
+          <a:blip r:embed="rId3"/>
+          <a:stretch>
+            <a:fillRect/>
+          </a:stretch>
+        </p:blipFill>
+        <p:spPr>
+          <a:xfrm>
+            <a:off x="4571999" y="3529776"/>
+            <a:ext cx="4331371" cy="2887580"/>
+          </a:xfrm>
+          <a:prstGeom prst="rect">
+            <a:avLst/>
+          </a:prstGeom>
+        </p:spPr>
+      </p:pic>
+      <p:pic>
+        <p:nvPicPr>
+          <p:cNvPr id="6" name="Picture 5">
+            <a:extLst>
+              <a:ext uri="{FF2B5EF4-FFF2-40B4-BE49-F238E27FC236}">
+                <a16:creationId xmlns:a16="http://schemas.microsoft.com/office/drawing/2014/main" id="{30AEC79B-E95B-BF42-B34A-3D5BDBCD7212}"/>
+              </a:ext>
+            </a:extLst>
+          </p:cNvPr>
+          <p:cNvPicPr>
+            <a:picLocks noChangeAspect="1"/>
+          </p:cNvPicPr>
+          <p:nvPr/>
+        </p:nvPicPr>
+        <p:blipFill>
+          <a:blip r:embed="rId4"/>
+          <a:stretch>
+            <a:fillRect/>
+          </a:stretch>
+        </p:blipFill>
+        <p:spPr>
+          <a:xfrm>
+            <a:off x="4571999" y="524866"/>
+            <a:ext cx="4331370" cy="2887580"/>
+          </a:xfrm>
+          <a:prstGeom prst="rect">
+            <a:avLst/>
+          </a:prstGeom>
+        </p:spPr>
+      </p:pic>
     </p:spTree>
     <p:extLst>
       <p:ext uri="{BB962C8B-B14F-4D97-AF65-F5344CB8AC3E}">
-        <p14:creationId xmlns:p14="http://schemas.microsoft.com/office/powerpoint/2010/main" val="3288640350"/>
+        <p14:creationId xmlns:p14="http://schemas.microsoft.com/office/powerpoint/2010/main" val="1041881737"/>
       </p:ext>
     </p:extLst>
   </p:cSld>
@@ -11415,7 +11955,7 @@
   <p:cSld>
     <p:spTree>
       <p:nvGrpSpPr>
-        <p:cNvPr id="1" name="Shape 207"/>
+        <p:cNvPr id="1" name="Shape 114"/>
         <p:cNvGrpSpPr/>
         <p:nvPr/>
       </p:nvGrpSpPr>
@@ -11429,18 +11969,18 @@
       </p:grpSpPr>
       <p:sp>
         <p:nvSpPr>
-          <p:cNvPr id="211" name="Google Shape;211;p30"/>
+          <p:cNvPr id="115" name="Google Shape;115;p19"/>
           <p:cNvSpPr txBox="1">
             <a:spLocks noGrp="1"/>
           </p:cNvSpPr>
           <p:nvPr>
-            <p:ph type="subTitle" idx="4294967295"/>
+            <p:ph type="body" idx="1"/>
           </p:nvPr>
         </p:nvSpPr>
         <p:spPr>
           <a:xfrm>
-            <a:off x="685800" y="2697085"/>
-            <a:ext cx="7772400" cy="617700"/>
+            <a:off x="810450" y="2625456"/>
+            <a:ext cx="7523100" cy="804300"/>
           </a:xfrm>
           <a:prstGeom prst="rect">
             <a:avLst/>
@@ -11452,22 +11992,20 @@
           </a:bodyPr>
           <a:lstStyle/>
           <a:p>
-            <a:pPr marL="0" lvl="0" indent="0" algn="l" rtl="0">
-              <a:spcBef>
-                <a:spcPts val="600"/>
-              </a:spcBef>
-              <a:spcAft>
-                <a:spcPts val="0"/>
-              </a:spcAft>
+            <a:pPr marL="0" indent="0">
               <a:buNone/>
             </a:pPr>
-            <a:endParaRPr sz="2400" b="1" dirty="0"/>
+            <a:r>
+              <a:rPr lang="en-US" dirty="0"/>
+              <a:t>I will insert analysis here once I see the plots</a:t>
+            </a:r>
+            <a:endParaRPr dirty="0"/>
           </a:p>
         </p:txBody>
       </p:sp>
       <p:sp>
         <p:nvSpPr>
-          <p:cNvPr id="214" name="Google Shape;214;p30"/>
+          <p:cNvPr id="116" name="Google Shape;116;p19"/>
           <p:cNvSpPr txBox="1">
             <a:spLocks noGrp="1"/>
           </p:cNvSpPr>
@@ -11510,7 +12048,7 @@
     </p:spTree>
     <p:extLst>
       <p:ext uri="{BB962C8B-B14F-4D97-AF65-F5344CB8AC3E}">
-        <p14:creationId xmlns:p14="http://schemas.microsoft.com/office/powerpoint/2010/main" val="3377682429"/>
+        <p14:creationId xmlns:p14="http://schemas.microsoft.com/office/powerpoint/2010/main" val="2234185197"/>
       </p:ext>
     </p:extLst>
   </p:cSld>
@@ -11756,336 +12294,6 @@
   <p:cSld>
     <p:spTree>
       <p:nvGrpSpPr>
-        <p:cNvPr id="1" name="Shape 207"/>
-        <p:cNvGrpSpPr/>
-        <p:nvPr/>
-      </p:nvGrpSpPr>
-      <p:grpSpPr>
-        <a:xfrm>
-          <a:off x="0" y="0"/>
-          <a:ext cx="0" cy="0"/>
-          <a:chOff x="0" y="0"/>
-          <a:chExt cx="0" cy="0"/>
-        </a:xfrm>
-      </p:grpSpPr>
-      <p:sp>
-        <p:nvSpPr>
-          <p:cNvPr id="211" name="Google Shape;211;p30"/>
-          <p:cNvSpPr txBox="1">
-            <a:spLocks noGrp="1"/>
-          </p:cNvSpPr>
-          <p:nvPr>
-            <p:ph type="subTitle" idx="4294967295"/>
-          </p:nvPr>
-        </p:nvSpPr>
-        <p:spPr>
-          <a:xfrm>
-            <a:off x="685800" y="2697085"/>
-            <a:ext cx="7772400" cy="617700"/>
-          </a:xfrm>
-          <a:prstGeom prst="rect">
-            <a:avLst/>
-          </a:prstGeom>
-        </p:spPr>
-        <p:txBody>
-          <a:bodyPr spcFirstLastPara="1" wrap="square" lIns="91425" tIns="91425" rIns="91425" bIns="91425" anchor="t" anchorCtr="0">
-            <a:noAutofit/>
-          </a:bodyPr>
-          <a:lstStyle/>
-          <a:p>
-            <a:pPr marL="0" lvl="0" indent="0" algn="l" rtl="0">
-              <a:spcBef>
-                <a:spcPts val="600"/>
-              </a:spcBef>
-              <a:spcAft>
-                <a:spcPts val="0"/>
-              </a:spcAft>
-              <a:buNone/>
-            </a:pPr>
-            <a:endParaRPr sz="2400" b="1" dirty="0"/>
-          </a:p>
-        </p:txBody>
-      </p:sp>
-      <p:sp>
-        <p:nvSpPr>
-          <p:cNvPr id="214" name="Google Shape;214;p30"/>
-          <p:cNvSpPr txBox="1">
-            <a:spLocks noGrp="1"/>
-          </p:cNvSpPr>
-          <p:nvPr>
-            <p:ph type="sldNum" idx="12"/>
-          </p:nvPr>
-        </p:nvSpPr>
-        <p:spPr>
-          <a:xfrm>
-            <a:off x="4297650" y="6333134"/>
-            <a:ext cx="548700" cy="525000"/>
-          </a:xfrm>
-          <a:prstGeom prst="rect">
-            <a:avLst/>
-          </a:prstGeom>
-        </p:spPr>
-        <p:txBody>
-          <a:bodyPr spcFirstLastPara="1" wrap="square" lIns="91425" tIns="91425" rIns="91425" bIns="91425" anchor="t" anchorCtr="0">
-            <a:noAutofit/>
-          </a:bodyPr>
-          <a:lstStyle/>
-          <a:p>
-            <a:pPr marL="0" lvl="0" indent="0" algn="ctr" rtl="0">
-              <a:spcBef>
-                <a:spcPts val="0"/>
-              </a:spcBef>
-              <a:spcAft>
-                <a:spcPts val="0"/>
-              </a:spcAft>
-              <a:buNone/>
-            </a:pPr>
-            <a:fld id="{00000000-1234-1234-1234-123412341234}" type="slidenum">
-              <a:rPr lang="en"/>
-              <a:t>20</a:t>
-            </a:fld>
-            <a:endParaRPr/>
-          </a:p>
-        </p:txBody>
-      </p:sp>
-    </p:spTree>
-    <p:extLst>
-      <p:ext uri="{BB962C8B-B14F-4D97-AF65-F5344CB8AC3E}">
-        <p14:creationId xmlns:p14="http://schemas.microsoft.com/office/powerpoint/2010/main" val="2858851503"/>
-      </p:ext>
-    </p:extLst>
-  </p:cSld>
-  <p:clrMapOvr>
-    <a:masterClrMapping/>
-  </p:clrMapOvr>
-</p:sld>
-</file>
-
-<file path=ppt/slides/slide21.xml><?xml version="1.0" encoding="utf-8"?>
-<p:sld xmlns:a="http://schemas.openxmlformats.org/drawingml/2006/main" xmlns:r="http://schemas.openxmlformats.org/officeDocument/2006/relationships" xmlns:p="http://schemas.openxmlformats.org/presentationml/2006/main">
-  <p:cSld>
-    <p:spTree>
-      <p:nvGrpSpPr>
-        <p:cNvPr id="1" name="Shape 207"/>
-        <p:cNvGrpSpPr/>
-        <p:nvPr/>
-      </p:nvGrpSpPr>
-      <p:grpSpPr>
-        <a:xfrm>
-          <a:off x="0" y="0"/>
-          <a:ext cx="0" cy="0"/>
-          <a:chOff x="0" y="0"/>
-          <a:chExt cx="0" cy="0"/>
-        </a:xfrm>
-      </p:grpSpPr>
-      <p:sp>
-        <p:nvSpPr>
-          <p:cNvPr id="211" name="Google Shape;211;p30"/>
-          <p:cNvSpPr txBox="1">
-            <a:spLocks noGrp="1"/>
-          </p:cNvSpPr>
-          <p:nvPr>
-            <p:ph type="subTitle" idx="4294967295"/>
-          </p:nvPr>
-        </p:nvSpPr>
-        <p:spPr>
-          <a:xfrm>
-            <a:off x="685800" y="2697085"/>
-            <a:ext cx="7772400" cy="617700"/>
-          </a:xfrm>
-          <a:prstGeom prst="rect">
-            <a:avLst/>
-          </a:prstGeom>
-        </p:spPr>
-        <p:txBody>
-          <a:bodyPr spcFirstLastPara="1" wrap="square" lIns="91425" tIns="91425" rIns="91425" bIns="91425" anchor="t" anchorCtr="0">
-            <a:noAutofit/>
-          </a:bodyPr>
-          <a:lstStyle/>
-          <a:p>
-            <a:pPr marL="0" lvl="0" indent="0" algn="l" rtl="0">
-              <a:spcBef>
-                <a:spcPts val="600"/>
-              </a:spcBef>
-              <a:spcAft>
-                <a:spcPts val="0"/>
-              </a:spcAft>
-              <a:buNone/>
-            </a:pPr>
-            <a:endParaRPr sz="2400" b="1" dirty="0"/>
-          </a:p>
-        </p:txBody>
-      </p:sp>
-      <p:sp>
-        <p:nvSpPr>
-          <p:cNvPr id="214" name="Google Shape;214;p30"/>
-          <p:cNvSpPr txBox="1">
-            <a:spLocks noGrp="1"/>
-          </p:cNvSpPr>
-          <p:nvPr>
-            <p:ph type="sldNum" idx="12"/>
-          </p:nvPr>
-        </p:nvSpPr>
-        <p:spPr>
-          <a:xfrm>
-            <a:off x="4297650" y="6333134"/>
-            <a:ext cx="548700" cy="525000"/>
-          </a:xfrm>
-          <a:prstGeom prst="rect">
-            <a:avLst/>
-          </a:prstGeom>
-        </p:spPr>
-        <p:txBody>
-          <a:bodyPr spcFirstLastPara="1" wrap="square" lIns="91425" tIns="91425" rIns="91425" bIns="91425" anchor="t" anchorCtr="0">
-            <a:noAutofit/>
-          </a:bodyPr>
-          <a:lstStyle/>
-          <a:p>
-            <a:pPr marL="0" lvl="0" indent="0" algn="ctr" rtl="0">
-              <a:spcBef>
-                <a:spcPts val="0"/>
-              </a:spcBef>
-              <a:spcAft>
-                <a:spcPts val="0"/>
-              </a:spcAft>
-              <a:buNone/>
-            </a:pPr>
-            <a:fld id="{00000000-1234-1234-1234-123412341234}" type="slidenum">
-              <a:rPr lang="en"/>
-              <a:t>21</a:t>
-            </a:fld>
-            <a:endParaRPr/>
-          </a:p>
-        </p:txBody>
-      </p:sp>
-    </p:spTree>
-    <p:extLst>
-      <p:ext uri="{BB962C8B-B14F-4D97-AF65-F5344CB8AC3E}">
-        <p14:creationId xmlns:p14="http://schemas.microsoft.com/office/powerpoint/2010/main" val="2308382858"/>
-      </p:ext>
-    </p:extLst>
-  </p:cSld>
-  <p:clrMapOvr>
-    <a:masterClrMapping/>
-  </p:clrMapOvr>
-</p:sld>
-</file>
-
-<file path=ppt/slides/slide22.xml><?xml version="1.0" encoding="utf-8"?>
-<p:sld xmlns:a="http://schemas.openxmlformats.org/drawingml/2006/main" xmlns:r="http://schemas.openxmlformats.org/officeDocument/2006/relationships" xmlns:p="http://schemas.openxmlformats.org/presentationml/2006/main">
-  <p:cSld>
-    <p:spTree>
-      <p:nvGrpSpPr>
-        <p:cNvPr id="1" name="Shape 207"/>
-        <p:cNvGrpSpPr/>
-        <p:nvPr/>
-      </p:nvGrpSpPr>
-      <p:grpSpPr>
-        <a:xfrm>
-          <a:off x="0" y="0"/>
-          <a:ext cx="0" cy="0"/>
-          <a:chOff x="0" y="0"/>
-          <a:chExt cx="0" cy="0"/>
-        </a:xfrm>
-      </p:grpSpPr>
-      <p:sp>
-        <p:nvSpPr>
-          <p:cNvPr id="211" name="Google Shape;211;p30"/>
-          <p:cNvSpPr txBox="1">
-            <a:spLocks noGrp="1"/>
-          </p:cNvSpPr>
-          <p:nvPr>
-            <p:ph type="subTitle" idx="4294967295"/>
-          </p:nvPr>
-        </p:nvSpPr>
-        <p:spPr>
-          <a:xfrm>
-            <a:off x="685800" y="2697085"/>
-            <a:ext cx="7772400" cy="617700"/>
-          </a:xfrm>
-          <a:prstGeom prst="rect">
-            <a:avLst/>
-          </a:prstGeom>
-        </p:spPr>
-        <p:txBody>
-          <a:bodyPr spcFirstLastPara="1" wrap="square" lIns="91425" tIns="91425" rIns="91425" bIns="91425" anchor="t" anchorCtr="0">
-            <a:noAutofit/>
-          </a:bodyPr>
-          <a:lstStyle/>
-          <a:p>
-            <a:pPr marL="0" lvl="0" indent="0" algn="l" rtl="0">
-              <a:spcBef>
-                <a:spcPts val="600"/>
-              </a:spcBef>
-              <a:spcAft>
-                <a:spcPts val="0"/>
-              </a:spcAft>
-              <a:buNone/>
-            </a:pPr>
-            <a:endParaRPr sz="2400" b="1" dirty="0"/>
-          </a:p>
-        </p:txBody>
-      </p:sp>
-      <p:sp>
-        <p:nvSpPr>
-          <p:cNvPr id="214" name="Google Shape;214;p30"/>
-          <p:cNvSpPr txBox="1">
-            <a:spLocks noGrp="1"/>
-          </p:cNvSpPr>
-          <p:nvPr>
-            <p:ph type="sldNum" idx="12"/>
-          </p:nvPr>
-        </p:nvSpPr>
-        <p:spPr>
-          <a:xfrm>
-            <a:off x="4297650" y="6333134"/>
-            <a:ext cx="548700" cy="525000"/>
-          </a:xfrm>
-          <a:prstGeom prst="rect">
-            <a:avLst/>
-          </a:prstGeom>
-        </p:spPr>
-        <p:txBody>
-          <a:bodyPr spcFirstLastPara="1" wrap="square" lIns="91425" tIns="91425" rIns="91425" bIns="91425" anchor="t" anchorCtr="0">
-            <a:noAutofit/>
-          </a:bodyPr>
-          <a:lstStyle/>
-          <a:p>
-            <a:pPr marL="0" lvl="0" indent="0" algn="ctr" rtl="0">
-              <a:spcBef>
-                <a:spcPts val="0"/>
-              </a:spcBef>
-              <a:spcAft>
-                <a:spcPts val="0"/>
-              </a:spcAft>
-              <a:buNone/>
-            </a:pPr>
-            <a:fld id="{00000000-1234-1234-1234-123412341234}" type="slidenum">
-              <a:rPr lang="en"/>
-              <a:t>22</a:t>
-            </a:fld>
-            <a:endParaRPr/>
-          </a:p>
-        </p:txBody>
-      </p:sp>
-    </p:spTree>
-    <p:extLst>
-      <p:ext uri="{BB962C8B-B14F-4D97-AF65-F5344CB8AC3E}">
-        <p14:creationId xmlns:p14="http://schemas.microsoft.com/office/powerpoint/2010/main" val="1208747636"/>
-      </p:ext>
-    </p:extLst>
-  </p:cSld>
-  <p:clrMapOvr>
-    <a:masterClrMapping/>
-  </p:clrMapOvr>
-</p:sld>
-</file>
-
-<file path=ppt/slides/slide23.xml><?xml version="1.0" encoding="utf-8"?>
-<p:sld xmlns:a="http://schemas.openxmlformats.org/drawingml/2006/main" xmlns:r="http://schemas.openxmlformats.org/officeDocument/2006/relationships" xmlns:p="http://schemas.openxmlformats.org/presentationml/2006/main">
-  <p:cSld>
-    <p:spTree>
-      <p:nvGrpSpPr>
         <p:cNvPr id="1" name="Shape 114"/>
         <p:cNvGrpSpPr/>
         <p:nvPr/>
@@ -12126,10 +12334,6 @@
             <a:pPr marL="0" indent="0">
               <a:buNone/>
             </a:pPr>
-            <a:r>
-              <a:rPr lang="en-US" dirty="0"/>
-              <a:t>I will insert analysis here once I see the plots</a:t>
-            </a:r>
             <a:endParaRPr dirty="0"/>
           </a:p>
         </p:txBody>
@@ -12170,111 +12374,7 @@
             </a:pPr>
             <a:fld id="{00000000-1234-1234-1234-123412341234}" type="slidenum">
               <a:rPr lang="en"/>
-              <a:t>23</a:t>
-            </a:fld>
-            <a:endParaRPr/>
-          </a:p>
-        </p:txBody>
-      </p:sp>
-    </p:spTree>
-    <p:extLst>
-      <p:ext uri="{BB962C8B-B14F-4D97-AF65-F5344CB8AC3E}">
-        <p14:creationId xmlns:p14="http://schemas.microsoft.com/office/powerpoint/2010/main" val="2234185197"/>
-      </p:ext>
-    </p:extLst>
-  </p:cSld>
-  <p:clrMapOvr>
-    <a:masterClrMapping/>
-  </p:clrMapOvr>
-</p:sld>
-</file>
-
-<file path=ppt/slides/slide24.xml><?xml version="1.0" encoding="utf-8"?>
-<p:sld xmlns:a="http://schemas.openxmlformats.org/drawingml/2006/main" xmlns:r="http://schemas.openxmlformats.org/officeDocument/2006/relationships" xmlns:p="http://schemas.openxmlformats.org/presentationml/2006/main">
-  <p:cSld>
-    <p:spTree>
-      <p:nvGrpSpPr>
-        <p:cNvPr id="1" name="Shape 114"/>
-        <p:cNvGrpSpPr/>
-        <p:nvPr/>
-      </p:nvGrpSpPr>
-      <p:grpSpPr>
-        <a:xfrm>
-          <a:off x="0" y="0"/>
-          <a:ext cx="0" cy="0"/>
-          <a:chOff x="0" y="0"/>
-          <a:chExt cx="0" cy="0"/>
-        </a:xfrm>
-      </p:grpSpPr>
-      <p:sp>
-        <p:nvSpPr>
-          <p:cNvPr id="115" name="Google Shape;115;p19"/>
-          <p:cNvSpPr txBox="1">
-            <a:spLocks noGrp="1"/>
-          </p:cNvSpPr>
-          <p:nvPr>
-            <p:ph type="body" idx="1"/>
-          </p:nvPr>
-        </p:nvSpPr>
-        <p:spPr>
-          <a:xfrm>
-            <a:off x="810450" y="2625456"/>
-            <a:ext cx="7523100" cy="804300"/>
-          </a:xfrm>
-          <a:prstGeom prst="rect">
-            <a:avLst/>
-          </a:prstGeom>
-        </p:spPr>
-        <p:txBody>
-          <a:bodyPr spcFirstLastPara="1" wrap="square" lIns="91425" tIns="91425" rIns="91425" bIns="91425" anchor="t" anchorCtr="0">
-            <a:noAutofit/>
-          </a:bodyPr>
-          <a:lstStyle/>
-          <a:p>
-            <a:pPr marL="0" indent="0">
-              <a:buNone/>
-            </a:pPr>
-            <a:endParaRPr dirty="0"/>
-          </a:p>
-        </p:txBody>
-      </p:sp>
-      <p:sp>
-        <p:nvSpPr>
-          <p:cNvPr id="116" name="Google Shape;116;p19"/>
-          <p:cNvSpPr txBox="1">
-            <a:spLocks noGrp="1"/>
-          </p:cNvSpPr>
-          <p:nvPr>
-            <p:ph type="sldNum" idx="12"/>
-          </p:nvPr>
-        </p:nvSpPr>
-        <p:spPr>
-          <a:xfrm>
-            <a:off x="4297650" y="6333134"/>
-            <a:ext cx="548700" cy="525000"/>
-          </a:xfrm>
-          <a:prstGeom prst="rect">
-            <a:avLst/>
-          </a:prstGeom>
-        </p:spPr>
-        <p:txBody>
-          <a:bodyPr spcFirstLastPara="1" wrap="square" lIns="91425" tIns="91425" rIns="91425" bIns="91425" anchor="t" anchorCtr="0">
-            <a:noAutofit/>
-          </a:bodyPr>
-          <a:lstStyle/>
-          <a:p>
-            <a:pPr marL="0" lvl="0" indent="0" algn="ctr" rtl="0">
-              <a:spcBef>
-                <a:spcPts val="0"/>
-              </a:spcBef>
-              <a:spcAft>
-                <a:spcPts val="0"/>
-              </a:spcAft>
-              <a:buNone/>
-            </a:pPr>
-            <a:fld id="{00000000-1234-1234-1234-123412341234}" type="slidenum">
-              <a:rPr lang="en"/>
-              <a:t>24</a:t>
+              <a:t>20</a:t>
             </a:fld>
             <a:endParaRPr/>
           </a:p>
@@ -12293,7 +12393,7 @@
 </p:sld>
 </file>
 
-<file path=ppt/slides/slide25.xml><?xml version="1.0" encoding="utf-8"?>
+<file path=ppt/slides/slide21.xml><?xml version="1.0" encoding="utf-8"?>
 <p:sld xmlns:a="http://schemas.openxmlformats.org/drawingml/2006/main" xmlns:r="http://schemas.openxmlformats.org/officeDocument/2006/relationships" xmlns:p="http://schemas.openxmlformats.org/presentationml/2006/main">
   <p:cSld>
     <p:spTree>
@@ -12419,7 +12519,7 @@
 </p:sld>
 </file>
 
-<file path=ppt/slides/slide26.xml><?xml version="1.0" encoding="utf-8"?>
+<file path=ppt/slides/slide22.xml><?xml version="1.0" encoding="utf-8"?>
 <p:sld xmlns:a="http://schemas.openxmlformats.org/drawingml/2006/main" xmlns:r="http://schemas.openxmlformats.org/officeDocument/2006/relationships" xmlns:p="http://schemas.openxmlformats.org/presentationml/2006/main">
   <p:cSld>
     <p:spTree>
@@ -12588,7 +12688,7 @@
             </a:pPr>
             <a:fld id="{00000000-1234-1234-1234-123412341234}" type="slidenum">
               <a:rPr lang="en"/>
-              <a:t>26</a:t>
+              <a:t>22</a:t>
             </a:fld>
             <a:endParaRPr/>
           </a:p>
@@ -12602,7 +12702,7 @@
 </p:sld>
 </file>
 
-<file path=ppt/slides/slide27.xml><?xml version="1.0" encoding="utf-8"?>
+<file path=ppt/slides/slide23.xml><?xml version="1.0" encoding="utf-8"?>
 <p:sld xmlns:a="http://schemas.openxmlformats.org/drawingml/2006/main" xmlns:r="http://schemas.openxmlformats.org/officeDocument/2006/relationships" xmlns:p="http://schemas.openxmlformats.org/presentationml/2006/main">
   <p:cSld>
     <p:spTree>

</xml_diff>

<commit_message>
changed 2 screenshots of dataframe
</commit_message>
<xml_diff>
--- a/News Project Presentation.pptx
+++ b/News Project Presentation.pptx
@@ -38,7 +38,7 @@
   <p:notesSz cx="6858000" cy="9144000"/>
   <p:embeddedFontLst>
     <p:embeddedFont>
-      <p:font typeface="Source Sans Pro" panose="020B0604020202020204" charset="0"/>
+      <p:font typeface="Source Sans Pro" panose="020B0503030403020204" pitchFamily="34" charset="0"/>
       <p:regular r:id="rId28"/>
       <p:bold r:id="rId29"/>
       <p:italic r:id="rId30"/>
@@ -292,20 +292,6 @@
     </p:extLst>
   </p:cmAuthor>
 </p:cmAuthorLst>
-</file>
-
-<file path=ppt/comments/comment1.xml><?xml version="1.0" encoding="utf-8"?>
-<p:cmLst xmlns:a="http://schemas.openxmlformats.org/drawingml/2006/main" xmlns:r="http://schemas.openxmlformats.org/officeDocument/2006/relationships" xmlns:p="http://schemas.openxmlformats.org/presentationml/2006/main">
-  <p:cm authorId="1" dt="2019-07-02T22:02:11.394" idx="2">
-    <p:pos x="5406" y="2851"/>
-    <p:text>Need to Change Delta Formula</p:text>
-    <p:extLst>
-      <p:ext uri="{C676402C-5697-4E1C-873F-D02D1690AC5C}">
-        <p15:threadingInfo xmlns:p15="http://schemas.microsoft.com/office/powerpoint/2012/main" timeZoneBias="240"/>
-      </p:ext>
-    </p:extLst>
-  </p:cm>
-</p:cmLst>
 </file>
 
 <file path=ppt/notesMasters/notesMaster1.xml><?xml version="1.0" encoding="utf-8"?>
@@ -9256,41 +9242,6 @@
       </p:sp>
       <p:pic>
         <p:nvPicPr>
-          <p:cNvPr id="2" name="Picture 1">
-            <a:extLst>
-              <a:ext uri="{FF2B5EF4-FFF2-40B4-BE49-F238E27FC236}">
-                <a16:creationId xmlns:a16="http://schemas.microsoft.com/office/drawing/2014/main" id="{7EFDADC8-6077-478E-9BE2-5D1CDB86E103}"/>
-              </a:ext>
-            </a:extLst>
-          </p:cNvPr>
-          <p:cNvPicPr>
-            <a:picLocks noChangeAspect="1"/>
-          </p:cNvPicPr>
-          <p:nvPr/>
-        </p:nvPicPr>
-        <p:blipFill>
-          <a:blip r:embed="rId3"/>
-          <a:stretch>
-            <a:fillRect/>
-          </a:stretch>
-        </p:blipFill>
-        <p:spPr>
-          <a:xfrm>
-            <a:off x="629436" y="4526325"/>
-            <a:ext cx="7951801" cy="1732176"/>
-          </a:xfrm>
-          <a:prstGeom prst="rect">
-            <a:avLst/>
-          </a:prstGeom>
-          <a:ln w="31750">
-            <a:solidFill>
-              <a:srgbClr val="FF0000"/>
-            </a:solidFill>
-          </a:ln>
-        </p:spPr>
-      </p:pic>
-      <p:pic>
-        <p:nvPicPr>
           <p:cNvPr id="3" name="Picture 2">
             <a:extLst>
               <a:ext uri="{FF2B5EF4-FFF2-40B4-BE49-F238E27FC236}">
@@ -9304,7 +9255,7 @@
           <p:nvPr/>
         </p:nvPicPr>
         <p:blipFill>
-          <a:blip r:embed="rId4"/>
+          <a:blip r:embed="rId3"/>
           <a:stretch>
             <a:fillRect/>
           </a:stretch>
@@ -9692,6 +9643,36 @@
           </a:fontRef>
         </p:style>
       </p:cxnSp>
+      <p:pic>
+        <p:nvPicPr>
+          <p:cNvPr id="5" name="Picture 4">
+            <a:extLst>
+              <a:ext uri="{FF2B5EF4-FFF2-40B4-BE49-F238E27FC236}">
+                <a16:creationId xmlns:a16="http://schemas.microsoft.com/office/drawing/2014/main" id="{618FB977-22CB-4E1F-8119-F07F71DE3AED}"/>
+              </a:ext>
+            </a:extLst>
+          </p:cNvPr>
+          <p:cNvPicPr>
+            <a:picLocks noChangeAspect="1"/>
+          </p:cNvPicPr>
+          <p:nvPr/>
+        </p:nvPicPr>
+        <p:blipFill>
+          <a:blip r:embed="rId4"/>
+          <a:stretch>
+            <a:fillRect/>
+          </a:stretch>
+        </p:blipFill>
+        <p:spPr>
+          <a:xfrm>
+            <a:off x="671513" y="4562475"/>
+            <a:ext cx="7529512" cy="1770659"/>
+          </a:xfrm>
+          <a:prstGeom prst="rect">
+            <a:avLst/>
+          </a:prstGeom>
+        </p:spPr>
+      </p:pic>
     </p:spTree>
     <p:extLst>
       <p:ext uri="{BB962C8B-B14F-4D97-AF65-F5344CB8AC3E}">
@@ -9766,10 +9747,10 @@
       </p:sp>
       <p:pic>
         <p:nvPicPr>
-          <p:cNvPr id="2" name="Picture 1">
+          <p:cNvPr id="3" name="Picture 2">
             <a:extLst>
               <a:ext uri="{FF2B5EF4-FFF2-40B4-BE49-F238E27FC236}">
-                <a16:creationId xmlns:a16="http://schemas.microsoft.com/office/drawing/2014/main" id="{2D30674F-D7E1-40D6-881A-5D09AEA6F4D2}"/>
+                <a16:creationId xmlns:a16="http://schemas.microsoft.com/office/drawing/2014/main" id="{54C56256-13CC-4D68-B2D6-072096171BEB}"/>
               </a:ext>
             </a:extLst>
           </p:cNvPr>
@@ -9786,36 +9767,6 @@
         </p:blipFill>
         <p:spPr>
           <a:xfrm>
-            <a:off x="250031" y="3594851"/>
-            <a:ext cx="8643937" cy="2630342"/>
-          </a:xfrm>
-          <a:prstGeom prst="rect">
-            <a:avLst/>
-          </a:prstGeom>
-        </p:spPr>
-      </p:pic>
-      <p:pic>
-        <p:nvPicPr>
-          <p:cNvPr id="3" name="Picture 2">
-            <a:extLst>
-              <a:ext uri="{FF2B5EF4-FFF2-40B4-BE49-F238E27FC236}">
-                <a16:creationId xmlns:a16="http://schemas.microsoft.com/office/drawing/2014/main" id="{54C56256-13CC-4D68-B2D6-072096171BEB}"/>
-              </a:ext>
-            </a:extLst>
-          </p:cNvPr>
-          <p:cNvPicPr>
-            <a:picLocks noChangeAspect="1"/>
-          </p:cNvPicPr>
-          <p:nvPr/>
-        </p:nvPicPr>
-        <p:blipFill>
-          <a:blip r:embed="rId4"/>
-          <a:stretch>
-            <a:fillRect/>
-          </a:stretch>
-        </p:blipFill>
-        <p:spPr>
-          <a:xfrm>
             <a:off x="250031" y="1033464"/>
             <a:ext cx="8470107" cy="2229686"/>
           </a:xfrm>
@@ -9834,8 +9785,8 @@
             </a:extLst>
           </p:cNvPr>
           <p:cNvCxnSpPr>
+            <a:cxnSpLocks/>
             <a:stCxn id="3" idx="2"/>
-            <a:endCxn id="2" idx="0"/>
           </p:cNvCxnSpPr>
           <p:nvPr/>
         </p:nvCxnSpPr>
@@ -10156,6 +10107,36 @@
           </a:p>
         </p:txBody>
       </p:sp>
+      <p:pic>
+        <p:nvPicPr>
+          <p:cNvPr id="4" name="Picture 3">
+            <a:extLst>
+              <a:ext uri="{FF2B5EF4-FFF2-40B4-BE49-F238E27FC236}">
+                <a16:creationId xmlns:a16="http://schemas.microsoft.com/office/drawing/2014/main" id="{1B7C9A39-7569-45AC-AF90-7A55913855A6}"/>
+              </a:ext>
+            </a:extLst>
+          </p:cNvPr>
+          <p:cNvPicPr>
+            <a:picLocks noChangeAspect="1"/>
+          </p:cNvPicPr>
+          <p:nvPr/>
+        </p:nvPicPr>
+        <p:blipFill>
+          <a:blip r:embed="rId4"/>
+          <a:stretch>
+            <a:fillRect/>
+          </a:stretch>
+        </p:blipFill>
+        <p:spPr>
+          <a:xfrm>
+            <a:off x="274350" y="3643139"/>
+            <a:ext cx="8445788" cy="2229686"/>
+          </a:xfrm>
+          <a:prstGeom prst="rect">
+            <a:avLst/>
+          </a:prstGeom>
+        </p:spPr>
+      </p:pic>
     </p:spTree>
     <p:extLst>
       <p:ext uri="{BB962C8B-B14F-4D97-AF65-F5344CB8AC3E}">
@@ -10491,32 +10472,12 @@
               </a:spcBef>
             </a:pPr>
             <a:r>
-              <a:rPr lang="en-US" sz="3300" b="1" u="sng" dirty="0" smtClean="0"/>
+              <a:rPr lang="en-US" sz="3300" b="1" u="sng" dirty="0"/>
               <a:t>General News</a:t>
             </a:r>
             <a:r>
-              <a:rPr lang="en-US" sz="3300" b="1" dirty="0" smtClean="0"/>
-              <a:t>:</a:t>
-            </a:r>
-            <a:r>
               <a:rPr lang="en-US" sz="3300" b="1" dirty="0"/>
-              <a:t> </a:t>
-            </a:r>
-            <a:r>
-              <a:rPr lang="en-US" sz="3300" b="1" dirty="0" smtClean="0"/>
-              <a:t>Sentiment Score Vs</a:t>
-            </a:r>
-            <a:r>
-              <a:rPr lang="en-US" sz="3300" b="1" dirty="0"/>
-              <a:t> </a:t>
-            </a:r>
-            <a:r>
-              <a:rPr lang="en-US" sz="3300" b="1" dirty="0" smtClean="0"/>
-              <a:t>Stock Change </a:t>
-            </a:r>
-            <a:r>
-              <a:rPr lang="en-US" sz="3300" b="1" dirty="0"/>
-              <a:t>%</a:t>
+              <a:t>: Sentiment Score Vs Stock Change %</a:t>
             </a:r>
           </a:p>
         </p:txBody>
@@ -11020,32 +10981,12 @@
               </a:spcBef>
             </a:pPr>
             <a:r>
-              <a:rPr lang="en-US" sz="3300" b="1" u="sng" dirty="0" smtClean="0"/>
+              <a:rPr lang="en-US" sz="3300" b="1" u="sng" dirty="0"/>
               <a:t>Financial News</a:t>
             </a:r>
             <a:r>
-              <a:rPr lang="en-US" sz="3300" b="1" dirty="0" smtClean="0"/>
-              <a:t>:</a:t>
-            </a:r>
-            <a:r>
               <a:rPr lang="en-US" sz="3300" b="1" dirty="0"/>
-              <a:t> </a:t>
-            </a:r>
-            <a:r>
-              <a:rPr lang="en-US" sz="3300" b="1" dirty="0" smtClean="0"/>
-              <a:t>Sentiment Score Vs</a:t>
-            </a:r>
-            <a:r>
-              <a:rPr lang="en-US" sz="3300" b="1" dirty="0"/>
-              <a:t> </a:t>
-            </a:r>
-            <a:r>
-              <a:rPr lang="en-US" sz="3300" b="1" dirty="0" smtClean="0"/>
-              <a:t>Stock Change </a:t>
-            </a:r>
-            <a:r>
-              <a:rPr lang="en-US" sz="3300" b="1" dirty="0"/>
-              <a:t>%</a:t>
+              <a:t>: Sentiment Score Vs Stock Change %</a:t>
             </a:r>
           </a:p>
         </p:txBody>
@@ -11508,32 +11449,12 @@
               </a:spcBef>
             </a:pPr>
             <a:r>
-              <a:rPr lang="en-US" sz="3300" b="1" u="sng" dirty="0" smtClean="0"/>
+              <a:rPr lang="en-US" sz="3300" b="1" u="sng" dirty="0"/>
               <a:t>Political News</a:t>
             </a:r>
             <a:r>
-              <a:rPr lang="en-US" sz="3300" b="1" dirty="0" smtClean="0"/>
-              <a:t>:</a:t>
-            </a:r>
-            <a:r>
               <a:rPr lang="en-US" sz="3300" b="1" dirty="0"/>
-              <a:t> </a:t>
-            </a:r>
-            <a:r>
-              <a:rPr lang="en-US" sz="3300" b="1" dirty="0" smtClean="0"/>
-              <a:t>Sentiment Score Vs</a:t>
-            </a:r>
-            <a:r>
-              <a:rPr lang="en-US" sz="3300" b="1" dirty="0"/>
-              <a:t> </a:t>
-            </a:r>
-            <a:r>
-              <a:rPr lang="en-US" sz="3300" b="1" dirty="0" smtClean="0"/>
-              <a:t>Stock Change </a:t>
-            </a:r>
-            <a:r>
-              <a:rPr lang="en-US" sz="3300" b="1" dirty="0"/>
-              <a:t>%</a:t>
+              <a:t>: Sentiment Score Vs Stock Change %</a:t>
             </a:r>
           </a:p>
         </p:txBody>
@@ -11720,7 +11641,7 @@
               <a:buNone/>
             </a:pPr>
             <a:r>
-              <a:rPr lang="en-US" dirty="0" smtClean="0"/>
+              <a:rPr lang="en-US" dirty="0"/>
               <a:t>The analysis suggests little correlation between news and index performance when looking at all news. However, when news is narrowed to that which relates to finance or politics the data suggests a strong alignment of sentiment and market movement. </a:t>
             </a:r>
             <a:endParaRPr dirty="0"/>
@@ -11834,7 +11755,7 @@
               <a:buNone/>
             </a:pPr>
             <a:r>
-              <a:rPr lang="en-US" dirty="0" smtClean="0"/>
+              <a:rPr lang="en-US" dirty="0"/>
               <a:t>Unexpectedly, the movement of the news seems to follow the movement of the index, not the other way around. Seemingly, investors are impacted by the information in the news but are ahead of the reporting of it.</a:t>
             </a:r>
             <a:endParaRPr dirty="0"/>
@@ -12180,24 +12101,8 @@
               <a:buNone/>
             </a:pPr>
             <a:r>
-              <a:rPr lang="en-US" sz="1900" dirty="0" smtClean="0"/>
-              <a:t>March 28, 2019 - Tim </a:t>
-            </a:r>
-            <a:r>
               <a:rPr lang="en-US" sz="1900" dirty="0"/>
-              <a:t>Sloan </a:t>
-            </a:r>
-            <a:r>
-              <a:rPr lang="en-US" sz="1900" dirty="0" smtClean="0"/>
-              <a:t>resigned as </a:t>
-            </a:r>
-            <a:r>
-              <a:rPr lang="en-US" sz="1900" dirty="0"/>
-              <a:t>chief executive, becoming the second CEO to leave the bank in the fallout of a wide-ranging sales practices </a:t>
-            </a:r>
-            <a:r>
-              <a:rPr lang="en-US" sz="1900" dirty="0" smtClean="0"/>
-              <a:t>scandal.</a:t>
+              <a:t>March 28, 2019 - Tim Sloan resigned as chief executive, becoming the second CEO to leave the bank in the fallout of a wide-ranging sales practices scandal.</a:t>
             </a:r>
             <a:endParaRPr sz="1900" dirty="0"/>
           </a:p>
@@ -12248,12 +12153,8 @@
               <a:buNone/>
             </a:pPr>
             <a:r>
-              <a:rPr lang="en-US" sz="1900" dirty="0" smtClean="0"/>
-              <a:t>September 28, 2018 - The </a:t>
-            </a:r>
-            <a:r>
               <a:rPr lang="en-US" sz="1900" dirty="0"/>
-              <a:t>Securities and Exchange Commission sues Tesla CEO Elon Musk making "false and misleading" statements to investors in an August 7, 2018 tweet. Later that month -- and after mocking the agency on twitter -- Musk settles with SEC for $20 million and steps down as chairman of Tesla. The company pays a $20 million fine as well and pledges to monitor Musk’s social media usage.</a:t>
+              <a:t>September 28, 2018 - The Securities and Exchange Commission sues Tesla CEO Elon Musk making "false and misleading" statements to investors in an August 7, 2018 tweet. Later that month -- and after mocking the agency on twitter -- Musk settles with SEC for $20 million and steps down as chairman of Tesla. The company pays a $20 million fine as well and pledges to monitor Musk’s social media usage.</a:t>
             </a:r>
             <a:endParaRPr sz="1900" dirty="0"/>
           </a:p>
@@ -12297,20 +12198,8 @@
               <a:buNone/>
             </a:pPr>
             <a:r>
-              <a:rPr lang="en-US" sz="1900" dirty="0" smtClean="0"/>
-              <a:t>June 26, 2019 - Wayfair </a:t>
-            </a:r>
-            <a:r>
               <a:rPr lang="en-US" sz="1900" dirty="0"/>
-              <a:t>employees walk </a:t>
-            </a:r>
-            <a:r>
-              <a:rPr lang="en-US" sz="1900" dirty="0" smtClean="0"/>
-              <a:t>out </a:t>
-            </a:r>
-            <a:r>
-              <a:rPr lang="en-US" sz="1900" dirty="0"/>
-              <a:t>of the company’s Boston-based HQs to protest Wayfair’s $200K sale of furniture to a contractor of migrant detention camps at the southern border.</a:t>
+              <a:t>June 26, 2019 - Wayfair employees walk out of the company’s Boston-based HQs to protest Wayfair’s $200K sale of furniture to a contractor of migrant detention camps at the southern border.</a:t>
             </a:r>
             <a:endParaRPr sz="1900" dirty="0"/>
           </a:p>
@@ -13999,7 +13888,7 @@
               <a:buNone/>
             </a:pPr>
             <a:r>
-              <a:rPr lang="en-US" sz="1800" dirty="0" smtClean="0"/>
+              <a:rPr lang="en-US" sz="1800" dirty="0"/>
               <a:t>For Wells Fargo, small dips in sentiment seem to result in large dips in stock value. However the largest dip, in December 2018, was not related to Wells Fargo news but rather sector performance as a whole. </a:t>
             </a:r>
           </a:p>
@@ -14007,7 +13896,7 @@
             <a:pPr marL="0" indent="0">
               <a:buNone/>
             </a:pPr>
-            <a:endParaRPr lang="en-US" sz="1800" dirty="0" smtClean="0"/>
+            <a:endParaRPr lang="en-US" sz="1800" dirty="0"/>
           </a:p>
           <a:p>
             <a:pPr marL="0" indent="0">
@@ -14015,19 +13904,7 @@
             </a:pPr>
             <a:r>
               <a:rPr lang="en-US" sz="1800" dirty="0"/>
-              <a:t>For Tesla, news sentiment remained </a:t>
-            </a:r>
-            <a:r>
-              <a:rPr lang="en-US" sz="1800" dirty="0" smtClean="0"/>
-              <a:t>neutral overall while </a:t>
-            </a:r>
-            <a:r>
-              <a:rPr lang="en-US" sz="1800" dirty="0"/>
-              <a:t>stock performance </a:t>
-            </a:r>
-            <a:r>
-              <a:rPr lang="en-US" sz="1800" dirty="0" smtClean="0"/>
-              <a:t>fluctuated. Like Wells Fargo, this suggests influence from other factors. </a:t>
+              <a:t>For Tesla, news sentiment remained neutral overall while stock performance fluctuated. Like Wells Fargo, this suggests influence from other factors. </a:t>
             </a:r>
           </a:p>
           <a:p>
@@ -14041,10 +13918,9 @@
               <a:buNone/>
             </a:pPr>
             <a:r>
-              <a:rPr lang="en-US" sz="1800" dirty="0" smtClean="0"/>
+              <a:rPr lang="en-US" sz="1800" dirty="0"/>
               <a:t>For Wayfair, news sentiment remained positive overall until March 2019 when we observe a dip in both sentiment and stock price, followed immediately by a rebound in first the news then the stock price. This likely indicates a reaction surrounding first quarter earnings.</a:t>
             </a:r>
-            <a:endParaRPr lang="en-US" sz="1800" dirty="0"/>
           </a:p>
           <a:p>
             <a:pPr marL="0" indent="0">
@@ -14161,7 +14037,7 @@
               <a:buNone/>
             </a:pPr>
             <a:r>
-              <a:rPr lang="en-US" dirty="0" smtClean="0"/>
+              <a:rPr lang="en-US" dirty="0"/>
               <a:t>It appears that all 3 companies suffer only short term losses at the hands of the media, post scandal. The stock behavior is controlled by what appear to be more influential factors. </a:t>
             </a:r>
             <a:endParaRPr dirty="0"/>
@@ -14291,7 +14167,7 @@
               <a:buNone/>
             </a:pPr>
             <a:r>
-              <a:rPr lang="en" dirty="0" smtClean="0"/>
+              <a:rPr lang="en" dirty="0"/>
               <a:t>“Uncertainty is the only certainty”</a:t>
             </a:r>
             <a:endParaRPr dirty="0"/>
@@ -14333,12 +14209,8 @@
               <a:buNone/>
             </a:pPr>
             <a:r>
-              <a:rPr lang="en-US" dirty="0" smtClean="0"/>
-              <a:t>While the news sentiment </a:t>
-            </a:r>
-            <a:r>
-              <a:rPr lang="en-US" dirty="0" smtClean="0"/>
-              <a:t>and stock/index behavior is correlated, additional analysis would be necessary to determine causality. To explore further, data sets can be narrowed by date and other influential factors can be introduced to rule out their level of impact.</a:t>
+              <a:rPr lang="en-US" dirty="0"/>
+              <a:t>While the news sentiment and stock/index behavior is correlated, additional analysis would be necessary to determine causality. To explore further, data sets can be narrowed by date and other influential factors can be introduced to rule out their level of impact.</a:t>
             </a:r>
           </a:p>
         </p:txBody>

</xml_diff>